<commit_message>
Updated lesson 9 slides.
</commit_message>
<xml_diff>
--- a/lecture/slides/ECE_383_Lec9.pptx
+++ b/lecture/slides/ECE_383_Lec9.pptx
@@ -6,10 +6,10 @@
     <p:sldMasterId id="2147483687" r:id="rId2"/>
   </p:sldMasterIdLst>
   <p:notesMasterIdLst>
-    <p:notesMasterId r:id="rId34"/>
+    <p:notesMasterId r:id="rId36"/>
   </p:notesMasterIdLst>
   <p:handoutMasterIdLst>
-    <p:handoutMasterId r:id="rId35"/>
+    <p:handoutMasterId r:id="rId37"/>
   </p:handoutMasterIdLst>
   <p:sldIdLst>
     <p:sldId id="299" r:id="rId3"/>
@@ -27,22 +27,24 @@
     <p:sldId id="368" r:id="rId15"/>
     <p:sldId id="360" r:id="rId16"/>
     <p:sldId id="361" r:id="rId17"/>
-    <p:sldId id="369" r:id="rId18"/>
-    <p:sldId id="370" r:id="rId19"/>
-    <p:sldId id="371" r:id="rId20"/>
-    <p:sldId id="372" r:id="rId21"/>
-    <p:sldId id="373" r:id="rId22"/>
-    <p:sldId id="374" r:id="rId23"/>
-    <p:sldId id="375" r:id="rId24"/>
-    <p:sldId id="376" r:id="rId25"/>
-    <p:sldId id="377" r:id="rId26"/>
-    <p:sldId id="378" r:id="rId27"/>
-    <p:sldId id="379" r:id="rId28"/>
-    <p:sldId id="380" r:id="rId29"/>
-    <p:sldId id="381" r:id="rId30"/>
-    <p:sldId id="382" r:id="rId31"/>
-    <p:sldId id="383" r:id="rId32"/>
-    <p:sldId id="362" r:id="rId33"/>
+    <p:sldId id="386" r:id="rId18"/>
+    <p:sldId id="384" r:id="rId19"/>
+    <p:sldId id="369" r:id="rId20"/>
+    <p:sldId id="370" r:id="rId21"/>
+    <p:sldId id="371" r:id="rId22"/>
+    <p:sldId id="372" r:id="rId23"/>
+    <p:sldId id="373" r:id="rId24"/>
+    <p:sldId id="374" r:id="rId25"/>
+    <p:sldId id="375" r:id="rId26"/>
+    <p:sldId id="376" r:id="rId27"/>
+    <p:sldId id="377" r:id="rId28"/>
+    <p:sldId id="378" r:id="rId29"/>
+    <p:sldId id="379" r:id="rId30"/>
+    <p:sldId id="380" r:id="rId31"/>
+    <p:sldId id="381" r:id="rId32"/>
+    <p:sldId id="382" r:id="rId33"/>
+    <p:sldId id="383" r:id="rId34"/>
+    <p:sldId id="362" r:id="rId35"/>
   </p:sldIdLst>
   <p:sldSz cx="9144000" cy="6858000" type="screen4x3"/>
   <p:notesSz cx="6985000" cy="9283700"/>
@@ -8952,79 +8954,7 @@
   <p:timing>
     <p:tnLst>
       <p:par>
-        <p:cTn id="1" dur="indefinite" restart="never" nodeType="tmRoot">
-          <p:childTnLst>
-            <p:seq concurrent="1" nextAc="seek">
-              <p:cTn id="2" dur="indefinite" nodeType="mainSeq">
-                <p:childTnLst>
-                  <p:par>
-                    <p:cTn id="3" fill="hold">
-                      <p:stCondLst>
-                        <p:cond delay="indefinite"/>
-                      </p:stCondLst>
-                      <p:childTnLst>
-                        <p:par>
-                          <p:cTn id="4" fill="hold">
-                            <p:stCondLst>
-                              <p:cond delay="0"/>
-                            </p:stCondLst>
-                            <p:childTnLst>
-                              <p:par>
-                                <p:cTn id="5" presetID="1" presetClass="entr" presetSubtype="0" fill="hold" nodeType="clickEffect">
-                                  <p:stCondLst>
-                                    <p:cond delay="0"/>
-                                  </p:stCondLst>
-                                  <p:childTnLst>
-                                    <p:set>
-                                      <p:cBhvr>
-                                        <p:cTn id="6" dur="1" fill="hold">
-                                          <p:stCondLst>
-                                            <p:cond delay="0"/>
-                                          </p:stCondLst>
-                                        </p:cTn>
-                                        <p:tgtEl>
-                                          <p:spTgt spid="4">
-                                            <p:txEl>
-                                              <p:pRg st="0" end="0"/>
-                                            </p:txEl>
-                                          </p:spTgt>
-                                        </p:tgtEl>
-                                        <p:attrNameLst>
-                                          <p:attrName>style.visibility</p:attrName>
-                                        </p:attrNameLst>
-                                      </p:cBhvr>
-                                      <p:to>
-                                        <p:strVal val="visible"/>
-                                      </p:to>
-                                    </p:set>
-                                  </p:childTnLst>
-                                </p:cTn>
-                              </p:par>
-                            </p:childTnLst>
-                          </p:cTn>
-                        </p:par>
-                      </p:childTnLst>
-                    </p:cTn>
-                  </p:par>
-                </p:childTnLst>
-              </p:cTn>
-              <p:prevCondLst>
-                <p:cond evt="onPrev" delay="0">
-                  <p:tgtEl>
-                    <p:sldTgt/>
-                  </p:tgtEl>
-                </p:cond>
-              </p:prevCondLst>
-              <p:nextCondLst>
-                <p:cond evt="onNext" delay="0">
-                  <p:tgtEl>
-                    <p:sldTgt/>
-                  </p:tgtEl>
-                </p:cond>
-              </p:nextCondLst>
-            </p:seq>
-          </p:childTnLst>
-        </p:cTn>
+        <p:cTn id="1" dur="indefinite" restart="never" nodeType="tmRoot"/>
       </p:par>
     </p:tnLst>
   </p:timing>
@@ -9198,79 +9128,7 @@
   <p:timing>
     <p:tnLst>
       <p:par>
-        <p:cTn id="1" dur="indefinite" restart="never" nodeType="tmRoot">
-          <p:childTnLst>
-            <p:seq concurrent="1" nextAc="seek">
-              <p:cTn id="2" dur="indefinite" nodeType="mainSeq">
-                <p:childTnLst>
-                  <p:par>
-                    <p:cTn id="3" fill="hold">
-                      <p:stCondLst>
-                        <p:cond delay="indefinite"/>
-                      </p:stCondLst>
-                      <p:childTnLst>
-                        <p:par>
-                          <p:cTn id="4" fill="hold">
-                            <p:stCondLst>
-                              <p:cond delay="0"/>
-                            </p:stCondLst>
-                            <p:childTnLst>
-                              <p:par>
-                                <p:cTn id="5" presetID="1" presetClass="entr" presetSubtype="0" fill="hold" nodeType="clickEffect">
-                                  <p:stCondLst>
-                                    <p:cond delay="0"/>
-                                  </p:stCondLst>
-                                  <p:childTnLst>
-                                    <p:set>
-                                      <p:cBhvr>
-                                        <p:cTn id="6" dur="1" fill="hold">
-                                          <p:stCondLst>
-                                            <p:cond delay="0"/>
-                                          </p:stCondLst>
-                                        </p:cTn>
-                                        <p:tgtEl>
-                                          <p:spTgt spid="4">
-                                            <p:txEl>
-                                              <p:pRg st="0" end="0"/>
-                                            </p:txEl>
-                                          </p:spTgt>
-                                        </p:tgtEl>
-                                        <p:attrNameLst>
-                                          <p:attrName>style.visibility</p:attrName>
-                                        </p:attrNameLst>
-                                      </p:cBhvr>
-                                      <p:to>
-                                        <p:strVal val="visible"/>
-                                      </p:to>
-                                    </p:set>
-                                  </p:childTnLst>
-                                </p:cTn>
-                              </p:par>
-                            </p:childTnLst>
-                          </p:cTn>
-                        </p:par>
-                      </p:childTnLst>
-                    </p:cTn>
-                  </p:par>
-                </p:childTnLst>
-              </p:cTn>
-              <p:prevCondLst>
-                <p:cond evt="onPrev" delay="0">
-                  <p:tgtEl>
-                    <p:sldTgt/>
-                  </p:tgtEl>
-                </p:cond>
-              </p:prevCondLst>
-              <p:nextCondLst>
-                <p:cond evt="onNext" delay="0">
-                  <p:tgtEl>
-                    <p:sldTgt/>
-                  </p:tgtEl>
-                </p:cond>
-              </p:nextCondLst>
-            </p:seq>
-          </p:childTnLst>
-        </p:cTn>
+        <p:cTn id="1" dur="indefinite" restart="never" nodeType="tmRoot"/>
       </p:par>
     </p:tnLst>
   </p:timing>
@@ -9353,30 +9211,6 @@
               <a:rPr lang="en-US" sz="2000" dirty="0" smtClean="0"/>
               <a:t>.</a:t>
             </a:r>
-          </a:p>
-          <a:p>
-            <a:r>
-              <a:rPr lang="en-US" dirty="0" smtClean="0"/>
-              <a:t>Event 5</a:t>
-            </a:r>
-          </a:p>
-          <a:p>
-            <a:pPr lvl="1"/>
-            <a:r>
-              <a:rPr lang="en-US" dirty="0" smtClean="0"/>
-              <a:t>When the Y values are valid, a small delay occurs while the flip flops register their new inputs, denoted </a:t>
-            </a:r>
-            <a:r>
-              <a:rPr lang="en-US" dirty="0" err="1" smtClean="0"/>
-              <a:t>Tsu</a:t>
-            </a:r>
-            <a:r>
-              <a:rPr lang="en-US" dirty="0" smtClean="0"/>
-              <a:t>. After this setup time, the FSM is ready for another clock edge.</a:t>
-            </a:r>
-            <a:br>
-              <a:rPr lang="en-US" dirty="0" smtClean="0"/>
-            </a:br>
             <a:endParaRPr lang="en-US" b="0" dirty="0"/>
           </a:p>
         </p:txBody>
@@ -9477,177 +9311,7 @@
   <p:timing>
     <p:tnLst>
       <p:par>
-        <p:cTn id="1" dur="indefinite" restart="never" nodeType="tmRoot">
-          <p:childTnLst>
-            <p:seq concurrent="1" nextAc="seek">
-              <p:cTn id="2" dur="indefinite" nodeType="mainSeq">
-                <p:childTnLst>
-                  <p:par>
-                    <p:cTn id="3" fill="hold">
-                      <p:stCondLst>
-                        <p:cond delay="indefinite"/>
-                      </p:stCondLst>
-                      <p:childTnLst>
-                        <p:par>
-                          <p:cTn id="4" fill="hold">
-                            <p:stCondLst>
-                              <p:cond delay="0"/>
-                            </p:stCondLst>
-                            <p:childTnLst>
-                              <p:par>
-                                <p:cTn id="5" presetID="1" presetClass="entr" presetSubtype="0" fill="hold" nodeType="clickEffect">
-                                  <p:stCondLst>
-                                    <p:cond delay="0"/>
-                                  </p:stCondLst>
-                                  <p:childTnLst>
-                                    <p:set>
-                                      <p:cBhvr>
-                                        <p:cTn id="6" dur="1" fill="hold">
-                                          <p:stCondLst>
-                                            <p:cond delay="0"/>
-                                          </p:stCondLst>
-                                        </p:cTn>
-                                        <p:tgtEl>
-                                          <p:spTgt spid="4">
-                                            <p:txEl>
-                                              <p:pRg st="0" end="0"/>
-                                            </p:txEl>
-                                          </p:spTgt>
-                                        </p:tgtEl>
-                                        <p:attrNameLst>
-                                          <p:attrName>style.visibility</p:attrName>
-                                        </p:attrNameLst>
-                                      </p:cBhvr>
-                                      <p:to>
-                                        <p:strVal val="visible"/>
-                                      </p:to>
-                                    </p:set>
-                                  </p:childTnLst>
-                                </p:cTn>
-                              </p:par>
-                            </p:childTnLst>
-                          </p:cTn>
-                        </p:par>
-                      </p:childTnLst>
-                    </p:cTn>
-                  </p:par>
-                  <p:par>
-                    <p:cTn id="7" fill="hold">
-                      <p:stCondLst>
-                        <p:cond delay="indefinite"/>
-                      </p:stCondLst>
-                      <p:childTnLst>
-                        <p:par>
-                          <p:cTn id="8" fill="hold">
-                            <p:stCondLst>
-                              <p:cond delay="0"/>
-                            </p:stCondLst>
-                            <p:childTnLst>
-                              <p:par>
-                                <p:cTn id="9" presetID="1" presetClass="entr" presetSubtype="0" fill="hold" nodeType="clickEffect">
-                                  <p:stCondLst>
-                                    <p:cond delay="0"/>
-                                  </p:stCondLst>
-                                  <p:childTnLst>
-                                    <p:set>
-                                      <p:cBhvr>
-                                        <p:cTn id="10" dur="1" fill="hold">
-                                          <p:stCondLst>
-                                            <p:cond delay="0"/>
-                                          </p:stCondLst>
-                                        </p:cTn>
-                                        <p:tgtEl>
-                                          <p:spTgt spid="4">
-                                            <p:txEl>
-                                              <p:pRg st="1" end="1"/>
-                                            </p:txEl>
-                                          </p:spTgt>
-                                        </p:tgtEl>
-                                        <p:attrNameLst>
-                                          <p:attrName>style.visibility</p:attrName>
-                                        </p:attrNameLst>
-                                      </p:cBhvr>
-                                      <p:to>
-                                        <p:strVal val="visible"/>
-                                      </p:to>
-                                    </p:set>
-                                  </p:childTnLst>
-                                </p:cTn>
-                              </p:par>
-                            </p:childTnLst>
-                          </p:cTn>
-                        </p:par>
-                      </p:childTnLst>
-                    </p:cTn>
-                  </p:par>
-                  <p:par>
-                    <p:cTn id="11" fill="hold">
-                      <p:stCondLst>
-                        <p:cond delay="indefinite"/>
-                      </p:stCondLst>
-                      <p:childTnLst>
-                        <p:par>
-                          <p:cTn id="12" fill="hold">
-                            <p:stCondLst>
-                              <p:cond delay="0"/>
-                            </p:stCondLst>
-                            <p:childTnLst>
-                              <p:par>
-                                <p:cTn id="13" presetID="1" presetClass="entr" presetSubtype="0" fill="hold" nodeType="clickEffect">
-                                  <p:stCondLst>
-                                    <p:cond delay="0"/>
-                                  </p:stCondLst>
-                                  <p:childTnLst>
-                                    <p:set>
-                                      <p:cBhvr>
-                                        <p:cTn id="14" dur="1" fill="hold">
-                                          <p:stCondLst>
-                                            <p:cond delay="0"/>
-                                          </p:stCondLst>
-                                        </p:cTn>
-                                        <p:tgtEl>
-                                          <p:spTgt spid="4">
-                                            <p:txEl>
-                                              <p:pRg st="2" end="2"/>
-                                            </p:txEl>
-                                          </p:spTgt>
-                                        </p:tgtEl>
-                                        <p:attrNameLst>
-                                          <p:attrName>style.visibility</p:attrName>
-                                        </p:attrNameLst>
-                                      </p:cBhvr>
-                                      <p:to>
-                                        <p:strVal val="visible"/>
-                                      </p:to>
-                                    </p:set>
-                                  </p:childTnLst>
-                                </p:cTn>
-                              </p:par>
-                            </p:childTnLst>
-                          </p:cTn>
-                        </p:par>
-                      </p:childTnLst>
-                    </p:cTn>
-                  </p:par>
-                </p:childTnLst>
-              </p:cTn>
-              <p:prevCondLst>
-                <p:cond evt="onPrev" delay="0">
-                  <p:tgtEl>
-                    <p:sldTgt/>
-                  </p:tgtEl>
-                </p:cond>
-              </p:prevCondLst>
-              <p:nextCondLst>
-                <p:cond evt="onNext" delay="0">
-                  <p:tgtEl>
-                    <p:sldTgt/>
-                  </p:tgtEl>
-                </p:cond>
-              </p:nextCondLst>
-            </p:seq>
-          </p:childTnLst>
-        </p:cTn>
+        <p:cTn id="1" dur="indefinite" restart="never" nodeType="tmRoot"/>
       </p:par>
     </p:tnLst>
   </p:timing>
@@ -9833,79 +9497,7 @@
   <p:timing>
     <p:tnLst>
       <p:par>
-        <p:cTn id="1" dur="indefinite" restart="never" nodeType="tmRoot">
-          <p:childTnLst>
-            <p:seq concurrent="1" nextAc="seek">
-              <p:cTn id="2" dur="indefinite" nodeType="mainSeq">
-                <p:childTnLst>
-                  <p:par>
-                    <p:cTn id="3" fill="hold">
-                      <p:stCondLst>
-                        <p:cond delay="indefinite"/>
-                      </p:stCondLst>
-                      <p:childTnLst>
-                        <p:par>
-                          <p:cTn id="4" fill="hold">
-                            <p:stCondLst>
-                              <p:cond delay="0"/>
-                            </p:stCondLst>
-                            <p:childTnLst>
-                              <p:par>
-                                <p:cTn id="5" presetID="1" presetClass="entr" presetSubtype="0" fill="hold" nodeType="clickEffect">
-                                  <p:stCondLst>
-                                    <p:cond delay="0"/>
-                                  </p:stCondLst>
-                                  <p:childTnLst>
-                                    <p:set>
-                                      <p:cBhvr>
-                                        <p:cTn id="6" dur="1" fill="hold">
-                                          <p:stCondLst>
-                                            <p:cond delay="0"/>
-                                          </p:stCondLst>
-                                        </p:cTn>
-                                        <p:tgtEl>
-                                          <p:spTgt spid="4">
-                                            <p:txEl>
-                                              <p:pRg st="0" end="0"/>
-                                            </p:txEl>
-                                          </p:spTgt>
-                                        </p:tgtEl>
-                                        <p:attrNameLst>
-                                          <p:attrName>style.visibility</p:attrName>
-                                        </p:attrNameLst>
-                                      </p:cBhvr>
-                                      <p:to>
-                                        <p:strVal val="visible"/>
-                                      </p:to>
-                                    </p:set>
-                                  </p:childTnLst>
-                                </p:cTn>
-                              </p:par>
-                            </p:childTnLst>
-                          </p:cTn>
-                        </p:par>
-                      </p:childTnLst>
-                    </p:cTn>
-                  </p:par>
-                </p:childTnLst>
-              </p:cTn>
-              <p:prevCondLst>
-                <p:cond evt="onPrev" delay="0">
-                  <p:tgtEl>
-                    <p:sldTgt/>
-                  </p:tgtEl>
-                </p:cond>
-              </p:prevCondLst>
-              <p:nextCondLst>
-                <p:cond evt="onNext" delay="0">
-                  <p:tgtEl>
-                    <p:sldTgt/>
-                  </p:tgtEl>
-                </p:cond>
-              </p:nextCondLst>
-            </p:seq>
-          </p:childTnLst>
-        </p:cTn>
+        <p:cTn id="1" dur="indefinite" restart="never" nodeType="tmRoot"/>
       </p:par>
     </p:tnLst>
   </p:timing>
@@ -10097,13 +9689,87 @@
           <a:lstStyle/>
           <a:p>
             <a:r>
-              <a:rPr lang="en-US" b="0" u="sng" dirty="0" smtClean="0"/>
-              <a:t>Step 1</a:t>
+              <a:rPr lang="en-US" u="sng" dirty="0" smtClean="0"/>
+              <a:t>D</a:t>
             </a:r>
             <a:r>
               <a:rPr lang="en-US" b="0" dirty="0" smtClean="0"/>
-              <a:t> - Gate1 is lifted allowing cow A to enter the chute.</a:t>
-            </a:r>
+              <a:t>airy </a:t>
+            </a:r>
+            <a:r>
+              <a:rPr lang="en-US" u="sng" dirty="0" smtClean="0"/>
+              <a:t>A</a:t>
+            </a:r>
+            <a:r>
+              <a:rPr lang="en-US" b="0" dirty="0" smtClean="0"/>
+              <a:t>utomated </a:t>
+            </a:r>
+            <a:r>
+              <a:rPr lang="en-US" u="sng" dirty="0" smtClean="0"/>
+              <a:t>I</a:t>
+            </a:r>
+            <a:r>
+              <a:rPr lang="en-US" b="0" dirty="0" smtClean="0"/>
+              <a:t>nformation </a:t>
+            </a:r>
+            <a:r>
+              <a:rPr lang="en-US" u="sng" dirty="0" smtClean="0"/>
+              <a:t>Sy</a:t>
+            </a:r>
+            <a:r>
+              <a:rPr lang="en-US" b="0" dirty="0" smtClean="0"/>
+              <a:t>stem, or DAISY for short</a:t>
+            </a:r>
+          </a:p>
+          <a:p>
+            <a:r>
+              <a:rPr lang="en-US" dirty="0"/>
+              <a:t>Word Statement</a:t>
+            </a:r>
+            <a:r>
+              <a:rPr lang="en-US" b="0" dirty="0"/>
+              <a:t> Cows have a RFID tag attached to their collars. When the cow passes through the cattle chute on their way into the barn, a RFID reader reads the unique ID stored on the RFID tag and logs the cow into the barn. </a:t>
+            </a:r>
+            <a:endParaRPr lang="en-US" b="0" dirty="0" smtClean="0"/>
+          </a:p>
+          <a:p>
+            <a:pPr lvl="1"/>
+            <a:r>
+              <a:rPr lang="en-US" sz="2000" b="0" dirty="0"/>
+              <a:t>The RFID system outputs a single bit: a 1 means the system has read an RFID tag and has successfully checked a cow back into the barn; a 0 means the RFID system is either still processing a tag or is not currently reading a tag</a:t>
+            </a:r>
+            <a:r>
+              <a:rPr lang="en-US" sz="2000" b="0" dirty="0" smtClean="0"/>
+              <a:t>.</a:t>
+            </a:r>
+          </a:p>
+          <a:p>
+            <a:pPr lvl="1"/>
+            <a:r>
+              <a:rPr lang="en-US" sz="2000" b="0" dirty="0"/>
+              <a:t>The RFID system outputs a single bit: </a:t>
+            </a:r>
+          </a:p>
+          <a:p>
+            <a:pPr lvl="2"/>
+            <a:r>
+              <a:rPr lang="en-US" sz="2000" b="0" dirty="0"/>
+              <a:t>Logic 1 – Cow Checked In</a:t>
+            </a:r>
+          </a:p>
+          <a:p>
+            <a:pPr lvl="2"/>
+            <a:r>
+              <a:rPr lang="en-US" sz="2000" b="0" dirty="0"/>
+              <a:t>Logic 0 – Cow Not Processed</a:t>
+            </a:r>
+          </a:p>
+          <a:p>
+            <a:pPr lvl="1"/>
+            <a:endParaRPr lang="en-US" b="0" dirty="0" smtClean="0"/>
+          </a:p>
+          <a:p>
+            <a:endParaRPr lang="en-US" b="0" dirty="0" smtClean="0"/>
           </a:p>
         </p:txBody>
       </p:sp>
@@ -10149,45 +9815,6 @@
           </a:p>
         </p:txBody>
       </p:sp>
-      <p:pic>
-        <p:nvPicPr>
-          <p:cNvPr id="6146" name="Picture 2" descr="http://ece.ninja/383/lecture/img/lecture09-2.gif"/>
-          <p:cNvPicPr>
-            <a:picLocks noChangeAspect="1" noChangeArrowheads="1"/>
-          </p:cNvPicPr>
-          <p:nvPr/>
-        </p:nvPicPr>
-        <p:blipFill rotWithShape="1">
-          <a:blip r:embed="rId2">
-            <a:extLst>
-              <a:ext uri="{28A0092B-C50C-407E-A947-70E740481C1C}">
-                <a14:useLocalDpi xmlns:a14="http://schemas.microsoft.com/office/drawing/2010/main" val="0"/>
-              </a:ext>
-            </a:extLst>
-          </a:blip>
-          <a:srcRect b="70401"/>
-          <a:stretch/>
-        </p:blipFill>
-        <p:spPr bwMode="auto">
-          <a:xfrm>
-            <a:off x="1492250" y="2704922"/>
-            <a:ext cx="6159501" cy="1448156"/>
-          </a:xfrm>
-          <a:prstGeom prst="rect">
-            <a:avLst/>
-          </a:prstGeom>
-          <a:noFill/>
-          <a:extLst>
-            <a:ext uri="{909E8E84-426E-40DD-AFC4-6F175D3DCCD1}">
-              <a14:hiddenFill xmlns:a14="http://schemas.microsoft.com/office/drawing/2010/main">
-                <a:solidFill>
-                  <a:srgbClr val="FFFFFF"/>
-                </a:solidFill>
-              </a14:hiddenFill>
-            </a:ext>
-          </a:extLst>
-        </p:spPr>
-      </p:pic>
     </p:spTree>
     <p:extLst>
       <p:ext uri="{BB962C8B-B14F-4D97-AF65-F5344CB8AC3E}">
@@ -10234,7 +9861,69 @@
                                         <p:tgtEl>
                                           <p:spTgt spid="4">
                                             <p:txEl>
-                                              <p:pRg st="0" end="0"/>
+                                              <p:pRg st="3" end="3"/>
+                                            </p:txEl>
+                                          </p:spTgt>
+                                        </p:tgtEl>
+                                        <p:attrNameLst>
+                                          <p:attrName>style.visibility</p:attrName>
+                                        </p:attrNameLst>
+                                      </p:cBhvr>
+                                      <p:to>
+                                        <p:strVal val="visible"/>
+                                      </p:to>
+                                    </p:set>
+                                  </p:childTnLst>
+                                </p:cTn>
+                              </p:par>
+                              <p:par>
+                                <p:cTn id="7" presetID="1" presetClass="entr" presetSubtype="0" fill="hold" nodeType="withEffect">
+                                  <p:stCondLst>
+                                    <p:cond delay="0"/>
+                                  </p:stCondLst>
+                                  <p:childTnLst>
+                                    <p:set>
+                                      <p:cBhvr>
+                                        <p:cTn id="8" dur="1" fill="hold">
+                                          <p:stCondLst>
+                                            <p:cond delay="0"/>
+                                          </p:stCondLst>
+                                        </p:cTn>
+                                        <p:tgtEl>
+                                          <p:spTgt spid="4">
+                                            <p:txEl>
+                                              <p:pRg st="4" end="4"/>
+                                            </p:txEl>
+                                          </p:spTgt>
+                                        </p:tgtEl>
+                                        <p:attrNameLst>
+                                          <p:attrName>style.visibility</p:attrName>
+                                        </p:attrNameLst>
+                                      </p:cBhvr>
+                                      <p:to>
+                                        <p:strVal val="visible"/>
+                                      </p:to>
+                                    </p:set>
+                                  </p:childTnLst>
+                                </p:cTn>
+                              </p:par>
+                              <p:par>
+                                <p:cTn id="9" presetID="1" presetClass="entr" presetSubtype="0" fill="hold" nodeType="withEffect">
+                                  <p:stCondLst>
+                                    <p:cond delay="0"/>
+                                  </p:stCondLst>
+                                  <p:childTnLst>
+                                    <p:set>
+                                      <p:cBhvr>
+                                        <p:cTn id="10" dur="1" fill="hold">
+                                          <p:stCondLst>
+                                            <p:cond delay="0"/>
+                                          </p:stCondLst>
+                                        </p:cTn>
+                                        <p:tgtEl>
+                                          <p:spTgt spid="4">
+                                            <p:txEl>
+                                              <p:pRg st="5" end="5"/>
                                             </p:txEl>
                                           </p:spTgt>
                                         </p:tgtEl>
@@ -10345,13 +10034,44 @@
           <a:lstStyle/>
           <a:p>
             <a:r>
-              <a:rPr lang="en-US" b="0" u="sng" dirty="0" smtClean="0"/>
-              <a:t>Step 2</a:t>
-            </a:r>
-            <a:r>
               <a:rPr lang="en-US" b="0" dirty="0" smtClean="0"/>
-              <a:t> - The DAISY system has detected cow A is in the chute and closes gate1.</a:t>
-            </a:r>
+              <a:t>In </a:t>
+            </a:r>
+            <a:r>
+              <a:rPr lang="en-US" b="0" dirty="0"/>
+              <a:t>order to ensure each cow is scanned, the flow of cows into the barn is controlled by two gates at either end of the chute. Each gate is controlled by a single bit. To lift a gate, this input must be held at logic 1; to lower a gate, the input must be held at a logic 0. The sequence of raising and lowering the gates in order to control the flow of </a:t>
+            </a:r>
+            <a:r>
+              <a:rPr lang="en-US" b="0" dirty="0" smtClean="0"/>
+              <a:t>cows.</a:t>
+            </a:r>
+          </a:p>
+          <a:p>
+            <a:pPr lvl="1"/>
+            <a:r>
+              <a:rPr lang="en-US" b="0" dirty="0"/>
+              <a:t>Flow of cows is controlled by two gates</a:t>
+            </a:r>
+          </a:p>
+          <a:p>
+            <a:pPr lvl="2"/>
+            <a:r>
+              <a:rPr lang="en-US" sz="2000" b="0" dirty="0"/>
+              <a:t>Logic 1 – To lift a gate </a:t>
+            </a:r>
+          </a:p>
+          <a:p>
+            <a:pPr lvl="2"/>
+            <a:r>
+              <a:rPr lang="en-US" sz="2000" b="0" dirty="0"/>
+              <a:t>Logic 0 – To lower a gate</a:t>
+            </a:r>
+          </a:p>
+          <a:p>
+            <a:pPr marL="0" indent="0">
+              <a:buNone/>
+            </a:pPr>
+            <a:endParaRPr lang="en-US" b="0" dirty="0" smtClean="0"/>
           </a:p>
         </p:txBody>
       </p:sp>
@@ -10397,49 +10117,10 @@
           </a:p>
         </p:txBody>
       </p:sp>
-      <p:pic>
-        <p:nvPicPr>
-          <p:cNvPr id="6146" name="Picture 2" descr="http://ece.ninja/383/lecture/img/lecture09-2.gif"/>
-          <p:cNvPicPr>
-            <a:picLocks noChangeAspect="1" noChangeArrowheads="1"/>
-          </p:cNvPicPr>
-          <p:nvPr/>
-        </p:nvPicPr>
-        <p:blipFill rotWithShape="1">
-          <a:blip r:embed="rId2">
-            <a:extLst>
-              <a:ext uri="{28A0092B-C50C-407E-A947-70E740481C1C}">
-                <a14:useLocalDpi xmlns:a14="http://schemas.microsoft.com/office/drawing/2010/main" val="0"/>
-              </a:ext>
-            </a:extLst>
-          </a:blip>
-          <a:srcRect t="28907" b="47904"/>
-          <a:stretch/>
-        </p:blipFill>
-        <p:spPr bwMode="auto">
-          <a:xfrm>
-            <a:off x="1492250" y="2861733"/>
-            <a:ext cx="6159501" cy="1134534"/>
-          </a:xfrm>
-          <a:prstGeom prst="rect">
-            <a:avLst/>
-          </a:prstGeom>
-          <a:noFill/>
-          <a:extLst>
-            <a:ext uri="{909E8E84-426E-40DD-AFC4-6F175D3DCCD1}">
-              <a14:hiddenFill xmlns:a14="http://schemas.microsoft.com/office/drawing/2010/main">
-                <a:solidFill>
-                  <a:srgbClr val="FFFFFF"/>
-                </a:solidFill>
-              </a14:hiddenFill>
-            </a:ext>
-          </a:extLst>
-        </p:spPr>
-      </p:pic>
     </p:spTree>
     <p:extLst>
       <p:ext uri="{BB962C8B-B14F-4D97-AF65-F5344CB8AC3E}">
-        <p14:creationId xmlns:p14="http://schemas.microsoft.com/office/powerpoint/2010/main" val="2629738120"/>
+        <p14:creationId xmlns:p14="http://schemas.microsoft.com/office/powerpoint/2010/main" val="2258443384"/>
       </p:ext>
     </p:extLst>
   </p:cSld>
@@ -10482,7 +10163,69 @@
                                         <p:tgtEl>
                                           <p:spTgt spid="4">
                                             <p:txEl>
-                                              <p:pRg st="0" end="0"/>
+                                              <p:pRg st="1" end="1"/>
+                                            </p:txEl>
+                                          </p:spTgt>
+                                        </p:tgtEl>
+                                        <p:attrNameLst>
+                                          <p:attrName>style.visibility</p:attrName>
+                                        </p:attrNameLst>
+                                      </p:cBhvr>
+                                      <p:to>
+                                        <p:strVal val="visible"/>
+                                      </p:to>
+                                    </p:set>
+                                  </p:childTnLst>
+                                </p:cTn>
+                              </p:par>
+                              <p:par>
+                                <p:cTn id="7" presetID="1" presetClass="entr" presetSubtype="0" fill="hold" nodeType="withEffect">
+                                  <p:stCondLst>
+                                    <p:cond delay="0"/>
+                                  </p:stCondLst>
+                                  <p:childTnLst>
+                                    <p:set>
+                                      <p:cBhvr>
+                                        <p:cTn id="8" dur="1" fill="hold">
+                                          <p:stCondLst>
+                                            <p:cond delay="0"/>
+                                          </p:stCondLst>
+                                        </p:cTn>
+                                        <p:tgtEl>
+                                          <p:spTgt spid="4">
+                                            <p:txEl>
+                                              <p:pRg st="2" end="2"/>
+                                            </p:txEl>
+                                          </p:spTgt>
+                                        </p:tgtEl>
+                                        <p:attrNameLst>
+                                          <p:attrName>style.visibility</p:attrName>
+                                        </p:attrNameLst>
+                                      </p:cBhvr>
+                                      <p:to>
+                                        <p:strVal val="visible"/>
+                                      </p:to>
+                                    </p:set>
+                                  </p:childTnLst>
+                                </p:cTn>
+                              </p:par>
+                              <p:par>
+                                <p:cTn id="9" presetID="1" presetClass="entr" presetSubtype="0" fill="hold" nodeType="withEffect">
+                                  <p:stCondLst>
+                                    <p:cond delay="0"/>
+                                  </p:stCondLst>
+                                  <p:childTnLst>
+                                    <p:set>
+                                      <p:cBhvr>
+                                        <p:cTn id="10" dur="1" fill="hold">
+                                          <p:stCondLst>
+                                            <p:cond delay="0"/>
+                                          </p:stCondLst>
+                                        </p:cTn>
+                                        <p:tgtEl>
+                                          <p:spTgt spid="4">
+                                            <p:txEl>
+                                              <p:pRg st="3" end="3"/>
                                             </p:txEl>
                                           </p:spTgt>
                                         </p:tgtEl>
@@ -10594,11 +10337,11 @@
           <a:p>
             <a:r>
               <a:rPr lang="en-US" b="0" u="sng" dirty="0" smtClean="0"/>
-              <a:t>Step 3</a:t>
+              <a:t>Step 1</a:t>
             </a:r>
             <a:r>
               <a:rPr lang="en-US" b="0" dirty="0" smtClean="0"/>
-              <a:t> - The cow waits in the closed off chute until the RFID reader signals that it has read the tag and checked in cow A.</a:t>
+              <a:t> - Gate1 is lifted allowing cow A to enter the chute.</a:t>
             </a:r>
           </a:p>
         </p:txBody>
@@ -10636,6 +10379,358 @@
                 <a:defRPr/>
               </a:pPr>
               <a:t>17</a:t>
+            </a:fld>
+            <a:endParaRPr lang="en-US" dirty="0">
+              <a:solidFill>
+                <a:srgbClr val="000000"/>
+              </a:solidFill>
+            </a:endParaRPr>
+          </a:p>
+        </p:txBody>
+      </p:sp>
+      <p:pic>
+        <p:nvPicPr>
+          <p:cNvPr id="6146" name="Picture 2" descr="http://ece.ninja/383/lecture/img/lecture09-2.gif"/>
+          <p:cNvPicPr>
+            <a:picLocks noChangeAspect="1" noChangeArrowheads="1"/>
+          </p:cNvPicPr>
+          <p:nvPr/>
+        </p:nvPicPr>
+        <p:blipFill rotWithShape="1">
+          <a:blip r:embed="rId2">
+            <a:extLst>
+              <a:ext uri="{28A0092B-C50C-407E-A947-70E740481C1C}">
+                <a14:useLocalDpi xmlns:a14="http://schemas.microsoft.com/office/drawing/2010/main" val="0"/>
+              </a:ext>
+            </a:extLst>
+          </a:blip>
+          <a:srcRect b="70401"/>
+          <a:stretch/>
+        </p:blipFill>
+        <p:spPr bwMode="auto">
+          <a:xfrm>
+            <a:off x="1492250" y="2704922"/>
+            <a:ext cx="6159501" cy="1448156"/>
+          </a:xfrm>
+          <a:prstGeom prst="rect">
+            <a:avLst/>
+          </a:prstGeom>
+          <a:noFill/>
+          <a:extLst>
+            <a:ext uri="{909E8E84-426E-40DD-AFC4-6F175D3DCCD1}">
+              <a14:hiddenFill xmlns:a14="http://schemas.microsoft.com/office/drawing/2010/main">
+                <a:solidFill>
+                  <a:srgbClr val="FFFFFF"/>
+                </a:solidFill>
+              </a14:hiddenFill>
+            </a:ext>
+          </a:extLst>
+        </p:spPr>
+      </p:pic>
+    </p:spTree>
+    <p:extLst>
+      <p:ext uri="{BB962C8B-B14F-4D97-AF65-F5344CB8AC3E}">
+        <p14:creationId xmlns:p14="http://schemas.microsoft.com/office/powerpoint/2010/main" val="2867916628"/>
+      </p:ext>
+    </p:extLst>
+  </p:cSld>
+  <p:clrMapOvr>
+    <a:masterClrMapping/>
+  </p:clrMapOvr>
+  <p:timing>
+    <p:tnLst>
+      <p:par>
+        <p:cTn id="1" dur="indefinite" restart="never" nodeType="tmRoot"/>
+      </p:par>
+    </p:tnLst>
+  </p:timing>
+</p:sld>
+</file>
+
+<file path=ppt/slides/slide18.xml><?xml version="1.0" encoding="utf-8"?>
+<p:sld xmlns:a="http://schemas.openxmlformats.org/drawingml/2006/main" xmlns:r="http://schemas.openxmlformats.org/officeDocument/2006/relationships" xmlns:p="http://schemas.openxmlformats.org/presentationml/2006/main">
+  <p:cSld>
+    <p:spTree>
+      <p:nvGrpSpPr>
+        <p:cNvPr id="1" name=""/>
+        <p:cNvGrpSpPr/>
+        <p:nvPr/>
+      </p:nvGrpSpPr>
+      <p:grpSpPr>
+        <a:xfrm>
+          <a:off x="0" y="0"/>
+          <a:ext cx="0" cy="0"/>
+          <a:chOff x="0" y="0"/>
+          <a:chExt cx="0" cy="0"/>
+        </a:xfrm>
+      </p:grpSpPr>
+      <p:sp>
+        <p:nvSpPr>
+          <p:cNvPr id="2" name="Title 1"/>
+          <p:cNvSpPr>
+            <a:spLocks noGrp="1"/>
+          </p:cNvSpPr>
+          <p:nvPr>
+            <p:ph type="title"/>
+          </p:nvPr>
+        </p:nvSpPr>
+        <p:spPr/>
+        <p:txBody>
+          <a:bodyPr/>
+          <a:lstStyle/>
+          <a:p>
+            <a:r>
+              <a:rPr lang="en-US" dirty="0"/>
+              <a:t>The DAISY </a:t>
+            </a:r>
+            <a:r>
+              <a:rPr lang="en-US" dirty="0" smtClean="0"/>
+              <a:t>System</a:t>
+            </a:r>
+            <a:endParaRPr lang="en-US" dirty="0"/>
+          </a:p>
+        </p:txBody>
+      </p:sp>
+      <p:sp>
+        <p:nvSpPr>
+          <p:cNvPr id="4" name="Content Placeholder 3"/>
+          <p:cNvSpPr>
+            <a:spLocks noGrp="1"/>
+          </p:cNvSpPr>
+          <p:nvPr>
+            <p:ph idx="1"/>
+          </p:nvPr>
+        </p:nvSpPr>
+        <p:spPr>
+          <a:xfrm>
+            <a:off x="581736" y="1523052"/>
+            <a:ext cx="8131175" cy="4324350"/>
+          </a:xfrm>
+        </p:spPr>
+        <p:txBody>
+          <a:bodyPr/>
+          <a:lstStyle/>
+          <a:p>
+            <a:r>
+              <a:rPr lang="en-US" b="0" u="sng" dirty="0" smtClean="0"/>
+              <a:t>Step 2</a:t>
+            </a:r>
+            <a:r>
+              <a:rPr lang="en-US" b="0" dirty="0" smtClean="0"/>
+              <a:t> - The DAISY system has detected cow A is in the chute and closes gate1.</a:t>
+            </a:r>
+          </a:p>
+        </p:txBody>
+      </p:sp>
+      <p:sp>
+        <p:nvSpPr>
+          <p:cNvPr id="5" name="Slide Number Placeholder 3"/>
+          <p:cNvSpPr>
+            <a:spLocks noGrp="1"/>
+          </p:cNvSpPr>
+          <p:nvPr>
+            <p:ph type="sldNum" sz="quarter" idx="10"/>
+          </p:nvPr>
+        </p:nvSpPr>
+        <p:spPr>
+          <a:xfrm>
+            <a:off x="6910388" y="6253163"/>
+            <a:ext cx="2133600" cy="476250"/>
+          </a:xfrm>
+        </p:spPr>
+        <p:txBody>
+          <a:bodyPr/>
+          <a:lstStyle/>
+          <a:p>
+            <a:pPr>
+              <a:defRPr/>
+            </a:pPr>
+            <a:fld id="{62D6D4B2-7611-498F-8780-1EDC26277454}" type="slidenum">
+              <a:rPr lang="en-US" smtClean="0">
+                <a:solidFill>
+                  <a:srgbClr val="000000"/>
+                </a:solidFill>
+              </a:rPr>
+              <a:pPr>
+                <a:defRPr/>
+              </a:pPr>
+              <a:t>18</a:t>
+            </a:fld>
+            <a:endParaRPr lang="en-US" dirty="0">
+              <a:solidFill>
+                <a:srgbClr val="000000"/>
+              </a:solidFill>
+            </a:endParaRPr>
+          </a:p>
+        </p:txBody>
+      </p:sp>
+      <p:pic>
+        <p:nvPicPr>
+          <p:cNvPr id="6146" name="Picture 2" descr="http://ece.ninja/383/lecture/img/lecture09-2.gif"/>
+          <p:cNvPicPr>
+            <a:picLocks noChangeAspect="1" noChangeArrowheads="1"/>
+          </p:cNvPicPr>
+          <p:nvPr/>
+        </p:nvPicPr>
+        <p:blipFill rotWithShape="1">
+          <a:blip r:embed="rId2">
+            <a:extLst>
+              <a:ext uri="{28A0092B-C50C-407E-A947-70E740481C1C}">
+                <a14:useLocalDpi xmlns:a14="http://schemas.microsoft.com/office/drawing/2010/main" val="0"/>
+              </a:ext>
+            </a:extLst>
+          </a:blip>
+          <a:srcRect t="28907" b="47904"/>
+          <a:stretch/>
+        </p:blipFill>
+        <p:spPr bwMode="auto">
+          <a:xfrm>
+            <a:off x="1492250" y="2861733"/>
+            <a:ext cx="6159501" cy="1134534"/>
+          </a:xfrm>
+          <a:prstGeom prst="rect">
+            <a:avLst/>
+          </a:prstGeom>
+          <a:noFill/>
+          <a:extLst>
+            <a:ext uri="{909E8E84-426E-40DD-AFC4-6F175D3DCCD1}">
+              <a14:hiddenFill xmlns:a14="http://schemas.microsoft.com/office/drawing/2010/main">
+                <a:solidFill>
+                  <a:srgbClr val="FFFFFF"/>
+                </a:solidFill>
+              </a14:hiddenFill>
+            </a:ext>
+          </a:extLst>
+        </p:spPr>
+      </p:pic>
+    </p:spTree>
+    <p:extLst>
+      <p:ext uri="{BB962C8B-B14F-4D97-AF65-F5344CB8AC3E}">
+        <p14:creationId xmlns:p14="http://schemas.microsoft.com/office/powerpoint/2010/main" val="2629738120"/>
+      </p:ext>
+    </p:extLst>
+  </p:cSld>
+  <p:clrMapOvr>
+    <a:masterClrMapping/>
+  </p:clrMapOvr>
+  <p:timing>
+    <p:tnLst>
+      <p:par>
+        <p:cTn id="1" dur="indefinite" restart="never" nodeType="tmRoot"/>
+      </p:par>
+    </p:tnLst>
+  </p:timing>
+</p:sld>
+</file>
+
+<file path=ppt/slides/slide19.xml><?xml version="1.0" encoding="utf-8"?>
+<p:sld xmlns:a="http://schemas.openxmlformats.org/drawingml/2006/main" xmlns:r="http://schemas.openxmlformats.org/officeDocument/2006/relationships" xmlns:p="http://schemas.openxmlformats.org/presentationml/2006/main">
+  <p:cSld>
+    <p:spTree>
+      <p:nvGrpSpPr>
+        <p:cNvPr id="1" name=""/>
+        <p:cNvGrpSpPr/>
+        <p:nvPr/>
+      </p:nvGrpSpPr>
+      <p:grpSpPr>
+        <a:xfrm>
+          <a:off x="0" y="0"/>
+          <a:ext cx="0" cy="0"/>
+          <a:chOff x="0" y="0"/>
+          <a:chExt cx="0" cy="0"/>
+        </a:xfrm>
+      </p:grpSpPr>
+      <p:sp>
+        <p:nvSpPr>
+          <p:cNvPr id="2" name="Title 1"/>
+          <p:cNvSpPr>
+            <a:spLocks noGrp="1"/>
+          </p:cNvSpPr>
+          <p:nvPr>
+            <p:ph type="title"/>
+          </p:nvPr>
+        </p:nvSpPr>
+        <p:spPr/>
+        <p:txBody>
+          <a:bodyPr/>
+          <a:lstStyle/>
+          <a:p>
+            <a:r>
+              <a:rPr lang="en-US" dirty="0"/>
+              <a:t>The DAISY </a:t>
+            </a:r>
+            <a:r>
+              <a:rPr lang="en-US" dirty="0" smtClean="0"/>
+              <a:t>System</a:t>
+            </a:r>
+            <a:endParaRPr lang="en-US" dirty="0"/>
+          </a:p>
+        </p:txBody>
+      </p:sp>
+      <p:sp>
+        <p:nvSpPr>
+          <p:cNvPr id="4" name="Content Placeholder 3"/>
+          <p:cNvSpPr>
+            <a:spLocks noGrp="1"/>
+          </p:cNvSpPr>
+          <p:nvPr>
+            <p:ph idx="1"/>
+          </p:nvPr>
+        </p:nvSpPr>
+        <p:spPr>
+          <a:xfrm>
+            <a:off x="581736" y="1523052"/>
+            <a:ext cx="8131175" cy="4324350"/>
+          </a:xfrm>
+        </p:spPr>
+        <p:txBody>
+          <a:bodyPr/>
+          <a:lstStyle/>
+          <a:p>
+            <a:r>
+              <a:rPr lang="en-US" b="0" u="sng" dirty="0" smtClean="0"/>
+              <a:t>Step 3</a:t>
+            </a:r>
+            <a:r>
+              <a:rPr lang="en-US" b="0" dirty="0" smtClean="0"/>
+              <a:t> - The cow waits in the closed off chute until the RFID reader signals that it has read the tag and checked in cow A.</a:t>
+            </a:r>
+          </a:p>
+        </p:txBody>
+      </p:sp>
+      <p:sp>
+        <p:nvSpPr>
+          <p:cNvPr id="5" name="Slide Number Placeholder 3"/>
+          <p:cNvSpPr>
+            <a:spLocks noGrp="1"/>
+          </p:cNvSpPr>
+          <p:nvPr>
+            <p:ph type="sldNum" sz="quarter" idx="10"/>
+          </p:nvPr>
+        </p:nvSpPr>
+        <p:spPr>
+          <a:xfrm>
+            <a:off x="6910388" y="6253163"/>
+            <a:ext cx="2133600" cy="476250"/>
+          </a:xfrm>
+        </p:spPr>
+        <p:txBody>
+          <a:bodyPr/>
+          <a:lstStyle/>
+          <a:p>
+            <a:pPr>
+              <a:defRPr/>
+            </a:pPr>
+            <a:fld id="{62D6D4B2-7611-498F-8780-1EDC26277454}" type="slidenum">
+              <a:rPr lang="en-US" smtClean="0">
+                <a:solidFill>
+                  <a:srgbClr val="000000"/>
+                </a:solidFill>
+              </a:rPr>
+              <a:pPr>
+                <a:defRPr/>
+              </a:pPr>
+              <a:t>19</a:t>
             </a:fld>
             <a:endParaRPr lang="en-US" dirty="0">
               <a:solidFill>
@@ -10697,86 +10792,14 @@
   <p:timing>
     <p:tnLst>
       <p:par>
-        <p:cTn id="1" dur="indefinite" restart="never" nodeType="tmRoot">
-          <p:childTnLst>
-            <p:seq concurrent="1" nextAc="seek">
-              <p:cTn id="2" dur="indefinite" nodeType="mainSeq">
-                <p:childTnLst>
-                  <p:par>
-                    <p:cTn id="3" fill="hold">
-                      <p:stCondLst>
-                        <p:cond delay="indefinite"/>
-                      </p:stCondLst>
-                      <p:childTnLst>
-                        <p:par>
-                          <p:cTn id="4" fill="hold">
-                            <p:stCondLst>
-                              <p:cond delay="0"/>
-                            </p:stCondLst>
-                            <p:childTnLst>
-                              <p:par>
-                                <p:cTn id="5" presetID="1" presetClass="entr" presetSubtype="0" fill="hold" nodeType="clickEffect">
-                                  <p:stCondLst>
-                                    <p:cond delay="0"/>
-                                  </p:stCondLst>
-                                  <p:childTnLst>
-                                    <p:set>
-                                      <p:cBhvr>
-                                        <p:cTn id="6" dur="1" fill="hold">
-                                          <p:stCondLst>
-                                            <p:cond delay="0"/>
-                                          </p:stCondLst>
-                                        </p:cTn>
-                                        <p:tgtEl>
-                                          <p:spTgt spid="4">
-                                            <p:txEl>
-                                              <p:pRg st="0" end="0"/>
-                                            </p:txEl>
-                                          </p:spTgt>
-                                        </p:tgtEl>
-                                        <p:attrNameLst>
-                                          <p:attrName>style.visibility</p:attrName>
-                                        </p:attrNameLst>
-                                      </p:cBhvr>
-                                      <p:to>
-                                        <p:strVal val="visible"/>
-                                      </p:to>
-                                    </p:set>
-                                  </p:childTnLst>
-                                </p:cTn>
-                              </p:par>
-                            </p:childTnLst>
-                          </p:cTn>
-                        </p:par>
-                      </p:childTnLst>
-                    </p:cTn>
-                  </p:par>
-                </p:childTnLst>
-              </p:cTn>
-              <p:prevCondLst>
-                <p:cond evt="onPrev" delay="0">
-                  <p:tgtEl>
-                    <p:sldTgt/>
-                  </p:tgtEl>
-                </p:cond>
-              </p:prevCondLst>
-              <p:nextCondLst>
-                <p:cond evt="onNext" delay="0">
-                  <p:tgtEl>
-                    <p:sldTgt/>
-                  </p:tgtEl>
-                </p:cond>
-              </p:nextCondLst>
-            </p:seq>
-          </p:childTnLst>
-        </p:cTn>
+        <p:cTn id="1" dur="indefinite" restart="never" nodeType="tmRoot"/>
       </p:par>
     </p:tnLst>
   </p:timing>
 </p:sld>
 </file>
 
-<file path=ppt/slides/slide18.xml><?xml version="1.0" encoding="utf-8"?>
+<file path=ppt/slides/slide2.xml><?xml version="1.0" encoding="utf-8"?>
 <p:sld xmlns:a="http://schemas.openxmlformats.org/drawingml/2006/main" xmlns:r="http://schemas.openxmlformats.org/officeDocument/2006/relationships" xmlns:p="http://schemas.openxmlformats.org/presentationml/2006/main">
   <p:cSld>
     <p:spTree>
@@ -10809,6 +10832,187 @@
           <a:lstStyle/>
           <a:p>
             <a:r>
+              <a:rPr lang="en-US" dirty="0" smtClean="0"/>
+              <a:t>Lesson Outline</a:t>
+            </a:r>
+            <a:endParaRPr lang="en-US" dirty="0"/>
+          </a:p>
+        </p:txBody>
+      </p:sp>
+      <p:sp>
+        <p:nvSpPr>
+          <p:cNvPr id="4" name="Content Placeholder 3"/>
+          <p:cNvSpPr>
+            <a:spLocks noGrp="1"/>
+          </p:cNvSpPr>
+          <p:nvPr>
+            <p:ph idx="1"/>
+          </p:nvPr>
+        </p:nvSpPr>
+        <p:spPr/>
+        <p:txBody>
+          <a:bodyPr/>
+          <a:lstStyle/>
+          <a:p>
+            <a:pPr marL="514350" indent="-514350" eaLnBrk="1" hangingPunct="1">
+              <a:lnSpc>
+                <a:spcPct val="80000"/>
+              </a:lnSpc>
+              <a:buFont typeface="+mj-lt"/>
+              <a:buAutoNum type="arabicPeriod"/>
+            </a:pPr>
+            <a:r>
+              <a:rPr lang="en-US" sz="2800" dirty="0" smtClean="0"/>
+              <a:t>D Flip Flop</a:t>
+            </a:r>
+          </a:p>
+          <a:p>
+            <a:pPr marL="514350" indent="-514350" eaLnBrk="1" hangingPunct="1">
+              <a:lnSpc>
+                <a:spcPct val="80000"/>
+              </a:lnSpc>
+              <a:buFont typeface="+mj-lt"/>
+              <a:buAutoNum type="arabicPeriod"/>
+            </a:pPr>
+            <a:r>
+              <a:rPr lang="en-US" sz="2800" dirty="0" smtClean="0"/>
+              <a:t>Finite State Machine</a:t>
+            </a:r>
+          </a:p>
+          <a:p>
+            <a:pPr marL="514350" indent="-514350" eaLnBrk="1" hangingPunct="1">
+              <a:lnSpc>
+                <a:spcPct val="80000"/>
+              </a:lnSpc>
+              <a:buFont typeface="+mj-lt"/>
+              <a:buAutoNum type="arabicPeriod"/>
+            </a:pPr>
+            <a:r>
+              <a:rPr lang="en-US" sz="2800" dirty="0" smtClean="0"/>
+              <a:t>FSM Timing</a:t>
+            </a:r>
+          </a:p>
+          <a:p>
+            <a:pPr marL="514350" indent="-514350" eaLnBrk="1" hangingPunct="1">
+              <a:lnSpc>
+                <a:spcPct val="80000"/>
+              </a:lnSpc>
+              <a:buFont typeface="+mj-lt"/>
+              <a:buAutoNum type="arabicPeriod"/>
+            </a:pPr>
+            <a:r>
+              <a:rPr lang="en-US" sz="2800" dirty="0" smtClean="0"/>
+              <a:t>The DAISY System</a:t>
+            </a:r>
+          </a:p>
+          <a:p>
+            <a:pPr eaLnBrk="1" hangingPunct="1">
+              <a:lnSpc>
+                <a:spcPct val="80000"/>
+              </a:lnSpc>
+            </a:pPr>
+            <a:endParaRPr lang="en-US" dirty="0" smtClean="0"/>
+          </a:p>
+          <a:p>
+            <a:endParaRPr lang="en-US" dirty="0"/>
+          </a:p>
+        </p:txBody>
+      </p:sp>
+      <p:sp>
+        <p:nvSpPr>
+          <p:cNvPr id="5" name="Slide Number Placeholder 3"/>
+          <p:cNvSpPr>
+            <a:spLocks noGrp="1"/>
+          </p:cNvSpPr>
+          <p:nvPr>
+            <p:ph type="sldNum" sz="quarter" idx="10"/>
+          </p:nvPr>
+        </p:nvSpPr>
+        <p:spPr>
+          <a:xfrm>
+            <a:off x="6910388" y="6253163"/>
+            <a:ext cx="2133600" cy="476250"/>
+          </a:xfrm>
+        </p:spPr>
+        <p:txBody>
+          <a:bodyPr/>
+          <a:lstStyle/>
+          <a:p>
+            <a:pPr>
+              <a:defRPr/>
+            </a:pPr>
+            <a:fld id="{62D6D4B2-7611-498F-8780-1EDC26277454}" type="slidenum">
+              <a:rPr lang="en-US" smtClean="0">
+                <a:solidFill>
+                  <a:srgbClr val="000000"/>
+                </a:solidFill>
+              </a:rPr>
+              <a:pPr>
+                <a:defRPr/>
+              </a:pPr>
+              <a:t>2</a:t>
+            </a:fld>
+            <a:endParaRPr lang="en-US" dirty="0">
+              <a:solidFill>
+                <a:srgbClr val="000000"/>
+              </a:solidFill>
+            </a:endParaRPr>
+          </a:p>
+        </p:txBody>
+      </p:sp>
+    </p:spTree>
+    <p:extLst>
+      <p:ext uri="{BB962C8B-B14F-4D97-AF65-F5344CB8AC3E}">
+        <p14:creationId xmlns:p14="http://schemas.microsoft.com/office/powerpoint/2010/main" val="3991601210"/>
+      </p:ext>
+    </p:extLst>
+  </p:cSld>
+  <p:clrMapOvr>
+    <a:masterClrMapping/>
+  </p:clrMapOvr>
+  <p:timing>
+    <p:tnLst>
+      <p:par>
+        <p:cTn id="1" dur="indefinite" restart="never" nodeType="tmRoot"/>
+      </p:par>
+    </p:tnLst>
+  </p:timing>
+</p:sld>
+</file>
+
+<file path=ppt/slides/slide20.xml><?xml version="1.0" encoding="utf-8"?>
+<p:sld xmlns:a="http://schemas.openxmlformats.org/drawingml/2006/main" xmlns:r="http://schemas.openxmlformats.org/officeDocument/2006/relationships" xmlns:p="http://schemas.openxmlformats.org/presentationml/2006/main">
+  <p:cSld>
+    <p:spTree>
+      <p:nvGrpSpPr>
+        <p:cNvPr id="1" name=""/>
+        <p:cNvGrpSpPr/>
+        <p:nvPr/>
+      </p:nvGrpSpPr>
+      <p:grpSpPr>
+        <a:xfrm>
+          <a:off x="0" y="0"/>
+          <a:ext cx="0" cy="0"/>
+          <a:chOff x="0" y="0"/>
+          <a:chExt cx="0" cy="0"/>
+        </a:xfrm>
+      </p:grpSpPr>
+      <p:sp>
+        <p:nvSpPr>
+          <p:cNvPr id="2" name="Title 1"/>
+          <p:cNvSpPr>
+            <a:spLocks noGrp="1"/>
+          </p:cNvSpPr>
+          <p:nvPr>
+            <p:ph type="title"/>
+          </p:nvPr>
+        </p:nvSpPr>
+        <p:spPr/>
+        <p:txBody>
+          <a:bodyPr/>
+          <a:lstStyle/>
+          <a:p>
+            <a:r>
               <a:rPr lang="en-US" dirty="0"/>
               <a:t>The DAISY </a:t>
             </a:r>
@@ -10884,7 +11088,7 @@
               <a:pPr>
                 <a:defRPr/>
               </a:pPr>
-              <a:t>18</a:t>
+              <a:t>20</a:t>
             </a:fld>
             <a:endParaRPr lang="en-US" dirty="0">
               <a:solidFill>
@@ -10946,86 +11150,14 @@
   <p:timing>
     <p:tnLst>
       <p:par>
-        <p:cTn id="1" dur="indefinite" restart="never" nodeType="tmRoot">
-          <p:childTnLst>
-            <p:seq concurrent="1" nextAc="seek">
-              <p:cTn id="2" dur="indefinite" nodeType="mainSeq">
-                <p:childTnLst>
-                  <p:par>
-                    <p:cTn id="3" fill="hold">
-                      <p:stCondLst>
-                        <p:cond delay="indefinite"/>
-                      </p:stCondLst>
-                      <p:childTnLst>
-                        <p:par>
-                          <p:cTn id="4" fill="hold">
-                            <p:stCondLst>
-                              <p:cond delay="0"/>
-                            </p:stCondLst>
-                            <p:childTnLst>
-                              <p:par>
-                                <p:cTn id="5" presetID="1" presetClass="entr" presetSubtype="0" fill="hold" nodeType="clickEffect">
-                                  <p:stCondLst>
-                                    <p:cond delay="0"/>
-                                  </p:stCondLst>
-                                  <p:childTnLst>
-                                    <p:set>
-                                      <p:cBhvr>
-                                        <p:cTn id="6" dur="1" fill="hold">
-                                          <p:stCondLst>
-                                            <p:cond delay="0"/>
-                                          </p:stCondLst>
-                                        </p:cTn>
-                                        <p:tgtEl>
-                                          <p:spTgt spid="4">
-                                            <p:txEl>
-                                              <p:pRg st="0" end="0"/>
-                                            </p:txEl>
-                                          </p:spTgt>
-                                        </p:tgtEl>
-                                        <p:attrNameLst>
-                                          <p:attrName>style.visibility</p:attrName>
-                                        </p:attrNameLst>
-                                      </p:cBhvr>
-                                      <p:to>
-                                        <p:strVal val="visible"/>
-                                      </p:to>
-                                    </p:set>
-                                  </p:childTnLst>
-                                </p:cTn>
-                              </p:par>
-                            </p:childTnLst>
-                          </p:cTn>
-                        </p:par>
-                      </p:childTnLst>
-                    </p:cTn>
-                  </p:par>
-                </p:childTnLst>
-              </p:cTn>
-              <p:prevCondLst>
-                <p:cond evt="onPrev" delay="0">
-                  <p:tgtEl>
-                    <p:sldTgt/>
-                  </p:tgtEl>
-                </p:cond>
-              </p:prevCondLst>
-              <p:nextCondLst>
-                <p:cond evt="onNext" delay="0">
-                  <p:tgtEl>
-                    <p:sldTgt/>
-                  </p:tgtEl>
-                </p:cond>
-              </p:nextCondLst>
-            </p:seq>
-          </p:childTnLst>
-        </p:cTn>
+        <p:cTn id="1" dur="indefinite" restart="never" nodeType="tmRoot"/>
       </p:par>
     </p:tnLst>
   </p:timing>
 </p:sld>
 </file>
 
-<file path=ppt/slides/slide19.xml><?xml version="1.0" encoding="utf-8"?>
+<file path=ppt/slides/slide21.xml><?xml version="1.0" encoding="utf-8"?>
 <p:sld xmlns:a="http://schemas.openxmlformats.org/drawingml/2006/main" xmlns:r="http://schemas.openxmlformats.org/officeDocument/2006/relationships" xmlns:p="http://schemas.openxmlformats.org/presentationml/2006/main">
   <p:cSld>
     <p:spTree>
@@ -11125,7 +11257,7 @@
               <a:pPr>
                 <a:defRPr/>
               </a:pPr>
-              <a:t>19</a:t>
+              <a:t>21</a:t>
             </a:fld>
             <a:endParaRPr lang="en-US" dirty="0">
               <a:solidFill>
@@ -11189,91 +11321,14 @@
   <p:timing>
     <p:tnLst>
       <p:par>
-        <p:cTn id="1" dur="indefinite" restart="never" nodeType="tmRoot">
-          <p:childTnLst>
-            <p:seq concurrent="1" nextAc="seek">
-              <p:cTn id="2" dur="indefinite" nodeType="mainSeq">
-                <p:childTnLst>
-                  <p:par>
-                    <p:cTn id="3" fill="hold">
-                      <p:stCondLst>
-                        <p:cond delay="indefinite"/>
-                      </p:stCondLst>
-                      <p:childTnLst>
-                        <p:par>
-                          <p:cTn id="4" fill="hold">
-                            <p:stCondLst>
-                              <p:cond delay="0"/>
-                            </p:stCondLst>
-                            <p:childTnLst>
-                              <p:par>
-                                <p:cTn id="5" presetID="1" presetClass="entr" presetSubtype="0" fill="hold" nodeType="clickEffect" nodePh="1">
-                                  <p:stCondLst>
-                                    <p:cond delay="0"/>
-                                  </p:stCondLst>
-                                  <p:endCondLst>
-                                    <p:cond evt="begin" delay="0">
-                                      <p:tn val="5"/>
-                                    </p:cond>
-                                  </p:endCondLst>
-                                  <p:childTnLst>
-                                    <p:set>
-                                      <p:cBhvr>
-                                        <p:cTn id="6" dur="1" fill="hold">
-                                          <p:stCondLst>
-                                            <p:cond delay="0"/>
-                                          </p:stCondLst>
-                                        </p:cTn>
-                                        <p:tgtEl>
-                                          <p:spTgt spid="4">
-                                            <p:txEl>
-                                              <p:pRg st="0" end="0"/>
-                                            </p:txEl>
-                                          </p:spTgt>
-                                        </p:tgtEl>
-                                        <p:attrNameLst>
-                                          <p:attrName>style.visibility</p:attrName>
-                                        </p:attrNameLst>
-                                      </p:cBhvr>
-                                      <p:to>
-                                        <p:strVal val="visible"/>
-                                      </p:to>
-                                    </p:set>
-                                  </p:childTnLst>
-                                </p:cTn>
-                              </p:par>
-                            </p:childTnLst>
-                          </p:cTn>
-                        </p:par>
-                      </p:childTnLst>
-                    </p:cTn>
-                  </p:par>
-                </p:childTnLst>
-              </p:cTn>
-              <p:prevCondLst>
-                <p:cond evt="onPrev" delay="0">
-                  <p:tgtEl>
-                    <p:sldTgt/>
-                  </p:tgtEl>
-                </p:cond>
-              </p:prevCondLst>
-              <p:nextCondLst>
-                <p:cond evt="onNext" delay="0">
-                  <p:tgtEl>
-                    <p:sldTgt/>
-                  </p:tgtEl>
-                </p:cond>
-              </p:nextCondLst>
-            </p:seq>
-          </p:childTnLst>
-        </p:cTn>
+        <p:cTn id="1" dur="indefinite" restart="never" nodeType="tmRoot"/>
       </p:par>
     </p:tnLst>
   </p:timing>
 </p:sld>
 </file>
 
-<file path=ppt/slides/slide2.xml><?xml version="1.0" encoding="utf-8"?>
+<file path=ppt/slides/slide22.xml><?xml version="1.0" encoding="utf-8"?>
 <p:sld xmlns:a="http://schemas.openxmlformats.org/drawingml/2006/main" xmlns:r="http://schemas.openxmlformats.org/officeDocument/2006/relationships" xmlns:p="http://schemas.openxmlformats.org/presentationml/2006/main">
   <p:cSld>
     <p:spTree>
@@ -11306,8 +11361,12 @@
           <a:lstStyle/>
           <a:p>
             <a:r>
+              <a:rPr lang="en-US" dirty="0"/>
+              <a:t>The DAISY </a:t>
+            </a:r>
+            <a:r>
               <a:rPr lang="en-US" dirty="0" smtClean="0"/>
-              <a:t>Lesson Outline</a:t>
+              <a:t>System</a:t>
             </a:r>
             <a:endParaRPr lang="en-US" dirty="0"/>
           </a:p>
@@ -11323,72 +11382,21 @@
             <p:ph idx="1"/>
           </p:nvPr>
         </p:nvSpPr>
-        <p:spPr/>
+        <p:spPr>
+          <a:xfrm>
+            <a:off x="581736" y="1523052"/>
+            <a:ext cx="8131175" cy="4324350"/>
+          </a:xfrm>
+        </p:spPr>
         <p:txBody>
           <a:bodyPr/>
           <a:lstStyle/>
           <a:p>
-            <a:pPr marL="514350" indent="-514350" eaLnBrk="1" hangingPunct="1">
-              <a:lnSpc>
-                <a:spcPct val="80000"/>
-              </a:lnSpc>
-              <a:buFont typeface="+mj-lt"/>
-              <a:buAutoNum type="arabicPeriod"/>
-            </a:pPr>
-            <a:r>
-              <a:rPr lang="en-US" sz="2800" dirty="0" smtClean="0"/>
-              <a:t>D Flip Flop</a:t>
-            </a:r>
-          </a:p>
-          <a:p>
-            <a:pPr marL="514350" indent="-514350" eaLnBrk="1" hangingPunct="1">
-              <a:lnSpc>
-                <a:spcPct val="80000"/>
-              </a:lnSpc>
-              <a:buFont typeface="+mj-lt"/>
-              <a:buAutoNum type="arabicPeriod"/>
-            </a:pPr>
-            <a:r>
-              <a:rPr lang="en-US" sz="2800" dirty="0" smtClean="0"/>
-              <a:t>Finite State Machine</a:t>
-            </a:r>
-          </a:p>
-          <a:p>
-            <a:pPr marL="514350" indent="-514350" eaLnBrk="1" hangingPunct="1">
-              <a:lnSpc>
-                <a:spcPct val="80000"/>
-              </a:lnSpc>
-              <a:buFont typeface="+mj-lt"/>
-              <a:buAutoNum type="arabicPeriod"/>
-            </a:pPr>
-            <a:r>
-              <a:rPr lang="en-US" sz="2800" dirty="0" smtClean="0"/>
-              <a:t>FSM Timing</a:t>
-            </a:r>
-          </a:p>
-          <a:p>
-            <a:pPr marL="514350" indent="-514350" eaLnBrk="1" hangingPunct="1">
-              <a:lnSpc>
-                <a:spcPct val="80000"/>
-              </a:lnSpc>
-              <a:buFont typeface="+mj-lt"/>
-              <a:buAutoNum type="arabicPeriod"/>
-            </a:pPr>
-            <a:r>
-              <a:rPr lang="en-US" sz="2800" dirty="0" smtClean="0"/>
-              <a:t>The DAISY System</a:t>
-            </a:r>
-          </a:p>
-          <a:p>
-            <a:pPr eaLnBrk="1" hangingPunct="1">
-              <a:lnSpc>
-                <a:spcPct val="80000"/>
-              </a:lnSpc>
-            </a:pPr>
-            <a:endParaRPr lang="en-US" dirty="0" smtClean="0"/>
-          </a:p>
-          <a:p>
-            <a:endParaRPr lang="en-US" dirty="0"/>
+            <a:r>
+              <a:rPr lang="en-US" b="0" dirty="0" smtClean="0"/>
+              <a:t>DAISY FSM Entity</a:t>
+            </a:r>
+            <a:endParaRPr lang="en-US" b="0" dirty="0"/>
           </a:p>
         </p:txBody>
       </p:sp>
@@ -11424,141 +11432,7 @@
               <a:pPr>
                 <a:defRPr/>
               </a:pPr>
-              <a:t>2</a:t>
-            </a:fld>
-            <a:endParaRPr lang="en-US" dirty="0">
-              <a:solidFill>
-                <a:srgbClr val="000000"/>
-              </a:solidFill>
-            </a:endParaRPr>
-          </a:p>
-        </p:txBody>
-      </p:sp>
-    </p:spTree>
-    <p:extLst>
-      <p:ext uri="{BB962C8B-B14F-4D97-AF65-F5344CB8AC3E}">
-        <p14:creationId xmlns:p14="http://schemas.microsoft.com/office/powerpoint/2010/main" val="3991601210"/>
-      </p:ext>
-    </p:extLst>
-  </p:cSld>
-  <p:clrMapOvr>
-    <a:masterClrMapping/>
-  </p:clrMapOvr>
-  <p:timing>
-    <p:tnLst>
-      <p:par>
-        <p:cTn id="1" dur="indefinite" restart="never" nodeType="tmRoot"/>
-      </p:par>
-    </p:tnLst>
-  </p:timing>
-</p:sld>
-</file>
-
-<file path=ppt/slides/slide20.xml><?xml version="1.0" encoding="utf-8"?>
-<p:sld xmlns:a="http://schemas.openxmlformats.org/drawingml/2006/main" xmlns:r="http://schemas.openxmlformats.org/officeDocument/2006/relationships" xmlns:p="http://schemas.openxmlformats.org/presentationml/2006/main">
-  <p:cSld>
-    <p:spTree>
-      <p:nvGrpSpPr>
-        <p:cNvPr id="1" name=""/>
-        <p:cNvGrpSpPr/>
-        <p:nvPr/>
-      </p:nvGrpSpPr>
-      <p:grpSpPr>
-        <a:xfrm>
-          <a:off x="0" y="0"/>
-          <a:ext cx="0" cy="0"/>
-          <a:chOff x="0" y="0"/>
-          <a:chExt cx="0" cy="0"/>
-        </a:xfrm>
-      </p:grpSpPr>
-      <p:sp>
-        <p:nvSpPr>
-          <p:cNvPr id="2" name="Title 1"/>
-          <p:cNvSpPr>
-            <a:spLocks noGrp="1"/>
-          </p:cNvSpPr>
-          <p:nvPr>
-            <p:ph type="title"/>
-          </p:nvPr>
-        </p:nvSpPr>
-        <p:spPr/>
-        <p:txBody>
-          <a:bodyPr/>
-          <a:lstStyle/>
-          <a:p>
-            <a:r>
-              <a:rPr lang="en-US" dirty="0"/>
-              <a:t>The DAISY </a:t>
-            </a:r>
-            <a:r>
-              <a:rPr lang="en-US" dirty="0" smtClean="0"/>
-              <a:t>System</a:t>
-            </a:r>
-            <a:endParaRPr lang="en-US" dirty="0"/>
-          </a:p>
-        </p:txBody>
-      </p:sp>
-      <p:sp>
-        <p:nvSpPr>
-          <p:cNvPr id="4" name="Content Placeholder 3"/>
-          <p:cNvSpPr>
-            <a:spLocks noGrp="1"/>
-          </p:cNvSpPr>
-          <p:nvPr>
-            <p:ph idx="1"/>
-          </p:nvPr>
-        </p:nvSpPr>
-        <p:spPr>
-          <a:xfrm>
-            <a:off x="581736" y="1523052"/>
-            <a:ext cx="8131175" cy="4324350"/>
-          </a:xfrm>
-        </p:spPr>
-        <p:txBody>
-          <a:bodyPr/>
-          <a:lstStyle/>
-          <a:p>
-            <a:r>
-              <a:rPr lang="en-US" b="0" dirty="0" smtClean="0"/>
-              <a:t>DAISY FSM Entity</a:t>
-            </a:r>
-            <a:endParaRPr lang="en-US" b="0" dirty="0"/>
-          </a:p>
-        </p:txBody>
-      </p:sp>
-      <p:sp>
-        <p:nvSpPr>
-          <p:cNvPr id="5" name="Slide Number Placeholder 3"/>
-          <p:cNvSpPr>
-            <a:spLocks noGrp="1"/>
-          </p:cNvSpPr>
-          <p:nvPr>
-            <p:ph type="sldNum" sz="quarter" idx="10"/>
-          </p:nvPr>
-        </p:nvSpPr>
-        <p:spPr>
-          <a:xfrm>
-            <a:off x="6910388" y="6253163"/>
-            <a:ext cx="2133600" cy="476250"/>
-          </a:xfrm>
-        </p:spPr>
-        <p:txBody>
-          <a:bodyPr/>
-          <a:lstStyle/>
-          <a:p>
-            <a:pPr>
-              <a:defRPr/>
-            </a:pPr>
-            <a:fld id="{62D6D4B2-7611-498F-8780-1EDC26277454}" type="slidenum">
-              <a:rPr lang="en-US" smtClean="0">
-                <a:solidFill>
-                  <a:srgbClr val="000000"/>
-                </a:solidFill>
-              </a:rPr>
-              <a:pPr>
-                <a:defRPr/>
-              </a:pPr>
-              <a:t>20</a:t>
+              <a:t>22</a:t>
             </a:fld>
             <a:endParaRPr lang="en-US" dirty="0">
               <a:solidFill>
@@ -11622,86 +11496,14 @@
   <p:timing>
     <p:tnLst>
       <p:par>
-        <p:cTn id="1" dur="indefinite" restart="never" nodeType="tmRoot">
-          <p:childTnLst>
-            <p:seq concurrent="1" nextAc="seek">
-              <p:cTn id="2" dur="indefinite" nodeType="mainSeq">
-                <p:childTnLst>
-                  <p:par>
-                    <p:cTn id="3" fill="hold">
-                      <p:stCondLst>
-                        <p:cond delay="indefinite"/>
-                      </p:stCondLst>
-                      <p:childTnLst>
-                        <p:par>
-                          <p:cTn id="4" fill="hold">
-                            <p:stCondLst>
-                              <p:cond delay="0"/>
-                            </p:stCondLst>
-                            <p:childTnLst>
-                              <p:par>
-                                <p:cTn id="5" presetID="1" presetClass="entr" presetSubtype="0" fill="hold" nodeType="clickEffect">
-                                  <p:stCondLst>
-                                    <p:cond delay="0"/>
-                                  </p:stCondLst>
-                                  <p:childTnLst>
-                                    <p:set>
-                                      <p:cBhvr>
-                                        <p:cTn id="6" dur="1" fill="hold">
-                                          <p:stCondLst>
-                                            <p:cond delay="0"/>
-                                          </p:stCondLst>
-                                        </p:cTn>
-                                        <p:tgtEl>
-                                          <p:spTgt spid="4">
-                                            <p:txEl>
-                                              <p:pRg st="0" end="0"/>
-                                            </p:txEl>
-                                          </p:spTgt>
-                                        </p:tgtEl>
-                                        <p:attrNameLst>
-                                          <p:attrName>style.visibility</p:attrName>
-                                        </p:attrNameLst>
-                                      </p:cBhvr>
-                                      <p:to>
-                                        <p:strVal val="visible"/>
-                                      </p:to>
-                                    </p:set>
-                                  </p:childTnLst>
-                                </p:cTn>
-                              </p:par>
-                            </p:childTnLst>
-                          </p:cTn>
-                        </p:par>
-                      </p:childTnLst>
-                    </p:cTn>
-                  </p:par>
-                </p:childTnLst>
-              </p:cTn>
-              <p:prevCondLst>
-                <p:cond evt="onPrev" delay="0">
-                  <p:tgtEl>
-                    <p:sldTgt/>
-                  </p:tgtEl>
-                </p:cond>
-              </p:prevCondLst>
-              <p:nextCondLst>
-                <p:cond evt="onNext" delay="0">
-                  <p:tgtEl>
-                    <p:sldTgt/>
-                  </p:tgtEl>
-                </p:cond>
-              </p:nextCondLst>
-            </p:seq>
-          </p:childTnLst>
-        </p:cTn>
+        <p:cTn id="1" dur="indefinite" restart="never" nodeType="tmRoot"/>
       </p:par>
     </p:tnLst>
   </p:timing>
 </p:sld>
 </file>
 
-<file path=ppt/slides/slide21.xml><?xml version="1.0" encoding="utf-8"?>
+<file path=ppt/slides/slide23.xml><?xml version="1.0" encoding="utf-8"?>
 <p:sld xmlns:a="http://schemas.openxmlformats.org/drawingml/2006/main" xmlns:r="http://schemas.openxmlformats.org/officeDocument/2006/relationships" xmlns:p="http://schemas.openxmlformats.org/presentationml/2006/main">
   <p:cSld>
     <p:spTree>
@@ -11767,11 +11569,7 @@
           <a:p>
             <a:r>
               <a:rPr lang="en-US" b="0" dirty="0" smtClean="0"/>
-              <a:t>Inputs </a:t>
-            </a:r>
-            <a:r>
-              <a:rPr lang="en-US" b="0" dirty="0" smtClean="0"/>
-              <a:t>to Daisy</a:t>
+              <a:t>Inputs to Daisy</a:t>
             </a:r>
           </a:p>
           <a:p>
@@ -11823,7 +11621,7 @@
               <a:pPr>
                 <a:defRPr/>
               </a:pPr>
-              <a:t>21</a:t>
+              <a:t>23</a:t>
             </a:fld>
             <a:endParaRPr lang="en-US" dirty="0">
               <a:solidFill>
@@ -12038,7 +11836,7 @@
                     <a:p>
                       <a:pPr algn="l" fontAlgn="t"/>
                       <a:r>
-                        <a:rPr lang="en-US" sz="1300">
+                        <a:rPr lang="en-US" sz="1300" dirty="0">
                           <a:effectLst/>
                         </a:rPr>
                         <a:t>1 - Cow checked in</a:t>
@@ -12208,7 +12006,7 @@
                     <a:p>
                       <a:pPr algn="l" fontAlgn="t"/>
                       <a:r>
-                        <a:rPr lang="en-US" sz="1300">
+                        <a:rPr lang="en-US" sz="1300" dirty="0">
                           <a:effectLst/>
                         </a:rPr>
                         <a:t>0 - Cow not processed</a:t>
@@ -12636,7 +12434,7 @@
                     <a:p>
                       <a:pPr algn="l" fontAlgn="t"/>
                       <a:r>
-                        <a:rPr lang="en-US" sz="1300">
+                        <a:rPr lang="en-US" sz="1300" dirty="0">
                           <a:effectLst/>
                         </a:rPr>
                         <a:t>1-gate up</a:t>
@@ -13747,11 +13545,101 @@
                                           </p:stCondLst>
                                         </p:cTn>
                                         <p:tgtEl>
+                                          <p:spTgt spid="3"/>
+                                        </p:tgtEl>
+                                        <p:attrNameLst>
+                                          <p:attrName>style.visibility</p:attrName>
+                                        </p:attrNameLst>
+                                      </p:cBhvr>
+                                      <p:to>
+                                        <p:strVal val="visible"/>
+                                      </p:to>
+                                    </p:set>
+                                  </p:childTnLst>
+                                </p:cTn>
+                              </p:par>
+                            </p:childTnLst>
+                          </p:cTn>
+                        </p:par>
+                      </p:childTnLst>
+                    </p:cTn>
+                  </p:par>
+                  <p:par>
+                    <p:cTn id="11" fill="hold">
+                      <p:stCondLst>
+                        <p:cond delay="indefinite"/>
+                      </p:stCondLst>
+                      <p:childTnLst>
+                        <p:par>
+                          <p:cTn id="12" fill="hold">
+                            <p:stCondLst>
+                              <p:cond delay="0"/>
+                            </p:stCondLst>
+                            <p:childTnLst>
+                              <p:par>
+                                <p:cTn id="13" presetID="1" presetClass="entr" presetSubtype="0" fill="hold" nodeType="clickEffect">
+                                  <p:stCondLst>
+                                    <p:cond delay="0"/>
+                                  </p:stCondLst>
+                                  <p:childTnLst>
+                                    <p:set>
+                                      <p:cBhvr>
+                                        <p:cTn id="14" dur="1" fill="hold">
+                                          <p:stCondLst>
+                                            <p:cond delay="0"/>
+                                          </p:stCondLst>
+                                        </p:cTn>
+                                        <p:tgtEl>
                                           <p:spTgt spid="4">
                                             <p:txEl>
                                               <p:pRg st="3" end="3"/>
                                             </p:txEl>
                                           </p:spTgt>
+                                        </p:tgtEl>
+                                        <p:attrNameLst>
+                                          <p:attrName>style.visibility</p:attrName>
+                                        </p:attrNameLst>
+                                      </p:cBhvr>
+                                      <p:to>
+                                        <p:strVal val="visible"/>
+                                      </p:to>
+                                    </p:set>
+                                  </p:childTnLst>
+                                </p:cTn>
+                              </p:par>
+                            </p:childTnLst>
+                          </p:cTn>
+                        </p:par>
+                      </p:childTnLst>
+                    </p:cTn>
+                  </p:par>
+                  <p:par>
+                    <p:cTn id="15" fill="hold">
+                      <p:stCondLst>
+                        <p:cond delay="indefinite"/>
+                      </p:stCondLst>
+                      <p:childTnLst>
+                        <p:par>
+                          <p:cTn id="16" fill="hold">
+                            <p:stCondLst>
+                              <p:cond delay="0"/>
+                            </p:stCondLst>
+                            <p:childTnLst>
+                              <p:par>
+                                <p:cTn id="17" presetID="1" presetClass="entr" presetSubtype="0" fill="hold" nodeType="clickEffect">
+                                  <p:stCondLst>
+                                    <p:cond delay="0"/>
+                                  </p:stCondLst>
+                                  <p:childTnLst>
+                                    <p:set>
+                                      <p:cBhvr>
+                                        <p:cTn id="18" dur="1" fill="hold">
+                                          <p:stCondLst>
+                                            <p:cond delay="0"/>
+                                          </p:stCondLst>
+                                        </p:cTn>
+                                        <p:tgtEl>
+                                          <p:spTgt spid="6"/>
                                         </p:tgtEl>
                                         <p:attrNameLst>
                                           <p:attrName>style.visibility</p:attrName>
@@ -13795,7 +13683,7 @@
 </p:sld>
 </file>
 
-<file path=ppt/slides/slide22.xml><?xml version="1.0" encoding="utf-8"?>
+<file path=ppt/slides/slide24.xml><?xml version="1.0" encoding="utf-8"?>
 <p:sld xmlns:a="http://schemas.openxmlformats.org/drawingml/2006/main" xmlns:r="http://schemas.openxmlformats.org/officeDocument/2006/relationships" xmlns:p="http://schemas.openxmlformats.org/presentationml/2006/main">
   <p:cSld>
     <p:spTree>
@@ -14001,7 +13889,7 @@
               <a:pPr>
                 <a:defRPr/>
               </a:pPr>
-              <a:t>22</a:t>
+              <a:t>24</a:t>
             </a:fld>
             <a:endParaRPr lang="en-US" dirty="0">
               <a:solidFill>
@@ -14738,7 +14626,7 @@
 </p:sld>
 </file>
 
-<file path=ppt/slides/slide23.xml><?xml version="1.0" encoding="utf-8"?>
+<file path=ppt/slides/slide25.xml><?xml version="1.0" encoding="utf-8"?>
 <p:sld xmlns:a="http://schemas.openxmlformats.org/drawingml/2006/main" xmlns:r="http://schemas.openxmlformats.org/officeDocument/2006/relationships" xmlns:p="http://schemas.openxmlformats.org/presentationml/2006/main">
   <p:cSld>
     <p:spTree>
@@ -14863,7 +14751,7 @@
               <a:pPr>
                 <a:defRPr/>
               </a:pPr>
-              <a:t>23</a:t>
+              <a:t>25</a:t>
             </a:fld>
             <a:endParaRPr lang="en-US" dirty="0">
               <a:solidFill>
@@ -16062,7 +15950,7 @@
 </p:sld>
 </file>
 
-<file path=ppt/slides/slide24.xml><?xml version="1.0" encoding="utf-8"?>
+<file path=ppt/slides/slide26.xml><?xml version="1.0" encoding="utf-8"?>
 <p:sld xmlns:a="http://schemas.openxmlformats.org/drawingml/2006/main" xmlns:r="http://schemas.openxmlformats.org/officeDocument/2006/relationships" xmlns:p="http://schemas.openxmlformats.org/presentationml/2006/main">
   <p:cSld>
     <p:spTree>
@@ -16176,7 +16064,7 @@
               <a:pPr>
                 <a:defRPr/>
               </a:pPr>
-              <a:t>24</a:t>
+              <a:t>26</a:t>
             </a:fld>
             <a:endParaRPr lang="en-US" dirty="0">
               <a:solidFill>
@@ -16438,7 +16326,7 @@
 </p:sld>
 </file>
 
-<file path=ppt/slides/slide25.xml><?xml version="1.0" encoding="utf-8"?>
+<file path=ppt/slides/slide27.xml><?xml version="1.0" encoding="utf-8"?>
 <p:sld xmlns:a="http://schemas.openxmlformats.org/drawingml/2006/main" xmlns:r="http://schemas.openxmlformats.org/officeDocument/2006/relationships" xmlns:p="http://schemas.openxmlformats.org/presentationml/2006/main">
   <p:cSld>
     <p:spTree>
@@ -16538,7 +16426,7 @@
               <a:pPr>
                 <a:defRPr/>
               </a:pPr>
-              <a:t>25</a:t>
+              <a:t>27</a:t>
             </a:fld>
             <a:endParaRPr lang="en-US" dirty="0">
               <a:solidFill>
@@ -17249,7 +17137,7 @@
 </p:sld>
 </file>
 
-<file path=ppt/slides/slide26.xml><?xml version="1.0" encoding="utf-8"?>
+<file path=ppt/slides/slide28.xml><?xml version="1.0" encoding="utf-8"?>
 <p:sld xmlns:a="http://schemas.openxmlformats.org/drawingml/2006/main" xmlns:r="http://schemas.openxmlformats.org/officeDocument/2006/relationships" xmlns:p="http://schemas.openxmlformats.org/presentationml/2006/main">
   <p:cSld>
     <p:spTree>
@@ -17349,7 +17237,7 @@
               <a:pPr>
                 <a:defRPr/>
               </a:pPr>
-              <a:t>26</a:t>
+              <a:t>28</a:t>
             </a:fld>
             <a:endParaRPr lang="en-US" dirty="0">
               <a:solidFill>
@@ -17652,7 +17540,7 @@
 </p:sld>
 </file>
 
-<file path=ppt/slides/slide27.xml><?xml version="1.0" encoding="utf-8"?>
+<file path=ppt/slides/slide29.xml><?xml version="1.0" encoding="utf-8"?>
 <p:sld xmlns:a="http://schemas.openxmlformats.org/drawingml/2006/main" xmlns:r="http://schemas.openxmlformats.org/officeDocument/2006/relationships" xmlns:p="http://schemas.openxmlformats.org/presentationml/2006/main">
   <p:cSld>
     <p:spTree>
@@ -17901,7 +17789,7 @@
               <a:pPr>
                 <a:defRPr/>
               </a:pPr>
-              <a:t>27</a:t>
+              <a:t>29</a:t>
             </a:fld>
             <a:endParaRPr lang="en-US" dirty="0">
               <a:solidFill>
@@ -19231,7 +19119,123 @@
 </p:sld>
 </file>
 
-<file path=ppt/slides/slide28.xml><?xml version="1.0" encoding="utf-8"?>
+<file path=ppt/slides/slide3.xml><?xml version="1.0" encoding="utf-8"?>
+<p:sld xmlns:a="http://schemas.openxmlformats.org/drawingml/2006/main" xmlns:r="http://schemas.openxmlformats.org/officeDocument/2006/relationships" xmlns:p="http://schemas.openxmlformats.org/presentationml/2006/main">
+  <p:cSld>
+    <p:spTree>
+      <p:nvGrpSpPr>
+        <p:cNvPr id="1" name=""/>
+        <p:cNvGrpSpPr/>
+        <p:nvPr/>
+      </p:nvGrpSpPr>
+      <p:grpSpPr>
+        <a:xfrm>
+          <a:off x="0" y="0"/>
+          <a:ext cx="0" cy="0"/>
+          <a:chOff x="0" y="0"/>
+          <a:chExt cx="0" cy="0"/>
+        </a:xfrm>
+      </p:grpSpPr>
+      <p:sp>
+        <p:nvSpPr>
+          <p:cNvPr id="6" name="Title 5"/>
+          <p:cNvSpPr>
+            <a:spLocks noGrp="1"/>
+          </p:cNvSpPr>
+          <p:nvPr>
+            <p:ph type="title"/>
+          </p:nvPr>
+        </p:nvSpPr>
+        <p:spPr/>
+        <p:txBody>
+          <a:bodyPr/>
+          <a:lstStyle/>
+          <a:p>
+            <a:r>
+              <a:rPr lang="en-US" cap="none" dirty="0" smtClean="0"/>
+              <a:t>D Flip Flop</a:t>
+            </a:r>
+            <a:endParaRPr lang="en-US" cap="none" dirty="0"/>
+          </a:p>
+        </p:txBody>
+      </p:sp>
+      <p:sp>
+        <p:nvSpPr>
+          <p:cNvPr id="7" name="Text Placeholder 6"/>
+          <p:cNvSpPr>
+            <a:spLocks noGrp="1"/>
+          </p:cNvSpPr>
+          <p:nvPr>
+            <p:ph type="body" idx="1"/>
+          </p:nvPr>
+        </p:nvSpPr>
+        <p:spPr/>
+        <p:txBody>
+          <a:bodyPr/>
+          <a:lstStyle/>
+          <a:p>
+            <a:endParaRPr lang="en-US" dirty="0"/>
+          </a:p>
+        </p:txBody>
+      </p:sp>
+      <p:sp>
+        <p:nvSpPr>
+          <p:cNvPr id="4" name="Slide Number Placeholder 3"/>
+          <p:cNvSpPr>
+            <a:spLocks noGrp="1"/>
+          </p:cNvSpPr>
+          <p:nvPr>
+            <p:ph type="sldNum" sz="quarter" idx="10"/>
+          </p:nvPr>
+        </p:nvSpPr>
+        <p:spPr/>
+        <p:txBody>
+          <a:bodyPr/>
+          <a:lstStyle/>
+          <a:p>
+            <a:pPr>
+              <a:defRPr/>
+            </a:pPr>
+            <a:fld id="{62D6D4B2-7611-498F-8780-1EDC26277454}" type="slidenum">
+              <a:rPr lang="en-US" smtClean="0">
+                <a:solidFill>
+                  <a:srgbClr val="000000"/>
+                </a:solidFill>
+              </a:rPr>
+              <a:pPr>
+                <a:defRPr/>
+              </a:pPr>
+              <a:t>3</a:t>
+            </a:fld>
+            <a:endParaRPr lang="en-US" dirty="0">
+              <a:solidFill>
+                <a:srgbClr val="000000"/>
+              </a:solidFill>
+            </a:endParaRPr>
+          </a:p>
+        </p:txBody>
+      </p:sp>
+    </p:spTree>
+    <p:extLst>
+      <p:ext uri="{BB962C8B-B14F-4D97-AF65-F5344CB8AC3E}">
+        <p14:creationId xmlns:p14="http://schemas.microsoft.com/office/powerpoint/2010/main" val="1303019524"/>
+      </p:ext>
+    </p:extLst>
+  </p:cSld>
+  <p:clrMapOvr>
+    <a:masterClrMapping/>
+  </p:clrMapOvr>
+  <p:timing>
+    <p:tnLst>
+      <p:par>
+        <p:cTn id="1" dur="indefinite" restart="never" nodeType="tmRoot"/>
+      </p:par>
+    </p:tnLst>
+  </p:timing>
+</p:sld>
+</file>
+
+<file path=ppt/slides/slide30.xml><?xml version="1.0" encoding="utf-8"?>
 <p:sld xmlns:a="http://schemas.openxmlformats.org/drawingml/2006/main" xmlns:r="http://schemas.openxmlformats.org/officeDocument/2006/relationships" xmlns:p="http://schemas.openxmlformats.org/presentationml/2006/main">
   <p:cSld>
     <p:spTree>
@@ -19350,7 +19354,7 @@
               <a:pPr>
                 <a:defRPr/>
               </a:pPr>
-              <a:t>28</a:t>
+              <a:t>30</a:t>
             </a:fld>
             <a:endParaRPr lang="en-US" dirty="0">
               <a:solidFill>
@@ -22954,7 +22958,7 @@
 </p:sld>
 </file>
 
-<file path=ppt/slides/slide29.xml><?xml version="1.0" encoding="utf-8"?>
+<file path=ppt/slides/slide31.xml><?xml version="1.0" encoding="utf-8"?>
 <p:sld xmlns:a="http://schemas.openxmlformats.org/drawingml/2006/main" xmlns:r="http://schemas.openxmlformats.org/officeDocument/2006/relationships" xmlns:p="http://schemas.openxmlformats.org/presentationml/2006/main">
   <p:cSld>
     <p:spTree>
@@ -23133,7 +23137,7 @@
               <a:pPr>
                 <a:defRPr/>
               </a:pPr>
-              <a:t>29</a:t>
+              <a:t>31</a:t>
             </a:fld>
             <a:endParaRPr lang="en-US" dirty="0">
               <a:solidFill>
@@ -23632,123 +23636,7 @@
 </p:sld>
 </file>
 
-<file path=ppt/slides/slide3.xml><?xml version="1.0" encoding="utf-8"?>
-<p:sld xmlns:a="http://schemas.openxmlformats.org/drawingml/2006/main" xmlns:r="http://schemas.openxmlformats.org/officeDocument/2006/relationships" xmlns:p="http://schemas.openxmlformats.org/presentationml/2006/main">
-  <p:cSld>
-    <p:spTree>
-      <p:nvGrpSpPr>
-        <p:cNvPr id="1" name=""/>
-        <p:cNvGrpSpPr/>
-        <p:nvPr/>
-      </p:nvGrpSpPr>
-      <p:grpSpPr>
-        <a:xfrm>
-          <a:off x="0" y="0"/>
-          <a:ext cx="0" cy="0"/>
-          <a:chOff x="0" y="0"/>
-          <a:chExt cx="0" cy="0"/>
-        </a:xfrm>
-      </p:grpSpPr>
-      <p:sp>
-        <p:nvSpPr>
-          <p:cNvPr id="6" name="Title 5"/>
-          <p:cNvSpPr>
-            <a:spLocks noGrp="1"/>
-          </p:cNvSpPr>
-          <p:nvPr>
-            <p:ph type="title"/>
-          </p:nvPr>
-        </p:nvSpPr>
-        <p:spPr/>
-        <p:txBody>
-          <a:bodyPr/>
-          <a:lstStyle/>
-          <a:p>
-            <a:r>
-              <a:rPr lang="en-US" cap="none" dirty="0" smtClean="0"/>
-              <a:t>D Flip Flop</a:t>
-            </a:r>
-            <a:endParaRPr lang="en-US" cap="none" dirty="0"/>
-          </a:p>
-        </p:txBody>
-      </p:sp>
-      <p:sp>
-        <p:nvSpPr>
-          <p:cNvPr id="7" name="Text Placeholder 6"/>
-          <p:cNvSpPr>
-            <a:spLocks noGrp="1"/>
-          </p:cNvSpPr>
-          <p:nvPr>
-            <p:ph type="body" idx="1"/>
-          </p:nvPr>
-        </p:nvSpPr>
-        <p:spPr/>
-        <p:txBody>
-          <a:bodyPr/>
-          <a:lstStyle/>
-          <a:p>
-            <a:endParaRPr lang="en-US" dirty="0"/>
-          </a:p>
-        </p:txBody>
-      </p:sp>
-      <p:sp>
-        <p:nvSpPr>
-          <p:cNvPr id="4" name="Slide Number Placeholder 3"/>
-          <p:cNvSpPr>
-            <a:spLocks noGrp="1"/>
-          </p:cNvSpPr>
-          <p:nvPr>
-            <p:ph type="sldNum" sz="quarter" idx="10"/>
-          </p:nvPr>
-        </p:nvSpPr>
-        <p:spPr/>
-        <p:txBody>
-          <a:bodyPr/>
-          <a:lstStyle/>
-          <a:p>
-            <a:pPr>
-              <a:defRPr/>
-            </a:pPr>
-            <a:fld id="{62D6D4B2-7611-498F-8780-1EDC26277454}" type="slidenum">
-              <a:rPr lang="en-US" smtClean="0">
-                <a:solidFill>
-                  <a:srgbClr val="000000"/>
-                </a:solidFill>
-              </a:rPr>
-              <a:pPr>
-                <a:defRPr/>
-              </a:pPr>
-              <a:t>3</a:t>
-            </a:fld>
-            <a:endParaRPr lang="en-US" dirty="0">
-              <a:solidFill>
-                <a:srgbClr val="000000"/>
-              </a:solidFill>
-            </a:endParaRPr>
-          </a:p>
-        </p:txBody>
-      </p:sp>
-    </p:spTree>
-    <p:extLst>
-      <p:ext uri="{BB962C8B-B14F-4D97-AF65-F5344CB8AC3E}">
-        <p14:creationId xmlns:p14="http://schemas.microsoft.com/office/powerpoint/2010/main" val="1303019524"/>
-      </p:ext>
-    </p:extLst>
-  </p:cSld>
-  <p:clrMapOvr>
-    <a:masterClrMapping/>
-  </p:clrMapOvr>
-  <p:timing>
-    <p:tnLst>
-      <p:par>
-        <p:cTn id="1" dur="indefinite" restart="never" nodeType="tmRoot"/>
-      </p:par>
-    </p:tnLst>
-  </p:timing>
-</p:sld>
-</file>
-
-<file path=ppt/slides/slide30.xml><?xml version="1.0" encoding="utf-8"?>
+<file path=ppt/slides/slide32.xml><?xml version="1.0" encoding="utf-8"?>
 <p:sld xmlns:a="http://schemas.openxmlformats.org/drawingml/2006/main" xmlns:r="http://schemas.openxmlformats.org/officeDocument/2006/relationships" xmlns:p="http://schemas.openxmlformats.org/presentationml/2006/main">
   <p:cSld>
     <p:spTree>
@@ -23854,7 +23742,7 @@
               <a:pPr>
                 <a:defRPr/>
               </a:pPr>
-              <a:t>30</a:t>
+              <a:t>32</a:t>
             </a:fld>
             <a:endParaRPr lang="en-US" dirty="0">
               <a:solidFill>
@@ -24394,7 +24282,7 @@
 </p:sld>
 </file>
 
-<file path=ppt/slides/slide31.xml><?xml version="1.0" encoding="utf-8"?>
+<file path=ppt/slides/slide33.xml><?xml version="1.0" encoding="utf-8"?>
 <p:sld xmlns:a="http://schemas.openxmlformats.org/drawingml/2006/main" xmlns:r="http://schemas.openxmlformats.org/officeDocument/2006/relationships" xmlns:p="http://schemas.openxmlformats.org/presentationml/2006/main">
   <p:cSld>
     <p:spTree>
@@ -24545,7 +24433,7 @@
               <a:pPr>
                 <a:defRPr/>
               </a:pPr>
-              <a:t>31</a:t>
+              <a:t>33</a:t>
             </a:fld>
             <a:endParaRPr lang="en-US" dirty="0">
               <a:solidFill>
@@ -25292,55 +25180,6 @@
                                         <p:tgtEl>
                                           <p:spTgt spid="4">
                                             <p:txEl>
-                                              <p:pRg st="0" end="0"/>
-                                            </p:txEl>
-                                          </p:spTgt>
-                                        </p:tgtEl>
-                                        <p:attrNameLst>
-                                          <p:attrName>style.visibility</p:attrName>
-                                        </p:attrNameLst>
-                                      </p:cBhvr>
-                                      <p:to>
-                                        <p:strVal val="visible"/>
-                                      </p:to>
-                                    </p:set>
-                                  </p:childTnLst>
-                                </p:cTn>
-                              </p:par>
-                            </p:childTnLst>
-                          </p:cTn>
-                        </p:par>
-                      </p:childTnLst>
-                    </p:cTn>
-                  </p:par>
-                  <p:par>
-                    <p:cTn id="7" fill="hold">
-                      <p:stCondLst>
-                        <p:cond delay="indefinite"/>
-                      </p:stCondLst>
-                      <p:childTnLst>
-                        <p:par>
-                          <p:cTn id="8" fill="hold">
-                            <p:stCondLst>
-                              <p:cond delay="0"/>
-                            </p:stCondLst>
-                            <p:childTnLst>
-                              <p:par>
-                                <p:cTn id="9" presetID="1" presetClass="entr" presetSubtype="0" fill="hold" nodeType="clickEffect">
-                                  <p:stCondLst>
-                                    <p:cond delay="0"/>
-                                  </p:stCondLst>
-                                  <p:childTnLst>
-                                    <p:set>
-                                      <p:cBhvr>
-                                        <p:cTn id="10" dur="1" fill="hold">
-                                          <p:stCondLst>
-                                            <p:cond delay="0"/>
-                                          </p:stCondLst>
-                                        </p:cTn>
-                                        <p:tgtEl>
-                                          <p:spTgt spid="4">
-                                            <p:txEl>
                                               <p:pRg st="1" end="1"/>
                                             </p:txEl>
                                           </p:spTgt>
@@ -25636,7 +25475,7 @@
                                         <p:tgtEl>
                                           <p:spTgt spid="4">
                                             <p:txEl>
-                                              <p:pRg st="0" end="0"/>
+                                              <p:pRg st="1" end="1"/>
                                             </p:txEl>
                                           </p:spTgt>
                                         </p:tgtEl>
@@ -25685,7 +25524,7 @@
                                         <p:tgtEl>
                                           <p:spTgt spid="4">
                                             <p:txEl>
-                                              <p:pRg st="1" end="1"/>
+                                              <p:pRg st="2" end="2"/>
                                             </p:txEl>
                                           </p:spTgt>
                                         </p:tgtEl>
@@ -25727,55 +25566,6 @@
                                     <p:set>
                                       <p:cBhvr>
                                         <p:cTn id="14" dur="1" fill="hold">
-                                          <p:stCondLst>
-                                            <p:cond delay="0"/>
-                                          </p:stCondLst>
-                                        </p:cTn>
-                                        <p:tgtEl>
-                                          <p:spTgt spid="4">
-                                            <p:txEl>
-                                              <p:pRg st="2" end="2"/>
-                                            </p:txEl>
-                                          </p:spTgt>
-                                        </p:tgtEl>
-                                        <p:attrNameLst>
-                                          <p:attrName>style.visibility</p:attrName>
-                                        </p:attrNameLst>
-                                      </p:cBhvr>
-                                      <p:to>
-                                        <p:strVal val="visible"/>
-                                      </p:to>
-                                    </p:set>
-                                  </p:childTnLst>
-                                </p:cTn>
-                              </p:par>
-                            </p:childTnLst>
-                          </p:cTn>
-                        </p:par>
-                      </p:childTnLst>
-                    </p:cTn>
-                  </p:par>
-                  <p:par>
-                    <p:cTn id="15" fill="hold">
-                      <p:stCondLst>
-                        <p:cond delay="indefinite"/>
-                      </p:stCondLst>
-                      <p:childTnLst>
-                        <p:par>
-                          <p:cTn id="16" fill="hold">
-                            <p:stCondLst>
-                              <p:cond delay="0"/>
-                            </p:stCondLst>
-                            <p:childTnLst>
-                              <p:par>
-                                <p:cTn id="17" presetID="1" presetClass="entr" presetSubtype="0" fill="hold" nodeType="clickEffect">
-                                  <p:stCondLst>
-                                    <p:cond delay="0"/>
-                                  </p:stCondLst>
-                                  <p:childTnLst>
-                                    <p:set>
-                                      <p:cBhvr>
-                                        <p:cTn id="18" dur="1" fill="hold">
                                           <p:stCondLst>
                                             <p:cond delay="0"/>
                                           </p:stCondLst>
@@ -26113,79 +25903,7 @@
   <p:timing>
     <p:tnLst>
       <p:par>
-        <p:cTn id="1" dur="indefinite" restart="never" nodeType="tmRoot">
-          <p:childTnLst>
-            <p:seq concurrent="1" nextAc="seek">
-              <p:cTn id="2" dur="indefinite" nodeType="mainSeq">
-                <p:childTnLst>
-                  <p:par>
-                    <p:cTn id="3" fill="hold">
-                      <p:stCondLst>
-                        <p:cond delay="indefinite"/>
-                      </p:stCondLst>
-                      <p:childTnLst>
-                        <p:par>
-                          <p:cTn id="4" fill="hold">
-                            <p:stCondLst>
-                              <p:cond delay="0"/>
-                            </p:stCondLst>
-                            <p:childTnLst>
-                              <p:par>
-                                <p:cTn id="5" presetID="1" presetClass="entr" presetSubtype="0" fill="hold" nodeType="clickEffect">
-                                  <p:stCondLst>
-                                    <p:cond delay="0"/>
-                                  </p:stCondLst>
-                                  <p:childTnLst>
-                                    <p:set>
-                                      <p:cBhvr>
-                                        <p:cTn id="6" dur="1" fill="hold">
-                                          <p:stCondLst>
-                                            <p:cond delay="0"/>
-                                          </p:stCondLst>
-                                        </p:cTn>
-                                        <p:tgtEl>
-                                          <p:spTgt spid="4">
-                                            <p:txEl>
-                                              <p:pRg st="0" end="0"/>
-                                            </p:txEl>
-                                          </p:spTgt>
-                                        </p:tgtEl>
-                                        <p:attrNameLst>
-                                          <p:attrName>style.visibility</p:attrName>
-                                        </p:attrNameLst>
-                                      </p:cBhvr>
-                                      <p:to>
-                                        <p:strVal val="visible"/>
-                                      </p:to>
-                                    </p:set>
-                                  </p:childTnLst>
-                                </p:cTn>
-                              </p:par>
-                            </p:childTnLst>
-                          </p:cTn>
-                        </p:par>
-                      </p:childTnLst>
-                    </p:cTn>
-                  </p:par>
-                </p:childTnLst>
-              </p:cTn>
-              <p:prevCondLst>
-                <p:cond evt="onPrev" delay="0">
-                  <p:tgtEl>
-                    <p:sldTgt/>
-                  </p:tgtEl>
-                </p:cond>
-              </p:prevCondLst>
-              <p:nextCondLst>
-                <p:cond evt="onNext" delay="0">
-                  <p:tgtEl>
-                    <p:sldTgt/>
-                  </p:tgtEl>
-                </p:cond>
-              </p:nextCondLst>
-            </p:seq>
-          </p:childTnLst>
-        </p:cTn>
+        <p:cTn id="1" dur="indefinite" restart="never" nodeType="tmRoot"/>
       </p:par>
     </p:tnLst>
   </p:timing>

</xml_diff>

<commit_message>
minor changes to MIEs on slides.
</commit_message>
<xml_diff>
--- a/lecture/slides/ECE_383_Lec9.pptx
+++ b/lecture/slides/ECE_383_Lec9.pptx
@@ -6,10 +6,10 @@
     <p:sldMasterId id="2147483687" r:id="rId2"/>
   </p:sldMasterIdLst>
   <p:notesMasterIdLst>
-    <p:notesMasterId r:id="rId36"/>
+    <p:notesMasterId r:id="rId37"/>
   </p:notesMasterIdLst>
   <p:handoutMasterIdLst>
-    <p:handoutMasterId r:id="rId37"/>
+    <p:handoutMasterId r:id="rId38"/>
   </p:handoutMasterIdLst>
   <p:sldIdLst>
     <p:sldId id="299" r:id="rId3"/>
@@ -19,32 +19,33 @@
     <p:sldId id="356" r:id="rId7"/>
     <p:sldId id="363" r:id="rId8"/>
     <p:sldId id="364" r:id="rId9"/>
-    <p:sldId id="358" r:id="rId10"/>
-    <p:sldId id="359" r:id="rId11"/>
-    <p:sldId id="365" r:id="rId12"/>
-    <p:sldId id="366" r:id="rId13"/>
-    <p:sldId id="367" r:id="rId14"/>
-    <p:sldId id="368" r:id="rId15"/>
-    <p:sldId id="360" r:id="rId16"/>
-    <p:sldId id="361" r:id="rId17"/>
-    <p:sldId id="386" r:id="rId18"/>
-    <p:sldId id="384" r:id="rId19"/>
-    <p:sldId id="369" r:id="rId20"/>
-    <p:sldId id="370" r:id="rId21"/>
-    <p:sldId id="371" r:id="rId22"/>
-    <p:sldId id="372" r:id="rId23"/>
-    <p:sldId id="373" r:id="rId24"/>
-    <p:sldId id="374" r:id="rId25"/>
-    <p:sldId id="375" r:id="rId26"/>
-    <p:sldId id="376" r:id="rId27"/>
-    <p:sldId id="377" r:id="rId28"/>
-    <p:sldId id="378" r:id="rId29"/>
-    <p:sldId id="379" r:id="rId30"/>
-    <p:sldId id="380" r:id="rId31"/>
-    <p:sldId id="381" r:id="rId32"/>
-    <p:sldId id="382" r:id="rId33"/>
-    <p:sldId id="383" r:id="rId34"/>
-    <p:sldId id="362" r:id="rId35"/>
+    <p:sldId id="387" r:id="rId10"/>
+    <p:sldId id="358" r:id="rId11"/>
+    <p:sldId id="359" r:id="rId12"/>
+    <p:sldId id="365" r:id="rId13"/>
+    <p:sldId id="366" r:id="rId14"/>
+    <p:sldId id="367" r:id="rId15"/>
+    <p:sldId id="368" r:id="rId16"/>
+    <p:sldId id="360" r:id="rId17"/>
+    <p:sldId id="361" r:id="rId18"/>
+    <p:sldId id="386" r:id="rId19"/>
+    <p:sldId id="384" r:id="rId20"/>
+    <p:sldId id="369" r:id="rId21"/>
+    <p:sldId id="370" r:id="rId22"/>
+    <p:sldId id="371" r:id="rId23"/>
+    <p:sldId id="372" r:id="rId24"/>
+    <p:sldId id="373" r:id="rId25"/>
+    <p:sldId id="374" r:id="rId26"/>
+    <p:sldId id="375" r:id="rId27"/>
+    <p:sldId id="376" r:id="rId28"/>
+    <p:sldId id="377" r:id="rId29"/>
+    <p:sldId id="378" r:id="rId30"/>
+    <p:sldId id="379" r:id="rId31"/>
+    <p:sldId id="380" r:id="rId32"/>
+    <p:sldId id="381" r:id="rId33"/>
+    <p:sldId id="382" r:id="rId34"/>
+    <p:sldId id="383" r:id="rId35"/>
+    <p:sldId id="362" r:id="rId36"/>
   </p:sldIdLst>
   <p:sldSz cx="9144000" cy="6858000" type="screen4x3"/>
   <p:notesSz cx="6985000" cy="9283700"/>
@@ -1211,7 +1212,7 @@
                 </a:solidFill>
               </a:rPr>
               <a:pPr/>
-              <a:t>2/1/2016</a:t>
+              <a:t>2/2/2016</a:t>
             </a:fld>
             <a:endParaRPr lang="en-US">
               <a:solidFill>
@@ -1413,7 +1414,7 @@
                 </a:solidFill>
               </a:rPr>
               <a:pPr/>
-              <a:t>2/1/2016</a:t>
+              <a:t>2/2/2016</a:t>
             </a:fld>
             <a:endParaRPr lang="en-US">
               <a:solidFill>
@@ -1625,7 +1626,7 @@
                 </a:solidFill>
               </a:rPr>
               <a:pPr/>
-              <a:t>2/1/2016</a:t>
+              <a:t>2/2/2016</a:t>
             </a:fld>
             <a:endParaRPr lang="en-US">
               <a:solidFill>
@@ -2116,7 +2117,7 @@
                 </a:spcAft>
                 <a:defRPr/>
               </a:pPr>
-              <a:t>1 February 2016</a:t>
+              <a:t>2 February 2016</a:t>
             </a:fld>
             <a:endParaRPr lang="en-US" sz="1800">
               <a:solidFill>
@@ -2381,7 +2382,7 @@
                 </a:spcAft>
                 <a:defRPr/>
               </a:pPr>
-              <a:t>1 February 2016</a:t>
+              <a:t>2 February 2016</a:t>
             </a:fld>
             <a:endParaRPr lang="en-US" sz="1800">
               <a:solidFill>
@@ -2735,7 +2736,7 @@
                 </a:spcAft>
                 <a:defRPr/>
               </a:pPr>
-              <a:t>1 February 2016</a:t>
+              <a:t>2 February 2016</a:t>
             </a:fld>
             <a:endParaRPr lang="en-US" sz="1800">
               <a:solidFill>
@@ -3228,7 +3229,7 @@
                 </a:spcAft>
                 <a:defRPr/>
               </a:pPr>
-              <a:t>1 February 2016</a:t>
+              <a:t>2 February 2016</a:t>
             </a:fld>
             <a:endParaRPr lang="en-US" sz="1800">
               <a:solidFill>
@@ -3412,7 +3413,7 @@
                 </a:spcAft>
                 <a:defRPr/>
               </a:pPr>
-              <a:t>1 February 2016</a:t>
+              <a:t>2 February 2016</a:t>
             </a:fld>
             <a:endParaRPr lang="en-US" sz="1800">
               <a:solidFill>
@@ -3573,7 +3574,7 @@
                 </a:spcAft>
                 <a:defRPr/>
               </a:pPr>
-              <a:t>1 February 2016</a:t>
+              <a:t>2 February 2016</a:t>
             </a:fld>
             <a:endParaRPr lang="en-US" sz="1800">
               <a:solidFill>
@@ -3916,7 +3917,7 @@
                 </a:spcAft>
                 <a:defRPr/>
               </a:pPr>
-              <a:t>1 February 2016</a:t>
+              <a:t>2 February 2016</a:t>
             </a:fld>
             <a:endParaRPr lang="en-US" sz="1800">
               <a:solidFill>
@@ -4055,7 +4056,7 @@
                 </a:solidFill>
               </a:rPr>
               <a:pPr/>
-              <a:t>2/1/2016</a:t>
+              <a:t>2/2/2016</a:t>
             </a:fld>
             <a:endParaRPr lang="en-US">
               <a:solidFill>
@@ -4438,7 +4439,7 @@
                 </a:spcAft>
                 <a:defRPr/>
               </a:pPr>
-              <a:t>1 February 2016</a:t>
+              <a:t>2 February 2016</a:t>
             </a:fld>
             <a:endParaRPr lang="en-US" sz="1800">
               <a:solidFill>
@@ -4674,7 +4675,7 @@
                 </a:spcAft>
                 <a:defRPr/>
               </a:pPr>
-              <a:t>1 February 2016</a:t>
+              <a:t>2 February 2016</a:t>
             </a:fld>
             <a:endParaRPr lang="en-US" sz="1800">
               <a:solidFill>
@@ -4920,7 +4921,7 @@
                 </a:spcAft>
                 <a:defRPr/>
               </a:pPr>
-              <a:t>1 February 2016</a:t>
+              <a:t>2 February 2016</a:t>
             </a:fld>
             <a:endParaRPr lang="en-US" sz="1800">
               <a:solidFill>
@@ -5134,7 +5135,7 @@
                 </a:spcAft>
                 <a:defRPr/>
               </a:pPr>
-              <a:t>1 February 2016</a:t>
+              <a:t>2 February 2016</a:t>
             </a:fld>
             <a:endParaRPr lang="en-US" sz="1800">
               <a:solidFill>
@@ -5349,7 +5350,7 @@
                 </a:solidFill>
               </a:rPr>
               <a:pPr/>
-              <a:t>2/1/2016</a:t>
+              <a:t>2/2/2016</a:t>
             </a:fld>
             <a:endParaRPr lang="en-US">
               <a:solidFill>
@@ -5669,7 +5670,7 @@
                 </a:solidFill>
               </a:rPr>
               <a:pPr/>
-              <a:t>2/1/2016</a:t>
+              <a:t>2/2/2016</a:t>
             </a:fld>
             <a:endParaRPr lang="en-US">
               <a:solidFill>
@@ -6123,7 +6124,7 @@
                 </a:solidFill>
               </a:rPr>
               <a:pPr/>
-              <a:t>2/1/2016</a:t>
+              <a:t>2/2/2016</a:t>
             </a:fld>
             <a:endParaRPr lang="en-US">
               <a:solidFill>
@@ -6273,7 +6274,7 @@
                 </a:solidFill>
               </a:rPr>
               <a:pPr/>
-              <a:t>2/1/2016</a:t>
+              <a:t>2/2/2016</a:t>
             </a:fld>
             <a:endParaRPr lang="en-US">
               <a:solidFill>
@@ -6400,7 +6401,7 @@
                 </a:solidFill>
               </a:rPr>
               <a:pPr/>
-              <a:t>2/1/2016</a:t>
+              <a:t>2/2/2016</a:t>
             </a:fld>
             <a:endParaRPr lang="en-US">
               <a:solidFill>
@@ -6709,7 +6710,7 @@
                 </a:solidFill>
               </a:rPr>
               <a:pPr/>
-              <a:t>2/1/2016</a:t>
+              <a:t>2/2/2016</a:t>
             </a:fld>
             <a:endParaRPr lang="en-US">
               <a:solidFill>
@@ -6994,7 +6995,7 @@
                 </a:solidFill>
               </a:rPr>
               <a:pPr/>
-              <a:t>2/1/2016</a:t>
+              <a:t>2/2/2016</a:t>
             </a:fld>
             <a:endParaRPr lang="en-US">
               <a:solidFill>
@@ -7255,7 +7256,7 @@
                   <a:spcPts val="0"/>
                 </a:spcAft>
               </a:pPr>
-              <a:t>2/1/2016</a:t>
+              <a:t>2/2/2016</a:t>
             </a:fld>
             <a:endParaRPr lang="en-US">
               <a:solidFill>
@@ -8853,20 +8854,13 @@
           <a:p>
             <a:r>
               <a:rPr lang="en-US" sz="2200" u="sng" dirty="0" smtClean="0"/>
-              <a:t>Event 2</a:t>
+              <a:t>Event 1</a:t>
             </a:r>
             <a:r>
               <a:rPr lang="en-US" sz="2200" dirty="0" smtClean="0"/>
-              <a:t> - The propagation delay of the flip flops means a small delay occurs between the clock edge and the flip flop outputs, Q, becoming valid. This is the called the propagation delay of the flip flop and denoted </a:t>
-            </a:r>
-            <a:r>
-              <a:rPr lang="en-US" sz="2200" dirty="0" err="1" smtClean="0"/>
-              <a:t>T_ff</a:t>
-            </a:r>
-            <a:r>
-              <a:rPr lang="en-US" sz="2200" dirty="0" smtClean="0"/>
-              <a:t> in the diagram below.</a:t>
-            </a:r>
+              <a:t>- Since flip flops sample their inputs on the positive edge of the clock, this point is the beginning of the timing analysis.</a:t>
+            </a:r>
+            <a:endParaRPr lang="en-US" sz="2200" b="0" dirty="0"/>
           </a:p>
         </p:txBody>
       </p:sp>
@@ -8903,6 +8897,188 @@
                 <a:defRPr/>
               </a:pPr>
               <a:t>10</a:t>
+            </a:fld>
+            <a:endParaRPr lang="en-US" dirty="0">
+              <a:solidFill>
+                <a:srgbClr val="000000"/>
+              </a:solidFill>
+            </a:endParaRPr>
+          </a:p>
+        </p:txBody>
+      </p:sp>
+      <p:pic>
+        <p:nvPicPr>
+          <p:cNvPr id="6" name="Picture 2" descr="http://ece.ninja/383/lecture/img/lecture09-6.gif"/>
+          <p:cNvPicPr>
+            <a:picLocks noChangeAspect="1" noChangeArrowheads="1"/>
+          </p:cNvPicPr>
+          <p:nvPr/>
+        </p:nvPicPr>
+        <p:blipFill>
+          <a:blip r:embed="rId2">
+            <a:extLst>
+              <a:ext uri="{28A0092B-C50C-407E-A947-70E740481C1C}">
+                <a14:useLocalDpi xmlns:a14="http://schemas.microsoft.com/office/drawing/2010/main" val="0"/>
+              </a:ext>
+            </a:extLst>
+          </a:blip>
+          <a:srcRect/>
+          <a:stretch>
+            <a:fillRect/>
+          </a:stretch>
+        </p:blipFill>
+        <p:spPr bwMode="auto">
+          <a:xfrm>
+            <a:off x="592667" y="3196130"/>
+            <a:ext cx="7950200" cy="3224248"/>
+          </a:xfrm>
+          <a:prstGeom prst="rect">
+            <a:avLst/>
+          </a:prstGeom>
+          <a:noFill/>
+          <a:extLst>
+            <a:ext uri="{909E8E84-426E-40DD-AFC4-6F175D3DCCD1}">
+              <a14:hiddenFill xmlns:a14="http://schemas.microsoft.com/office/drawing/2010/main">
+                <a:solidFill>
+                  <a:srgbClr val="FFFFFF"/>
+                </a:solidFill>
+              </a14:hiddenFill>
+            </a:ext>
+          </a:extLst>
+        </p:spPr>
+      </p:pic>
+    </p:spTree>
+    <p:extLst>
+      <p:ext uri="{BB962C8B-B14F-4D97-AF65-F5344CB8AC3E}">
+        <p14:creationId xmlns:p14="http://schemas.microsoft.com/office/powerpoint/2010/main" val="2311777062"/>
+      </p:ext>
+    </p:extLst>
+  </p:cSld>
+  <p:clrMapOvr>
+    <a:masterClrMapping/>
+  </p:clrMapOvr>
+  <p:timing>
+    <p:tnLst>
+      <p:par>
+        <p:cTn id="1" dur="indefinite" restart="never" nodeType="tmRoot"/>
+      </p:par>
+    </p:tnLst>
+  </p:timing>
+</p:sld>
+</file>
+
+<file path=ppt/slides/slide11.xml><?xml version="1.0" encoding="utf-8"?>
+<p:sld xmlns:a="http://schemas.openxmlformats.org/drawingml/2006/main" xmlns:r="http://schemas.openxmlformats.org/officeDocument/2006/relationships" xmlns:p="http://schemas.openxmlformats.org/presentationml/2006/main">
+  <p:cSld>
+    <p:spTree>
+      <p:nvGrpSpPr>
+        <p:cNvPr id="1" name=""/>
+        <p:cNvGrpSpPr/>
+        <p:nvPr/>
+      </p:nvGrpSpPr>
+      <p:grpSpPr>
+        <a:xfrm>
+          <a:off x="0" y="0"/>
+          <a:ext cx="0" cy="0"/>
+          <a:chOff x="0" y="0"/>
+          <a:chExt cx="0" cy="0"/>
+        </a:xfrm>
+      </p:grpSpPr>
+      <p:sp>
+        <p:nvSpPr>
+          <p:cNvPr id="2" name="Title 1"/>
+          <p:cNvSpPr>
+            <a:spLocks noGrp="1"/>
+          </p:cNvSpPr>
+          <p:nvPr>
+            <p:ph type="title"/>
+          </p:nvPr>
+        </p:nvSpPr>
+        <p:spPr/>
+        <p:txBody>
+          <a:bodyPr/>
+          <a:lstStyle/>
+          <a:p>
+            <a:r>
+              <a:rPr lang="en-US" dirty="0" smtClean="0"/>
+              <a:t>FSM Timing</a:t>
+            </a:r>
+            <a:endParaRPr lang="en-US" dirty="0"/>
+          </a:p>
+        </p:txBody>
+      </p:sp>
+      <p:sp>
+        <p:nvSpPr>
+          <p:cNvPr id="4" name="Content Placeholder 3"/>
+          <p:cNvSpPr>
+            <a:spLocks noGrp="1"/>
+          </p:cNvSpPr>
+          <p:nvPr>
+            <p:ph idx="1"/>
+          </p:nvPr>
+        </p:nvSpPr>
+        <p:spPr>
+          <a:xfrm>
+            <a:off x="581736" y="1523052"/>
+            <a:ext cx="8131175" cy="4324350"/>
+          </a:xfrm>
+        </p:spPr>
+        <p:txBody>
+          <a:bodyPr/>
+          <a:lstStyle/>
+          <a:p>
+            <a:r>
+              <a:rPr lang="en-US" sz="2200" u="sng" dirty="0" smtClean="0"/>
+              <a:t>Event 2</a:t>
+            </a:r>
+            <a:r>
+              <a:rPr lang="en-US" sz="2200" dirty="0" smtClean="0"/>
+              <a:t> - The propagation delay of the flip flops means a small delay occurs between the clock edge and the flip flop outputs, Q, becoming valid. This is the called the propagation delay of the flip flop and denoted </a:t>
+            </a:r>
+            <a:r>
+              <a:rPr lang="en-US" sz="2200" dirty="0" err="1" smtClean="0"/>
+              <a:t>T_ff</a:t>
+            </a:r>
+            <a:r>
+              <a:rPr lang="en-US" sz="2200" dirty="0" smtClean="0"/>
+              <a:t> in the diagram below.</a:t>
+            </a:r>
+          </a:p>
+        </p:txBody>
+      </p:sp>
+      <p:sp>
+        <p:nvSpPr>
+          <p:cNvPr id="5" name="Slide Number Placeholder 3"/>
+          <p:cNvSpPr>
+            <a:spLocks noGrp="1"/>
+          </p:cNvSpPr>
+          <p:nvPr>
+            <p:ph type="sldNum" sz="quarter" idx="10"/>
+          </p:nvPr>
+        </p:nvSpPr>
+        <p:spPr>
+          <a:xfrm>
+            <a:off x="6910388" y="6253163"/>
+            <a:ext cx="2133600" cy="476250"/>
+          </a:xfrm>
+        </p:spPr>
+        <p:txBody>
+          <a:bodyPr/>
+          <a:lstStyle/>
+          <a:p>
+            <a:pPr>
+              <a:defRPr/>
+            </a:pPr>
+            <a:fld id="{62D6D4B2-7611-498F-8780-1EDC26277454}" type="slidenum">
+              <a:rPr lang="en-US" smtClean="0">
+                <a:solidFill>
+                  <a:srgbClr val="000000"/>
+                </a:solidFill>
+              </a:rPr>
+              <a:pPr>
+                <a:defRPr/>
+              </a:pPr>
+              <a:t>11</a:t>
             </a:fld>
             <a:endParaRPr lang="en-US" dirty="0">
               <a:solidFill>
@@ -8973,7 +9149,7 @@
 </p:sld>
 </file>
 
-<file path=ppt/slides/slide11.xml><?xml version="1.0" encoding="utf-8"?>
+<file path=ppt/slides/slide12.xml><?xml version="1.0" encoding="utf-8"?>
 <p:sld xmlns:a="http://schemas.openxmlformats.org/drawingml/2006/main" xmlns:r="http://schemas.openxmlformats.org/officeDocument/2006/relationships" xmlns:p="http://schemas.openxmlformats.org/presentationml/2006/main">
   <p:cSld>
     <p:spTree>
@@ -9076,7 +9252,7 @@
               <a:pPr>
                 <a:defRPr/>
               </a:pPr>
-              <a:t>11</a:t>
+              <a:t>12</a:t>
             </a:fld>
             <a:endParaRPr lang="en-US" dirty="0">
               <a:solidFill>
@@ -9147,7 +9323,7 @@
 </p:sld>
 </file>
 
-<file path=ppt/slides/slide12.xml><?xml version="1.0" encoding="utf-8"?>
+<file path=ppt/slides/slide13.xml><?xml version="1.0" encoding="utf-8"?>
 <p:sld xmlns:a="http://schemas.openxmlformats.org/drawingml/2006/main" xmlns:r="http://schemas.openxmlformats.org/officeDocument/2006/relationships" xmlns:p="http://schemas.openxmlformats.org/presentationml/2006/main">
   <p:cSld>
     <p:spTree>
@@ -9259,7 +9435,7 @@
               <a:pPr>
                 <a:defRPr/>
               </a:pPr>
-              <a:t>12</a:t>
+              <a:t>13</a:t>
             </a:fld>
             <a:endParaRPr lang="en-US" dirty="0">
               <a:solidFill>
@@ -9330,7 +9506,7 @@
 </p:sld>
 </file>
 
-<file path=ppt/slides/slide13.xml><?xml version="1.0" encoding="utf-8"?>
+<file path=ppt/slides/slide14.xml><?xml version="1.0" encoding="utf-8"?>
 <p:sld xmlns:a="http://schemas.openxmlformats.org/drawingml/2006/main" xmlns:r="http://schemas.openxmlformats.org/officeDocument/2006/relationships" xmlns:p="http://schemas.openxmlformats.org/presentationml/2006/main">
   <p:cSld>
     <p:spTree>
@@ -9445,7 +9621,7 @@
               <a:pPr>
                 <a:defRPr/>
               </a:pPr>
-              <a:t>13</a:t>
+              <a:t>14</a:t>
             </a:fld>
             <a:endParaRPr lang="en-US" dirty="0">
               <a:solidFill>
@@ -9516,7 +9692,7 @@
 </p:sld>
 </file>
 
-<file path=ppt/slides/slide14.xml><?xml version="1.0" encoding="utf-8"?>
+<file path=ppt/slides/slide15.xml><?xml version="1.0" encoding="utf-8"?>
 <p:sld xmlns:a="http://schemas.openxmlformats.org/drawingml/2006/main" xmlns:r="http://schemas.openxmlformats.org/officeDocument/2006/relationships" xmlns:p="http://schemas.openxmlformats.org/presentationml/2006/main">
   <p:cSld>
     <p:spTree>
@@ -9606,7 +9782,7 @@
               <a:pPr>
                 <a:defRPr/>
               </a:pPr>
-              <a:t>14</a:t>
+              <a:t>15</a:t>
             </a:fld>
             <a:endParaRPr lang="en-US" dirty="0">
               <a:solidFill>
@@ -9636,7 +9812,7 @@
 </p:sld>
 </file>
 
-<file path=ppt/slides/slide15.xml><?xml version="1.0" encoding="utf-8"?>
+<file path=ppt/slides/slide16.xml><?xml version="1.0" encoding="utf-8"?>
 <p:sld xmlns:a="http://schemas.openxmlformats.org/drawingml/2006/main" xmlns:r="http://schemas.openxmlformats.org/officeDocument/2006/relationships" xmlns:p="http://schemas.openxmlformats.org/presentationml/2006/main">
   <p:cSld>
     <p:spTree>
@@ -9817,7 +9993,7 @@
               <a:pPr>
                 <a:defRPr/>
               </a:pPr>
-              <a:t>15</a:t>
+              <a:t>16</a:t>
             </a:fld>
             <a:endParaRPr lang="en-US" dirty="0">
               <a:solidFill>
@@ -9981,7 +10157,7 @@
 </p:sld>
 </file>
 
-<file path=ppt/slides/slide16.xml><?xml version="1.0" encoding="utf-8"?>
+<file path=ppt/slides/slide17.xml><?xml version="1.0" encoding="utf-8"?>
 <p:sld xmlns:a="http://schemas.openxmlformats.org/drawingml/2006/main" xmlns:r="http://schemas.openxmlformats.org/officeDocument/2006/relationships" xmlns:p="http://schemas.openxmlformats.org/presentationml/2006/main">
   <p:cSld>
     <p:spTree>
@@ -10119,7 +10295,7 @@
               <a:pPr>
                 <a:defRPr/>
               </a:pPr>
-              <a:t>16</a:t>
+              <a:t>17</a:t>
             </a:fld>
             <a:endParaRPr lang="en-US" dirty="0">
               <a:solidFill>
@@ -10283,7 +10459,7 @@
 </p:sld>
 </file>
 
-<file path=ppt/slides/slide17.xml><?xml version="1.0" encoding="utf-8"?>
+<file path=ppt/slides/slide18.xml><?xml version="1.0" encoding="utf-8"?>
 <p:sld xmlns:a="http://schemas.openxmlformats.org/drawingml/2006/main" xmlns:r="http://schemas.openxmlformats.org/officeDocument/2006/relationships" xmlns:p="http://schemas.openxmlformats.org/presentationml/2006/main">
   <p:cSld>
     <p:spTree>
@@ -10390,7 +10566,7 @@
               <a:pPr>
                 <a:defRPr/>
               </a:pPr>
-              <a:t>17</a:t>
+              <a:t>18</a:t>
             </a:fld>
             <a:endParaRPr lang="en-US" dirty="0">
               <a:solidFill>
@@ -10459,7 +10635,7 @@
 </p:sld>
 </file>
 
-<file path=ppt/slides/slide18.xml><?xml version="1.0" encoding="utf-8"?>
+<file path=ppt/slides/slide19.xml><?xml version="1.0" encoding="utf-8"?>
 <p:sld xmlns:a="http://schemas.openxmlformats.org/drawingml/2006/main" xmlns:r="http://schemas.openxmlformats.org/officeDocument/2006/relationships" xmlns:p="http://schemas.openxmlformats.org/presentationml/2006/main">
   <p:cSld>
     <p:spTree>
@@ -10566,7 +10742,7 @@
               <a:pPr>
                 <a:defRPr/>
               </a:pPr>
-              <a:t>18</a:t>
+              <a:t>19</a:t>
             </a:fld>
             <a:endParaRPr lang="en-US" dirty="0">
               <a:solidFill>
@@ -10635,7 +10811,7 @@
 </p:sld>
 </file>
 
-<file path=ppt/slides/slide19.xml><?xml version="1.0" encoding="utf-8"?>
+<file path=ppt/slides/slide2.xml><?xml version="1.0" encoding="utf-8"?>
 <p:sld xmlns:a="http://schemas.openxmlformats.org/drawingml/2006/main" xmlns:r="http://schemas.openxmlformats.org/officeDocument/2006/relationships" xmlns:p="http://schemas.openxmlformats.org/presentationml/2006/main">
   <p:cSld>
     <p:spTree>
@@ -10668,6 +10844,187 @@
           <a:lstStyle/>
           <a:p>
             <a:r>
+              <a:rPr lang="en-US" dirty="0" smtClean="0"/>
+              <a:t>Lesson Outline</a:t>
+            </a:r>
+            <a:endParaRPr lang="en-US" dirty="0"/>
+          </a:p>
+        </p:txBody>
+      </p:sp>
+      <p:sp>
+        <p:nvSpPr>
+          <p:cNvPr id="4" name="Content Placeholder 3"/>
+          <p:cNvSpPr>
+            <a:spLocks noGrp="1"/>
+          </p:cNvSpPr>
+          <p:nvPr>
+            <p:ph idx="1"/>
+          </p:nvPr>
+        </p:nvSpPr>
+        <p:spPr/>
+        <p:txBody>
+          <a:bodyPr/>
+          <a:lstStyle/>
+          <a:p>
+            <a:pPr marL="514350" indent="-514350" eaLnBrk="1" hangingPunct="1">
+              <a:lnSpc>
+                <a:spcPct val="80000"/>
+              </a:lnSpc>
+              <a:buFont typeface="+mj-lt"/>
+              <a:buAutoNum type="arabicPeriod"/>
+            </a:pPr>
+            <a:r>
+              <a:rPr lang="en-US" sz="2800" dirty="0" smtClean="0"/>
+              <a:t>D Flip Flop</a:t>
+            </a:r>
+          </a:p>
+          <a:p>
+            <a:pPr marL="514350" indent="-514350" eaLnBrk="1" hangingPunct="1">
+              <a:lnSpc>
+                <a:spcPct val="80000"/>
+              </a:lnSpc>
+              <a:buFont typeface="+mj-lt"/>
+              <a:buAutoNum type="arabicPeriod"/>
+            </a:pPr>
+            <a:r>
+              <a:rPr lang="en-US" sz="2800" dirty="0" smtClean="0"/>
+              <a:t>Finite State Machine</a:t>
+            </a:r>
+          </a:p>
+          <a:p>
+            <a:pPr marL="514350" indent="-514350" eaLnBrk="1" hangingPunct="1">
+              <a:lnSpc>
+                <a:spcPct val="80000"/>
+              </a:lnSpc>
+              <a:buFont typeface="+mj-lt"/>
+              <a:buAutoNum type="arabicPeriod"/>
+            </a:pPr>
+            <a:r>
+              <a:rPr lang="en-US" sz="2800" dirty="0" smtClean="0"/>
+              <a:t>FSM Timing</a:t>
+            </a:r>
+          </a:p>
+          <a:p>
+            <a:pPr marL="514350" indent="-514350" eaLnBrk="1" hangingPunct="1">
+              <a:lnSpc>
+                <a:spcPct val="80000"/>
+              </a:lnSpc>
+              <a:buFont typeface="+mj-lt"/>
+              <a:buAutoNum type="arabicPeriod"/>
+            </a:pPr>
+            <a:r>
+              <a:rPr lang="en-US" sz="2800" dirty="0" smtClean="0"/>
+              <a:t>The DAISY System</a:t>
+            </a:r>
+          </a:p>
+          <a:p>
+            <a:pPr eaLnBrk="1" hangingPunct="1">
+              <a:lnSpc>
+                <a:spcPct val="80000"/>
+              </a:lnSpc>
+            </a:pPr>
+            <a:endParaRPr lang="en-US" dirty="0" smtClean="0"/>
+          </a:p>
+          <a:p>
+            <a:endParaRPr lang="en-US" dirty="0"/>
+          </a:p>
+        </p:txBody>
+      </p:sp>
+      <p:sp>
+        <p:nvSpPr>
+          <p:cNvPr id="5" name="Slide Number Placeholder 3"/>
+          <p:cNvSpPr>
+            <a:spLocks noGrp="1"/>
+          </p:cNvSpPr>
+          <p:nvPr>
+            <p:ph type="sldNum" sz="quarter" idx="10"/>
+          </p:nvPr>
+        </p:nvSpPr>
+        <p:spPr>
+          <a:xfrm>
+            <a:off x="6910388" y="6253163"/>
+            <a:ext cx="2133600" cy="476250"/>
+          </a:xfrm>
+        </p:spPr>
+        <p:txBody>
+          <a:bodyPr/>
+          <a:lstStyle/>
+          <a:p>
+            <a:pPr>
+              <a:defRPr/>
+            </a:pPr>
+            <a:fld id="{62D6D4B2-7611-498F-8780-1EDC26277454}" type="slidenum">
+              <a:rPr lang="en-US" smtClean="0">
+                <a:solidFill>
+                  <a:srgbClr val="000000"/>
+                </a:solidFill>
+              </a:rPr>
+              <a:pPr>
+                <a:defRPr/>
+              </a:pPr>
+              <a:t>2</a:t>
+            </a:fld>
+            <a:endParaRPr lang="en-US" dirty="0">
+              <a:solidFill>
+                <a:srgbClr val="000000"/>
+              </a:solidFill>
+            </a:endParaRPr>
+          </a:p>
+        </p:txBody>
+      </p:sp>
+    </p:spTree>
+    <p:extLst>
+      <p:ext uri="{BB962C8B-B14F-4D97-AF65-F5344CB8AC3E}">
+        <p14:creationId xmlns:p14="http://schemas.microsoft.com/office/powerpoint/2010/main" val="3991601210"/>
+      </p:ext>
+    </p:extLst>
+  </p:cSld>
+  <p:clrMapOvr>
+    <a:masterClrMapping/>
+  </p:clrMapOvr>
+  <p:timing>
+    <p:tnLst>
+      <p:par>
+        <p:cTn id="1" dur="indefinite" restart="never" nodeType="tmRoot"/>
+      </p:par>
+    </p:tnLst>
+  </p:timing>
+</p:sld>
+</file>
+
+<file path=ppt/slides/slide20.xml><?xml version="1.0" encoding="utf-8"?>
+<p:sld xmlns:a="http://schemas.openxmlformats.org/drawingml/2006/main" xmlns:r="http://schemas.openxmlformats.org/officeDocument/2006/relationships" xmlns:p="http://schemas.openxmlformats.org/presentationml/2006/main">
+  <p:cSld>
+    <p:spTree>
+      <p:nvGrpSpPr>
+        <p:cNvPr id="1" name=""/>
+        <p:cNvGrpSpPr/>
+        <p:nvPr/>
+      </p:nvGrpSpPr>
+      <p:grpSpPr>
+        <a:xfrm>
+          <a:off x="0" y="0"/>
+          <a:ext cx="0" cy="0"/>
+          <a:chOff x="0" y="0"/>
+          <a:chExt cx="0" cy="0"/>
+        </a:xfrm>
+      </p:grpSpPr>
+      <p:sp>
+        <p:nvSpPr>
+          <p:cNvPr id="2" name="Title 1"/>
+          <p:cNvSpPr>
+            <a:spLocks noGrp="1"/>
+          </p:cNvSpPr>
+          <p:nvPr>
+            <p:ph type="title"/>
+          </p:nvPr>
+        </p:nvSpPr>
+        <p:spPr/>
+        <p:txBody>
+          <a:bodyPr/>
+          <a:lstStyle/>
+          <a:p>
+            <a:r>
               <a:rPr lang="en-US" dirty="0"/>
               <a:t>The DAISY </a:t>
             </a:r>
@@ -10742,7 +11099,7 @@
               <a:pPr>
                 <a:defRPr/>
               </a:pPr>
-              <a:t>19</a:t>
+              <a:t>20</a:t>
             </a:fld>
             <a:endParaRPr lang="en-US" dirty="0">
               <a:solidFill>
@@ -10811,7 +11168,7 @@
 </p:sld>
 </file>
 
-<file path=ppt/slides/slide2.xml><?xml version="1.0" encoding="utf-8"?>
+<file path=ppt/slides/slide21.xml><?xml version="1.0" encoding="utf-8"?>
 <p:sld xmlns:a="http://schemas.openxmlformats.org/drawingml/2006/main" xmlns:r="http://schemas.openxmlformats.org/officeDocument/2006/relationships" xmlns:p="http://schemas.openxmlformats.org/presentationml/2006/main">
   <p:cSld>
     <p:spTree>
@@ -10844,8 +11201,12 @@
           <a:lstStyle/>
           <a:p>
             <a:r>
+              <a:rPr lang="en-US" dirty="0"/>
+              <a:t>The DAISY </a:t>
+            </a:r>
+            <a:r>
               <a:rPr lang="en-US" dirty="0" smtClean="0"/>
-              <a:t>Lesson Outline</a:t>
+              <a:t>System</a:t>
             </a:r>
             <a:endParaRPr lang="en-US" dirty="0"/>
           </a:p>
@@ -10861,72 +11222,25 @@
             <p:ph idx="1"/>
           </p:nvPr>
         </p:nvSpPr>
-        <p:spPr/>
+        <p:spPr>
+          <a:xfrm>
+            <a:off x="581736" y="1523052"/>
+            <a:ext cx="8131175" cy="4324350"/>
+          </a:xfrm>
+        </p:spPr>
         <p:txBody>
           <a:bodyPr/>
           <a:lstStyle/>
           <a:p>
-            <a:pPr marL="514350" indent="-514350" eaLnBrk="1" hangingPunct="1">
-              <a:lnSpc>
-                <a:spcPct val="80000"/>
-              </a:lnSpc>
-              <a:buFont typeface="+mj-lt"/>
-              <a:buAutoNum type="arabicPeriod"/>
-            </a:pPr>
-            <a:r>
-              <a:rPr lang="en-US" sz="2800" dirty="0" smtClean="0"/>
-              <a:t>D Flip Flop</a:t>
-            </a:r>
-          </a:p>
-          <a:p>
-            <a:pPr marL="514350" indent="-514350" eaLnBrk="1" hangingPunct="1">
-              <a:lnSpc>
-                <a:spcPct val="80000"/>
-              </a:lnSpc>
-              <a:buFont typeface="+mj-lt"/>
-              <a:buAutoNum type="arabicPeriod"/>
-            </a:pPr>
-            <a:r>
-              <a:rPr lang="en-US" sz="2800" dirty="0" smtClean="0"/>
-              <a:t>Finite State Machine</a:t>
-            </a:r>
-          </a:p>
-          <a:p>
-            <a:pPr marL="514350" indent="-514350" eaLnBrk="1" hangingPunct="1">
-              <a:lnSpc>
-                <a:spcPct val="80000"/>
-              </a:lnSpc>
-              <a:buFont typeface="+mj-lt"/>
-              <a:buAutoNum type="arabicPeriod"/>
-            </a:pPr>
-            <a:r>
-              <a:rPr lang="en-US" sz="2800" dirty="0" smtClean="0"/>
-              <a:t>FSM Timing</a:t>
-            </a:r>
-          </a:p>
-          <a:p>
-            <a:pPr marL="514350" indent="-514350" eaLnBrk="1" hangingPunct="1">
-              <a:lnSpc>
-                <a:spcPct val="80000"/>
-              </a:lnSpc>
-              <a:buFont typeface="+mj-lt"/>
-              <a:buAutoNum type="arabicPeriod"/>
-            </a:pPr>
-            <a:r>
-              <a:rPr lang="en-US" sz="2800" dirty="0" smtClean="0"/>
-              <a:t>The DAISY System</a:t>
-            </a:r>
-          </a:p>
-          <a:p>
-            <a:pPr eaLnBrk="1" hangingPunct="1">
-              <a:lnSpc>
-                <a:spcPct val="80000"/>
-              </a:lnSpc>
-            </a:pPr>
-            <a:endParaRPr lang="en-US" dirty="0" smtClean="0"/>
-          </a:p>
-          <a:p>
-            <a:endParaRPr lang="en-US" dirty="0"/>
+            <a:r>
+              <a:rPr lang="en-US" b="0" u="sng" dirty="0" smtClean="0"/>
+              <a:t>Step 4</a:t>
+            </a:r>
+            <a:r>
+              <a:rPr lang="en-US" b="0" dirty="0" smtClean="0"/>
+              <a:t> - Gate2 is raised allowing cow A to leave. If the cow takes more than 30 seconds to leave, then the cow is "goosed" by a three-second burst of compressed air. An air bust is repeated at 30-second intervals until the cow leaves the chute. At any time when the cow leaves the chute, Gate 2 is closed and the system transitions back to Step 1.</a:t>
+            </a:r>
+            <a:endParaRPr lang="en-US" b="0" dirty="0"/>
           </a:p>
         </p:txBody>
       </p:sp>
@@ -10962,145 +11276,7 @@
               <a:pPr>
                 <a:defRPr/>
               </a:pPr>
-              <a:t>2</a:t>
-            </a:fld>
-            <a:endParaRPr lang="en-US" dirty="0">
-              <a:solidFill>
-                <a:srgbClr val="000000"/>
-              </a:solidFill>
-            </a:endParaRPr>
-          </a:p>
-        </p:txBody>
-      </p:sp>
-    </p:spTree>
-    <p:extLst>
-      <p:ext uri="{BB962C8B-B14F-4D97-AF65-F5344CB8AC3E}">
-        <p14:creationId xmlns:p14="http://schemas.microsoft.com/office/powerpoint/2010/main" val="3991601210"/>
-      </p:ext>
-    </p:extLst>
-  </p:cSld>
-  <p:clrMapOvr>
-    <a:masterClrMapping/>
-  </p:clrMapOvr>
-  <p:timing>
-    <p:tnLst>
-      <p:par>
-        <p:cTn id="1" dur="indefinite" restart="never" nodeType="tmRoot"/>
-      </p:par>
-    </p:tnLst>
-  </p:timing>
-</p:sld>
-</file>
-
-<file path=ppt/slides/slide20.xml><?xml version="1.0" encoding="utf-8"?>
-<p:sld xmlns:a="http://schemas.openxmlformats.org/drawingml/2006/main" xmlns:r="http://schemas.openxmlformats.org/officeDocument/2006/relationships" xmlns:p="http://schemas.openxmlformats.org/presentationml/2006/main">
-  <p:cSld>
-    <p:spTree>
-      <p:nvGrpSpPr>
-        <p:cNvPr id="1" name=""/>
-        <p:cNvGrpSpPr/>
-        <p:nvPr/>
-      </p:nvGrpSpPr>
-      <p:grpSpPr>
-        <a:xfrm>
-          <a:off x="0" y="0"/>
-          <a:ext cx="0" cy="0"/>
-          <a:chOff x="0" y="0"/>
-          <a:chExt cx="0" cy="0"/>
-        </a:xfrm>
-      </p:grpSpPr>
-      <p:sp>
-        <p:nvSpPr>
-          <p:cNvPr id="2" name="Title 1"/>
-          <p:cNvSpPr>
-            <a:spLocks noGrp="1"/>
-          </p:cNvSpPr>
-          <p:nvPr>
-            <p:ph type="title"/>
-          </p:nvPr>
-        </p:nvSpPr>
-        <p:spPr/>
-        <p:txBody>
-          <a:bodyPr/>
-          <a:lstStyle/>
-          <a:p>
-            <a:r>
-              <a:rPr lang="en-US" dirty="0"/>
-              <a:t>The DAISY </a:t>
-            </a:r>
-            <a:r>
-              <a:rPr lang="en-US" dirty="0" smtClean="0"/>
-              <a:t>System</a:t>
-            </a:r>
-            <a:endParaRPr lang="en-US" dirty="0"/>
-          </a:p>
-        </p:txBody>
-      </p:sp>
-      <p:sp>
-        <p:nvSpPr>
-          <p:cNvPr id="4" name="Content Placeholder 3"/>
-          <p:cNvSpPr>
-            <a:spLocks noGrp="1"/>
-          </p:cNvSpPr>
-          <p:nvPr>
-            <p:ph idx="1"/>
-          </p:nvPr>
-        </p:nvSpPr>
-        <p:spPr>
-          <a:xfrm>
-            <a:off x="581736" y="1523052"/>
-            <a:ext cx="8131175" cy="4324350"/>
-          </a:xfrm>
-        </p:spPr>
-        <p:txBody>
-          <a:bodyPr/>
-          <a:lstStyle/>
-          <a:p>
-            <a:r>
-              <a:rPr lang="en-US" b="0" u="sng" dirty="0" smtClean="0"/>
-              <a:t>Step 4</a:t>
-            </a:r>
-            <a:r>
-              <a:rPr lang="en-US" b="0" dirty="0" smtClean="0"/>
-              <a:t> - Gate2 is raised allowing cow A to leave. If the cow takes more than 30 seconds to leave, then the cow is "goosed" by a three-second burst of compressed air. An air bust is repeated at 30-second intervals until the cow leaves the chute. At any time when the cow leaves the chute, Gate 2 is closed and the system transitions back to Step 1.</a:t>
-            </a:r>
-            <a:endParaRPr lang="en-US" b="0" dirty="0"/>
-          </a:p>
-        </p:txBody>
-      </p:sp>
-      <p:sp>
-        <p:nvSpPr>
-          <p:cNvPr id="5" name="Slide Number Placeholder 3"/>
-          <p:cNvSpPr>
-            <a:spLocks noGrp="1"/>
-          </p:cNvSpPr>
-          <p:nvPr>
-            <p:ph type="sldNum" sz="quarter" idx="10"/>
-          </p:nvPr>
-        </p:nvSpPr>
-        <p:spPr>
-          <a:xfrm>
-            <a:off x="6910388" y="6253163"/>
-            <a:ext cx="2133600" cy="476250"/>
-          </a:xfrm>
-        </p:spPr>
-        <p:txBody>
-          <a:bodyPr/>
-          <a:lstStyle/>
-          <a:p>
-            <a:pPr>
-              <a:defRPr/>
-            </a:pPr>
-            <a:fld id="{62D6D4B2-7611-498F-8780-1EDC26277454}" type="slidenum">
-              <a:rPr lang="en-US" smtClean="0">
-                <a:solidFill>
-                  <a:srgbClr val="000000"/>
-                </a:solidFill>
-              </a:rPr>
-              <a:pPr>
-                <a:defRPr/>
-              </a:pPr>
-              <a:t>20</a:t>
+              <a:t>21</a:t>
             </a:fld>
             <a:endParaRPr lang="en-US" dirty="0">
               <a:solidFill>
@@ -11169,7 +11345,7 @@
 </p:sld>
 </file>
 
-<file path=ppt/slides/slide21.xml><?xml version="1.0" encoding="utf-8"?>
+<file path=ppt/slides/slide22.xml><?xml version="1.0" encoding="utf-8"?>
 <p:sld xmlns:a="http://schemas.openxmlformats.org/drawingml/2006/main" xmlns:r="http://schemas.openxmlformats.org/officeDocument/2006/relationships" xmlns:p="http://schemas.openxmlformats.org/presentationml/2006/main">
   <p:cSld>
     <p:spTree>
@@ -11269,7 +11445,7 @@
               <a:pPr>
                 <a:defRPr/>
               </a:pPr>
-              <a:t>21</a:t>
+              <a:t>22</a:t>
             </a:fld>
             <a:endParaRPr lang="en-US" dirty="0">
               <a:solidFill>
@@ -11340,7 +11516,7 @@
 </p:sld>
 </file>
 
-<file path=ppt/slides/slide22.xml><?xml version="1.0" encoding="utf-8"?>
+<file path=ppt/slides/slide23.xml><?xml version="1.0" encoding="utf-8"?>
 <p:sld xmlns:a="http://schemas.openxmlformats.org/drawingml/2006/main" xmlns:r="http://schemas.openxmlformats.org/officeDocument/2006/relationships" xmlns:p="http://schemas.openxmlformats.org/presentationml/2006/main">
   <p:cSld>
     <p:spTree>
@@ -11444,7 +11620,7 @@
               <a:pPr>
                 <a:defRPr/>
               </a:pPr>
-              <a:t>22</a:t>
+              <a:t>23</a:t>
             </a:fld>
             <a:endParaRPr lang="en-US" dirty="0">
               <a:solidFill>
@@ -11515,7 +11691,7 @@
 </p:sld>
 </file>
 
-<file path=ppt/slides/slide23.xml><?xml version="1.0" encoding="utf-8"?>
+<file path=ppt/slides/slide24.xml><?xml version="1.0" encoding="utf-8"?>
 <p:sld xmlns:a="http://schemas.openxmlformats.org/drawingml/2006/main" xmlns:r="http://schemas.openxmlformats.org/officeDocument/2006/relationships" xmlns:p="http://schemas.openxmlformats.org/presentationml/2006/main">
   <p:cSld>
     <p:spTree>
@@ -11633,7 +11809,7 @@
               <a:pPr>
                 <a:defRPr/>
               </a:pPr>
-              <a:t>23</a:t>
+              <a:t>24</a:t>
             </a:fld>
             <a:endParaRPr lang="en-US" dirty="0">
               <a:solidFill>
@@ -13695,7 +13871,7 @@
 </p:sld>
 </file>
 
-<file path=ppt/slides/slide24.xml><?xml version="1.0" encoding="utf-8"?>
+<file path=ppt/slides/slide25.xml><?xml version="1.0" encoding="utf-8"?>
 <p:sld xmlns:a="http://schemas.openxmlformats.org/drawingml/2006/main" xmlns:r="http://schemas.openxmlformats.org/officeDocument/2006/relationships" xmlns:p="http://schemas.openxmlformats.org/presentationml/2006/main">
   <p:cSld>
     <p:spTree>
@@ -13901,7 +14077,7 @@
               <a:pPr>
                 <a:defRPr/>
               </a:pPr>
-              <a:t>24</a:t>
+              <a:t>25</a:t>
             </a:fld>
             <a:endParaRPr lang="en-US" dirty="0">
               <a:solidFill>
@@ -14638,7 +14814,7 @@
 </p:sld>
 </file>
 
-<file path=ppt/slides/slide25.xml><?xml version="1.0" encoding="utf-8"?>
+<file path=ppt/slides/slide26.xml><?xml version="1.0" encoding="utf-8"?>
 <p:sld xmlns:a="http://schemas.openxmlformats.org/drawingml/2006/main" xmlns:r="http://schemas.openxmlformats.org/officeDocument/2006/relationships" xmlns:p="http://schemas.openxmlformats.org/presentationml/2006/main">
   <p:cSld>
     <p:spTree>
@@ -14763,7 +14939,7 @@
               <a:pPr>
                 <a:defRPr/>
               </a:pPr>
-              <a:t>25</a:t>
+              <a:t>26</a:t>
             </a:fld>
             <a:endParaRPr lang="en-US" dirty="0">
               <a:solidFill>
@@ -15962,7 +16138,7 @@
 </p:sld>
 </file>
 
-<file path=ppt/slides/slide26.xml><?xml version="1.0" encoding="utf-8"?>
+<file path=ppt/slides/slide27.xml><?xml version="1.0" encoding="utf-8"?>
 <p:sld xmlns:a="http://schemas.openxmlformats.org/drawingml/2006/main" xmlns:r="http://schemas.openxmlformats.org/officeDocument/2006/relationships" xmlns:p="http://schemas.openxmlformats.org/presentationml/2006/main">
   <p:cSld>
     <p:spTree>
@@ -16076,7 +16252,7 @@
               <a:pPr>
                 <a:defRPr/>
               </a:pPr>
-              <a:t>26</a:t>
+              <a:t>27</a:t>
             </a:fld>
             <a:endParaRPr lang="en-US" dirty="0">
               <a:solidFill>
@@ -16338,7 +16514,7 @@
 </p:sld>
 </file>
 
-<file path=ppt/slides/slide27.xml><?xml version="1.0" encoding="utf-8"?>
+<file path=ppt/slides/slide28.xml><?xml version="1.0" encoding="utf-8"?>
 <p:sld xmlns:a="http://schemas.openxmlformats.org/drawingml/2006/main" xmlns:r="http://schemas.openxmlformats.org/officeDocument/2006/relationships" xmlns:p="http://schemas.openxmlformats.org/presentationml/2006/main">
   <p:cSld>
     <p:spTree>
@@ -16438,7 +16614,7 @@
               <a:pPr>
                 <a:defRPr/>
               </a:pPr>
-              <a:t>27</a:t>
+              <a:t>28</a:t>
             </a:fld>
             <a:endParaRPr lang="en-US" dirty="0">
               <a:solidFill>
@@ -17149,7 +17325,7 @@
 </p:sld>
 </file>
 
-<file path=ppt/slides/slide28.xml><?xml version="1.0" encoding="utf-8"?>
+<file path=ppt/slides/slide29.xml><?xml version="1.0" encoding="utf-8"?>
 <p:sld xmlns:a="http://schemas.openxmlformats.org/drawingml/2006/main" xmlns:r="http://schemas.openxmlformats.org/officeDocument/2006/relationships" xmlns:p="http://schemas.openxmlformats.org/presentationml/2006/main">
   <p:cSld>
     <p:spTree>
@@ -17249,7 +17425,7 @@
               <a:pPr>
                 <a:defRPr/>
               </a:pPr>
-              <a:t>28</a:t>
+              <a:t>29</a:t>
             </a:fld>
             <a:endParaRPr lang="en-US" dirty="0">
               <a:solidFill>
@@ -17552,7 +17728,123 @@
 </p:sld>
 </file>
 
-<file path=ppt/slides/slide29.xml><?xml version="1.0" encoding="utf-8"?>
+<file path=ppt/slides/slide3.xml><?xml version="1.0" encoding="utf-8"?>
+<p:sld xmlns:a="http://schemas.openxmlformats.org/drawingml/2006/main" xmlns:r="http://schemas.openxmlformats.org/officeDocument/2006/relationships" xmlns:p="http://schemas.openxmlformats.org/presentationml/2006/main">
+  <p:cSld>
+    <p:spTree>
+      <p:nvGrpSpPr>
+        <p:cNvPr id="1" name=""/>
+        <p:cNvGrpSpPr/>
+        <p:nvPr/>
+      </p:nvGrpSpPr>
+      <p:grpSpPr>
+        <a:xfrm>
+          <a:off x="0" y="0"/>
+          <a:ext cx="0" cy="0"/>
+          <a:chOff x="0" y="0"/>
+          <a:chExt cx="0" cy="0"/>
+        </a:xfrm>
+      </p:grpSpPr>
+      <p:sp>
+        <p:nvSpPr>
+          <p:cNvPr id="6" name="Title 5"/>
+          <p:cNvSpPr>
+            <a:spLocks noGrp="1"/>
+          </p:cNvSpPr>
+          <p:nvPr>
+            <p:ph type="title"/>
+          </p:nvPr>
+        </p:nvSpPr>
+        <p:spPr/>
+        <p:txBody>
+          <a:bodyPr/>
+          <a:lstStyle/>
+          <a:p>
+            <a:r>
+              <a:rPr lang="en-US" cap="none" dirty="0" smtClean="0"/>
+              <a:t>D Flip Flop</a:t>
+            </a:r>
+            <a:endParaRPr lang="en-US" cap="none" dirty="0"/>
+          </a:p>
+        </p:txBody>
+      </p:sp>
+      <p:sp>
+        <p:nvSpPr>
+          <p:cNvPr id="7" name="Text Placeholder 6"/>
+          <p:cNvSpPr>
+            <a:spLocks noGrp="1"/>
+          </p:cNvSpPr>
+          <p:nvPr>
+            <p:ph type="body" idx="1"/>
+          </p:nvPr>
+        </p:nvSpPr>
+        <p:spPr/>
+        <p:txBody>
+          <a:bodyPr/>
+          <a:lstStyle/>
+          <a:p>
+            <a:endParaRPr lang="en-US" dirty="0"/>
+          </a:p>
+        </p:txBody>
+      </p:sp>
+      <p:sp>
+        <p:nvSpPr>
+          <p:cNvPr id="4" name="Slide Number Placeholder 3"/>
+          <p:cNvSpPr>
+            <a:spLocks noGrp="1"/>
+          </p:cNvSpPr>
+          <p:nvPr>
+            <p:ph type="sldNum" sz="quarter" idx="10"/>
+          </p:nvPr>
+        </p:nvSpPr>
+        <p:spPr/>
+        <p:txBody>
+          <a:bodyPr/>
+          <a:lstStyle/>
+          <a:p>
+            <a:pPr>
+              <a:defRPr/>
+            </a:pPr>
+            <a:fld id="{62D6D4B2-7611-498F-8780-1EDC26277454}" type="slidenum">
+              <a:rPr lang="en-US" smtClean="0">
+                <a:solidFill>
+                  <a:srgbClr val="000000"/>
+                </a:solidFill>
+              </a:rPr>
+              <a:pPr>
+                <a:defRPr/>
+              </a:pPr>
+              <a:t>3</a:t>
+            </a:fld>
+            <a:endParaRPr lang="en-US" dirty="0">
+              <a:solidFill>
+                <a:srgbClr val="000000"/>
+              </a:solidFill>
+            </a:endParaRPr>
+          </a:p>
+        </p:txBody>
+      </p:sp>
+    </p:spTree>
+    <p:extLst>
+      <p:ext uri="{BB962C8B-B14F-4D97-AF65-F5344CB8AC3E}">
+        <p14:creationId xmlns:p14="http://schemas.microsoft.com/office/powerpoint/2010/main" val="1303019524"/>
+      </p:ext>
+    </p:extLst>
+  </p:cSld>
+  <p:clrMapOvr>
+    <a:masterClrMapping/>
+  </p:clrMapOvr>
+  <p:timing>
+    <p:tnLst>
+      <p:par>
+        <p:cTn id="1" dur="indefinite" restart="never" nodeType="tmRoot"/>
+      </p:par>
+    </p:tnLst>
+  </p:timing>
+</p:sld>
+</file>
+
+<file path=ppt/slides/slide30.xml><?xml version="1.0" encoding="utf-8"?>
 <p:sld xmlns:a="http://schemas.openxmlformats.org/drawingml/2006/main" xmlns:r="http://schemas.openxmlformats.org/officeDocument/2006/relationships" xmlns:p="http://schemas.openxmlformats.org/presentationml/2006/main">
   <p:cSld>
     <p:spTree>
@@ -17711,17 +18003,21 @@
               <a:rPr lang="en-US" dirty="0"/>
               <a:t> * r </a:t>
             </a:r>
-            <a:r>
-              <a:rPr lang="en-US" dirty="0" err="1"/>
+            <a:endParaRPr lang="en-US" dirty="0" smtClean="0"/>
+          </a:p>
+          <a:p>
+            <a:r>
+              <a:rPr lang="en-US" dirty="0" err="1" smtClean="0"/>
               <a:t>D_WaitLeave</a:t>
             </a:r>
             <a:r>
+              <a:rPr lang="en-US" dirty="0" smtClean="0"/>
+              <a:t> </a:t>
+            </a:r>
+            <a:r>
               <a:rPr lang="en-US" dirty="0"/>
-              <a:t> = Q_Set30 + </a:t>
-            </a:r>
-            <a:endParaRPr lang="en-US" dirty="0" smtClean="0"/>
-          </a:p>
-          <a:p>
+              <a:t>= Q_Set30 + </a:t>
+            </a:r>
             <a:r>
               <a:rPr lang="en-US" dirty="0" err="1" smtClean="0"/>
               <a:t>Q_WaitLeave</a:t>
@@ -17732,7 +18028,18 @@
             </a:r>
             <a:r>
               <a:rPr lang="en-US" dirty="0"/>
-              <a:t>* t' * c D_Set3 = </a:t>
+              <a:t>* t' * c </a:t>
+            </a:r>
+            <a:endParaRPr lang="en-US" dirty="0" smtClean="0"/>
+          </a:p>
+          <a:p>
+            <a:r>
+              <a:rPr lang="en-US" dirty="0" smtClean="0"/>
+              <a:t>D_Set3 </a:t>
+            </a:r>
+            <a:r>
+              <a:rPr lang="en-US" dirty="0"/>
+              <a:t>= </a:t>
             </a:r>
             <a:r>
               <a:rPr lang="en-US" dirty="0" err="1"/>
@@ -17801,7 +18108,7 @@
               <a:pPr>
                 <a:defRPr/>
               </a:pPr>
-              <a:t>29</a:t>
+              <a:t>30</a:t>
             </a:fld>
             <a:endParaRPr lang="en-US" dirty="0">
               <a:solidFill>
@@ -19131,123 +19438,7 @@
 </p:sld>
 </file>
 
-<file path=ppt/slides/slide3.xml><?xml version="1.0" encoding="utf-8"?>
-<p:sld xmlns:a="http://schemas.openxmlformats.org/drawingml/2006/main" xmlns:r="http://schemas.openxmlformats.org/officeDocument/2006/relationships" xmlns:p="http://schemas.openxmlformats.org/presentationml/2006/main">
-  <p:cSld>
-    <p:spTree>
-      <p:nvGrpSpPr>
-        <p:cNvPr id="1" name=""/>
-        <p:cNvGrpSpPr/>
-        <p:nvPr/>
-      </p:nvGrpSpPr>
-      <p:grpSpPr>
-        <a:xfrm>
-          <a:off x="0" y="0"/>
-          <a:ext cx="0" cy="0"/>
-          <a:chOff x="0" y="0"/>
-          <a:chExt cx="0" cy="0"/>
-        </a:xfrm>
-      </p:grpSpPr>
-      <p:sp>
-        <p:nvSpPr>
-          <p:cNvPr id="6" name="Title 5"/>
-          <p:cNvSpPr>
-            <a:spLocks noGrp="1"/>
-          </p:cNvSpPr>
-          <p:nvPr>
-            <p:ph type="title"/>
-          </p:nvPr>
-        </p:nvSpPr>
-        <p:spPr/>
-        <p:txBody>
-          <a:bodyPr/>
-          <a:lstStyle/>
-          <a:p>
-            <a:r>
-              <a:rPr lang="en-US" cap="none" dirty="0" smtClean="0"/>
-              <a:t>D Flip Flop</a:t>
-            </a:r>
-            <a:endParaRPr lang="en-US" cap="none" dirty="0"/>
-          </a:p>
-        </p:txBody>
-      </p:sp>
-      <p:sp>
-        <p:nvSpPr>
-          <p:cNvPr id="7" name="Text Placeholder 6"/>
-          <p:cNvSpPr>
-            <a:spLocks noGrp="1"/>
-          </p:cNvSpPr>
-          <p:nvPr>
-            <p:ph type="body" idx="1"/>
-          </p:nvPr>
-        </p:nvSpPr>
-        <p:spPr/>
-        <p:txBody>
-          <a:bodyPr/>
-          <a:lstStyle/>
-          <a:p>
-            <a:endParaRPr lang="en-US" dirty="0"/>
-          </a:p>
-        </p:txBody>
-      </p:sp>
-      <p:sp>
-        <p:nvSpPr>
-          <p:cNvPr id="4" name="Slide Number Placeholder 3"/>
-          <p:cNvSpPr>
-            <a:spLocks noGrp="1"/>
-          </p:cNvSpPr>
-          <p:nvPr>
-            <p:ph type="sldNum" sz="quarter" idx="10"/>
-          </p:nvPr>
-        </p:nvSpPr>
-        <p:spPr/>
-        <p:txBody>
-          <a:bodyPr/>
-          <a:lstStyle/>
-          <a:p>
-            <a:pPr>
-              <a:defRPr/>
-            </a:pPr>
-            <a:fld id="{62D6D4B2-7611-498F-8780-1EDC26277454}" type="slidenum">
-              <a:rPr lang="en-US" smtClean="0">
-                <a:solidFill>
-                  <a:srgbClr val="000000"/>
-                </a:solidFill>
-              </a:rPr>
-              <a:pPr>
-                <a:defRPr/>
-              </a:pPr>
-              <a:t>3</a:t>
-            </a:fld>
-            <a:endParaRPr lang="en-US" dirty="0">
-              <a:solidFill>
-                <a:srgbClr val="000000"/>
-              </a:solidFill>
-            </a:endParaRPr>
-          </a:p>
-        </p:txBody>
-      </p:sp>
-    </p:spTree>
-    <p:extLst>
-      <p:ext uri="{BB962C8B-B14F-4D97-AF65-F5344CB8AC3E}">
-        <p14:creationId xmlns:p14="http://schemas.microsoft.com/office/powerpoint/2010/main" val="1303019524"/>
-      </p:ext>
-    </p:extLst>
-  </p:cSld>
-  <p:clrMapOvr>
-    <a:masterClrMapping/>
-  </p:clrMapOvr>
-  <p:timing>
-    <p:tnLst>
-      <p:par>
-        <p:cTn id="1" dur="indefinite" restart="never" nodeType="tmRoot"/>
-      </p:par>
-    </p:tnLst>
-  </p:timing>
-</p:sld>
-</file>
-
-<file path=ppt/slides/slide30.xml><?xml version="1.0" encoding="utf-8"?>
+<file path=ppt/slides/slide31.xml><?xml version="1.0" encoding="utf-8"?>
 <p:sld xmlns:a="http://schemas.openxmlformats.org/drawingml/2006/main" xmlns:r="http://schemas.openxmlformats.org/officeDocument/2006/relationships" xmlns:p="http://schemas.openxmlformats.org/presentationml/2006/main">
   <p:cSld>
     <p:spTree>
@@ -19366,7 +19557,7 @@
               <a:pPr>
                 <a:defRPr/>
               </a:pPr>
-              <a:t>30</a:t>
+              <a:t>31</a:t>
             </a:fld>
             <a:endParaRPr lang="en-US" dirty="0">
               <a:solidFill>
@@ -22970,7 +23161,7 @@
 </p:sld>
 </file>
 
-<file path=ppt/slides/slide31.xml><?xml version="1.0" encoding="utf-8"?>
+<file path=ppt/slides/slide32.xml><?xml version="1.0" encoding="utf-8"?>
 <p:sld xmlns:a="http://schemas.openxmlformats.org/drawingml/2006/main" xmlns:r="http://schemas.openxmlformats.org/officeDocument/2006/relationships" xmlns:p="http://schemas.openxmlformats.org/presentationml/2006/main">
   <p:cSld>
     <p:spTree>
@@ -23149,7 +23340,7 @@
               <a:pPr>
                 <a:defRPr/>
               </a:pPr>
-              <a:t>31</a:t>
+              <a:t>32</a:t>
             </a:fld>
             <a:endParaRPr lang="en-US" dirty="0">
               <a:solidFill>
@@ -23648,7 +23839,7 @@
 </p:sld>
 </file>
 
-<file path=ppt/slides/slide32.xml><?xml version="1.0" encoding="utf-8"?>
+<file path=ppt/slides/slide33.xml><?xml version="1.0" encoding="utf-8"?>
 <p:sld xmlns:a="http://schemas.openxmlformats.org/drawingml/2006/main" xmlns:r="http://schemas.openxmlformats.org/officeDocument/2006/relationships" xmlns:p="http://schemas.openxmlformats.org/presentationml/2006/main">
   <p:cSld>
     <p:spTree>
@@ -23754,7 +23945,7 @@
               <a:pPr>
                 <a:defRPr/>
               </a:pPr>
-              <a:t>32</a:t>
+              <a:t>33</a:t>
             </a:fld>
             <a:endParaRPr lang="en-US" dirty="0">
               <a:solidFill>
@@ -24294,7 +24485,7 @@
 </p:sld>
 </file>
 
-<file path=ppt/slides/slide33.xml><?xml version="1.0" encoding="utf-8"?>
+<file path=ppt/slides/slide34.xml><?xml version="1.0" encoding="utf-8"?>
 <p:sld xmlns:a="http://schemas.openxmlformats.org/drawingml/2006/main" xmlns:r="http://schemas.openxmlformats.org/officeDocument/2006/relationships" xmlns:p="http://schemas.openxmlformats.org/presentationml/2006/main">
   <p:cSld>
     <p:spTree>
@@ -24445,7 +24636,7 @@
               <a:pPr>
                 <a:defRPr/>
               </a:pPr>
-              <a:t>33</a:t>
+              <a:t>34</a:t>
             </a:fld>
             <a:endParaRPr lang="en-US" dirty="0">
               <a:solidFill>
@@ -25650,7 +25841,7 @@
       </p:grpSpPr>
       <p:sp>
         <p:nvSpPr>
-          <p:cNvPr id="6" name="Title 5"/>
+          <p:cNvPr id="2" name="Title 1"/>
           <p:cNvSpPr>
             <a:spLocks noGrp="1"/>
           </p:cNvSpPr>
@@ -25664,35 +25855,44 @@
           <a:lstStyle/>
           <a:p>
             <a:r>
-              <a:rPr lang="en-US" cap="none" dirty="0" smtClean="0"/>
-              <a:t>FSM Timing</a:t>
-            </a:r>
-            <a:endParaRPr lang="en-US" cap="none" dirty="0"/>
+              <a:rPr lang="en-US" dirty="0"/>
+              <a:t>Finite State </a:t>
+            </a:r>
+            <a:r>
+              <a:rPr lang="en-US" dirty="0" smtClean="0"/>
+              <a:t>Machine</a:t>
+            </a:r>
+            <a:endParaRPr lang="en-US" dirty="0"/>
           </a:p>
         </p:txBody>
       </p:sp>
       <p:sp>
         <p:nvSpPr>
-          <p:cNvPr id="7" name="Text Placeholder 6"/>
+          <p:cNvPr id="4" name="Content Placeholder 3"/>
           <p:cNvSpPr>
             <a:spLocks noGrp="1"/>
           </p:cNvSpPr>
           <p:nvPr>
-            <p:ph type="body" idx="1"/>
+            <p:ph idx="1"/>
           </p:nvPr>
         </p:nvSpPr>
-        <p:spPr/>
+        <p:spPr>
+          <a:xfrm>
+            <a:off x="581736" y="1523052"/>
+            <a:ext cx="8131175" cy="4324350"/>
+          </a:xfrm>
+        </p:spPr>
         <p:txBody>
           <a:bodyPr/>
           <a:lstStyle/>
           <a:p>
-            <a:endParaRPr lang="en-US" dirty="0"/>
+            <a:endParaRPr lang="en-US" b="0" dirty="0"/>
           </a:p>
         </p:txBody>
       </p:sp>
       <p:sp>
         <p:nvSpPr>
-          <p:cNvPr id="4" name="Slide Number Placeholder 3"/>
+          <p:cNvPr id="5" name="Slide Number Placeholder 3"/>
           <p:cNvSpPr>
             <a:spLocks noGrp="1"/>
           </p:cNvSpPr>
@@ -25700,7 +25900,12 @@
             <p:ph type="sldNum" sz="quarter" idx="10"/>
           </p:nvPr>
         </p:nvSpPr>
-        <p:spPr/>
+        <p:spPr>
+          <a:xfrm>
+            <a:off x="6910388" y="6253163"/>
+            <a:ext cx="2133600" cy="476250"/>
+          </a:xfrm>
+        </p:spPr>
         <p:txBody>
           <a:bodyPr/>
           <a:lstStyle/>
@@ -25727,10 +25932,157 @@
           </a:p>
         </p:txBody>
       </p:sp>
+      <p:sp>
+        <p:nvSpPr>
+          <p:cNvPr id="3" name="AutoShape 2" descr="image"/>
+          <p:cNvSpPr>
+            <a:spLocks noChangeAspect="1" noChangeArrowheads="1"/>
+          </p:cNvSpPr>
+          <p:nvPr/>
+        </p:nvSpPr>
+        <p:spPr bwMode="auto">
+          <a:xfrm>
+            <a:off x="155575" y="-144463"/>
+            <a:ext cx="304800" cy="304801"/>
+          </a:xfrm>
+          <a:prstGeom prst="rect">
+            <a:avLst/>
+          </a:prstGeom>
+          <a:noFill/>
+          <a:extLst>
+            <a:ext uri="{909E8E84-426E-40DD-AFC4-6F175D3DCCD1}">
+              <a14:hiddenFill xmlns:a14="http://schemas.microsoft.com/office/drawing/2010/main">
+                <a:solidFill>
+                  <a:srgbClr val="FFFFFF"/>
+                </a:solidFill>
+              </a14:hiddenFill>
+            </a:ext>
+          </a:extLst>
+        </p:spPr>
+        <p:txBody>
+          <a:bodyPr vert="horz" wrap="square" lIns="91440" tIns="45720" rIns="91440" bIns="45720" numCol="1" anchor="t" anchorCtr="0" compatLnSpc="1">
+            <a:prstTxWarp prst="textNoShape">
+              <a:avLst/>
+            </a:prstTxWarp>
+          </a:bodyPr>
+          <a:lstStyle/>
+          <a:p>
+            <a:endParaRPr lang="en-US"/>
+          </a:p>
+        </p:txBody>
+      </p:sp>
+      <p:sp>
+        <p:nvSpPr>
+          <p:cNvPr id="6" name="AutoShape 4" descr="image"/>
+          <p:cNvSpPr>
+            <a:spLocks noChangeAspect="1" noChangeArrowheads="1"/>
+          </p:cNvSpPr>
+          <p:nvPr/>
+        </p:nvSpPr>
+        <p:spPr bwMode="auto">
+          <a:xfrm>
+            <a:off x="307975" y="7937"/>
+            <a:ext cx="304800" cy="304801"/>
+          </a:xfrm>
+          <a:prstGeom prst="rect">
+            <a:avLst/>
+          </a:prstGeom>
+          <a:noFill/>
+          <a:extLst>
+            <a:ext uri="{909E8E84-426E-40DD-AFC4-6F175D3DCCD1}">
+              <a14:hiddenFill xmlns:a14="http://schemas.microsoft.com/office/drawing/2010/main">
+                <a:solidFill>
+                  <a:srgbClr val="FFFFFF"/>
+                </a:solidFill>
+              </a14:hiddenFill>
+            </a:ext>
+          </a:extLst>
+        </p:spPr>
+        <p:txBody>
+          <a:bodyPr vert="horz" wrap="square" lIns="91440" tIns="45720" rIns="91440" bIns="45720" numCol="1" anchor="t" anchorCtr="0" compatLnSpc="1">
+            <a:prstTxWarp prst="textNoShape">
+              <a:avLst/>
+            </a:prstTxWarp>
+          </a:bodyPr>
+          <a:lstStyle/>
+          <a:p>
+            <a:endParaRPr lang="en-US"/>
+          </a:p>
+        </p:txBody>
+      </p:sp>
+      <p:pic>
+        <p:nvPicPr>
+          <p:cNvPr id="1029" name="Picture 5" descr="C:\Users\Jeffrey.Falkinburg\Documents\Courses\ECE383\Spr16\ECE383_slides\L8\state_machines.jpg"/>
+          <p:cNvPicPr>
+            <a:picLocks noChangeAspect="1" noChangeArrowheads="1"/>
+          </p:cNvPicPr>
+          <p:nvPr/>
+        </p:nvPicPr>
+        <p:blipFill>
+          <a:blip r:embed="rId2">
+            <a:extLst>
+              <a:ext uri="{28A0092B-C50C-407E-A947-70E740481C1C}">
+                <a14:useLocalDpi xmlns:a14="http://schemas.microsoft.com/office/drawing/2010/main" val="0"/>
+              </a:ext>
+            </a:extLst>
+          </a:blip>
+          <a:srcRect/>
+          <a:stretch>
+            <a:fillRect/>
+          </a:stretch>
+        </p:blipFill>
+        <p:spPr bwMode="auto">
+          <a:xfrm>
+            <a:off x="457826" y="1954530"/>
+            <a:ext cx="8282940" cy="2948940"/>
+          </a:xfrm>
+          <a:prstGeom prst="rect">
+            <a:avLst/>
+          </a:prstGeom>
+          <a:noFill/>
+          <a:extLst>
+            <a:ext uri="{909E8E84-426E-40DD-AFC4-6F175D3DCCD1}">
+              <a14:hiddenFill xmlns:a14="http://schemas.microsoft.com/office/drawing/2010/main">
+                <a:solidFill>
+                  <a:srgbClr val="FFFFFF"/>
+                </a:solidFill>
+              </a14:hiddenFill>
+            </a:ext>
+          </a:extLst>
+        </p:spPr>
+      </p:pic>
+      <p:sp>
+        <p:nvSpPr>
+          <p:cNvPr id="9" name="Rectangle 8"/>
+          <p:cNvSpPr/>
+          <p:nvPr/>
+        </p:nvSpPr>
+        <p:spPr>
+          <a:xfrm>
+            <a:off x="279780" y="6049708"/>
+            <a:ext cx="8441140" cy="369332"/>
+          </a:xfrm>
+          <a:prstGeom prst="rect">
+            <a:avLst/>
+          </a:prstGeom>
+        </p:spPr>
+        <p:txBody>
+          <a:bodyPr wrap="square">
+            <a:spAutoFit/>
+          </a:bodyPr>
+          <a:lstStyle/>
+          <a:p>
+            <a:r>
+              <a:rPr lang="en-US" sz="1800" dirty="0"/>
+              <a:t>Figure 10.1 Block diagram of an FSM.</a:t>
+            </a:r>
+          </a:p>
+        </p:txBody>
+      </p:sp>
     </p:spTree>
     <p:extLst>
       <p:ext uri="{BB962C8B-B14F-4D97-AF65-F5344CB8AC3E}">
-        <p14:creationId xmlns:p14="http://schemas.microsoft.com/office/powerpoint/2010/main" val="3528516227"/>
+        <p14:creationId xmlns:p14="http://schemas.microsoft.com/office/powerpoint/2010/main" val="2457660617"/>
       </p:ext>
     </p:extLst>
   </p:cSld>
@@ -25766,7 +26118,7 @@
       </p:grpSpPr>
       <p:sp>
         <p:nvSpPr>
-          <p:cNvPr id="2" name="Title 1"/>
+          <p:cNvPr id="6" name="Title 5"/>
           <p:cNvSpPr>
             <a:spLocks noGrp="1"/>
           </p:cNvSpPr>
@@ -25780,48 +26132,35 @@
           <a:lstStyle/>
           <a:p>
             <a:r>
-              <a:rPr lang="en-US" dirty="0" smtClean="0"/>
+              <a:rPr lang="en-US" cap="none" dirty="0" smtClean="0"/>
               <a:t>FSM Timing</a:t>
             </a:r>
-            <a:endParaRPr lang="en-US" dirty="0"/>
+            <a:endParaRPr lang="en-US" cap="none" dirty="0"/>
           </a:p>
         </p:txBody>
       </p:sp>
       <p:sp>
         <p:nvSpPr>
-          <p:cNvPr id="4" name="Content Placeholder 3"/>
+          <p:cNvPr id="7" name="Text Placeholder 6"/>
           <p:cNvSpPr>
             <a:spLocks noGrp="1"/>
           </p:cNvSpPr>
           <p:nvPr>
-            <p:ph idx="1"/>
+            <p:ph type="body" idx="1"/>
           </p:nvPr>
         </p:nvSpPr>
-        <p:spPr>
-          <a:xfrm>
-            <a:off x="581736" y="1523052"/>
-            <a:ext cx="8131175" cy="4324350"/>
-          </a:xfrm>
-        </p:spPr>
+        <p:spPr/>
         <p:txBody>
           <a:bodyPr/>
           <a:lstStyle/>
           <a:p>
-            <a:r>
-              <a:rPr lang="en-US" sz="2200" u="sng" dirty="0" smtClean="0"/>
-              <a:t>Event 1</a:t>
-            </a:r>
-            <a:r>
-              <a:rPr lang="en-US" sz="2200" dirty="0" smtClean="0"/>
-              <a:t>- Since flip flops sample their inputs on the positive edge of the clock, this point is the beginning of the timing analysis.</a:t>
-            </a:r>
-            <a:endParaRPr lang="en-US" sz="2200" b="0" dirty="0"/>
+            <a:endParaRPr lang="en-US" dirty="0"/>
           </a:p>
         </p:txBody>
       </p:sp>
       <p:sp>
         <p:nvSpPr>
-          <p:cNvPr id="5" name="Slide Number Placeholder 3"/>
+          <p:cNvPr id="4" name="Slide Number Placeholder 3"/>
           <p:cNvSpPr>
             <a:spLocks noGrp="1"/>
           </p:cNvSpPr>
@@ -25829,12 +26168,7 @@
             <p:ph type="sldNum" sz="quarter" idx="10"/>
           </p:nvPr>
         </p:nvSpPr>
-        <p:spPr>
-          <a:xfrm>
-            <a:off x="6910388" y="6253163"/>
-            <a:ext cx="2133600" cy="476250"/>
-          </a:xfrm>
-        </p:spPr>
+        <p:spPr/>
         <p:txBody>
           <a:bodyPr/>
           <a:lstStyle/>
@@ -25861,51 +26195,10 @@
           </a:p>
         </p:txBody>
       </p:sp>
-      <p:pic>
-        <p:nvPicPr>
-          <p:cNvPr id="6" name="Picture 2" descr="http://ece.ninja/383/lecture/img/lecture09-6.gif"/>
-          <p:cNvPicPr>
-            <a:picLocks noChangeAspect="1" noChangeArrowheads="1"/>
-          </p:cNvPicPr>
-          <p:nvPr/>
-        </p:nvPicPr>
-        <p:blipFill>
-          <a:blip r:embed="rId2">
-            <a:extLst>
-              <a:ext uri="{28A0092B-C50C-407E-A947-70E740481C1C}">
-                <a14:useLocalDpi xmlns:a14="http://schemas.microsoft.com/office/drawing/2010/main" val="0"/>
-              </a:ext>
-            </a:extLst>
-          </a:blip>
-          <a:srcRect/>
-          <a:stretch>
-            <a:fillRect/>
-          </a:stretch>
-        </p:blipFill>
-        <p:spPr bwMode="auto">
-          <a:xfrm>
-            <a:off x="592667" y="3196130"/>
-            <a:ext cx="7950200" cy="3224248"/>
-          </a:xfrm>
-          <a:prstGeom prst="rect">
-            <a:avLst/>
-          </a:prstGeom>
-          <a:noFill/>
-          <a:extLst>
-            <a:ext uri="{909E8E84-426E-40DD-AFC4-6F175D3DCCD1}">
-              <a14:hiddenFill xmlns:a14="http://schemas.microsoft.com/office/drawing/2010/main">
-                <a:solidFill>
-                  <a:srgbClr val="FFFFFF"/>
-                </a:solidFill>
-              </a14:hiddenFill>
-            </a:ext>
-          </a:extLst>
-        </p:spPr>
-      </p:pic>
     </p:spTree>
     <p:extLst>
       <p:ext uri="{BB962C8B-B14F-4D97-AF65-F5344CB8AC3E}">
-        <p14:creationId xmlns:p14="http://schemas.microsoft.com/office/powerpoint/2010/main" val="2311777062"/>
+        <p14:creationId xmlns:p14="http://schemas.microsoft.com/office/powerpoint/2010/main" val="3528516227"/>
       </p:ext>
     </p:extLst>
   </p:cSld>

</xml_diff>

<commit_message>
Updating a typo on Lecture 9 to turn on the Timer for the waitleave state.  Updated slides, notes and code to reflect the change.
</commit_message>
<xml_diff>
--- a/lecture/slides/ECE_383_Lec9.pptx
+++ b/lecture/slides/ECE_383_Lec9.pptx
@@ -1176,7 +1176,7 @@
                 </a:solidFill>
               </a:rPr>
               <a:pPr/>
-              <a:t>1/27/2017</a:t>
+              <a:t>1/30/2017</a:t>
             </a:fld>
             <a:endParaRPr lang="en-US">
               <a:solidFill>
@@ -1378,7 +1378,7 @@
                 </a:solidFill>
               </a:rPr>
               <a:pPr/>
-              <a:t>1/27/2017</a:t>
+              <a:t>1/30/2017</a:t>
             </a:fld>
             <a:endParaRPr lang="en-US">
               <a:solidFill>
@@ -1597,7 +1597,7 @@
                 </a:solidFill>
               </a:rPr>
               <a:pPr/>
-              <a:t>1/27/2017</a:t>
+              <a:t>1/30/2017</a:t>
             </a:fld>
             <a:endParaRPr lang="en-US">
               <a:solidFill>
@@ -2088,7 +2088,7 @@
                 </a:spcAft>
                 <a:defRPr/>
               </a:pPr>
-              <a:t>27 January 2017</a:t>
+              <a:t>30 January 2017</a:t>
             </a:fld>
             <a:endParaRPr lang="en-US" sz="1800">
               <a:solidFill>
@@ -2353,7 +2353,7 @@
                 </a:spcAft>
                 <a:defRPr/>
               </a:pPr>
-              <a:t>27 January 2017</a:t>
+              <a:t>30 January 2017</a:t>
             </a:fld>
             <a:endParaRPr lang="en-US" sz="1800">
               <a:solidFill>
@@ -2707,7 +2707,7 @@
                 </a:spcAft>
                 <a:defRPr/>
               </a:pPr>
-              <a:t>27 January 2017</a:t>
+              <a:t>30 January 2017</a:t>
             </a:fld>
             <a:endParaRPr lang="en-US" sz="1800">
               <a:solidFill>
@@ -3200,7 +3200,7 @@
                 </a:spcAft>
                 <a:defRPr/>
               </a:pPr>
-              <a:t>27 January 2017</a:t>
+              <a:t>30 January 2017</a:t>
             </a:fld>
             <a:endParaRPr lang="en-US" sz="1800">
               <a:solidFill>
@@ -3384,7 +3384,7 @@
                 </a:spcAft>
                 <a:defRPr/>
               </a:pPr>
-              <a:t>27 January 2017</a:t>
+              <a:t>30 January 2017</a:t>
             </a:fld>
             <a:endParaRPr lang="en-US" sz="1800">
               <a:solidFill>
@@ -3545,7 +3545,7 @@
                 </a:spcAft>
                 <a:defRPr/>
               </a:pPr>
-              <a:t>27 January 2017</a:t>
+              <a:t>30 January 2017</a:t>
             </a:fld>
             <a:endParaRPr lang="en-US" sz="1800">
               <a:solidFill>
@@ -3888,7 +3888,7 @@
                 </a:spcAft>
                 <a:defRPr/>
               </a:pPr>
-              <a:t>27 January 2017</a:t>
+              <a:t>30 January 2017</a:t>
             </a:fld>
             <a:endParaRPr lang="en-US" sz="1800">
               <a:solidFill>
@@ -4027,7 +4027,7 @@
                 </a:solidFill>
               </a:rPr>
               <a:pPr/>
-              <a:t>1/27/2017</a:t>
+              <a:t>1/30/2017</a:t>
             </a:fld>
             <a:endParaRPr lang="en-US">
               <a:solidFill>
@@ -4410,7 +4410,7 @@
                 </a:spcAft>
                 <a:defRPr/>
               </a:pPr>
-              <a:t>27 January 2017</a:t>
+              <a:t>30 January 2017</a:t>
             </a:fld>
             <a:endParaRPr lang="en-US" sz="1800">
               <a:solidFill>
@@ -4646,7 +4646,7 @@
                 </a:spcAft>
                 <a:defRPr/>
               </a:pPr>
-              <a:t>27 January 2017</a:t>
+              <a:t>30 January 2017</a:t>
             </a:fld>
             <a:endParaRPr lang="en-US" sz="1800">
               <a:solidFill>
@@ -4892,7 +4892,7 @@
                 </a:spcAft>
                 <a:defRPr/>
               </a:pPr>
-              <a:t>27 January 2017</a:t>
+              <a:t>30 January 2017</a:t>
             </a:fld>
             <a:endParaRPr lang="en-US" sz="1800">
               <a:solidFill>
@@ -5106,7 +5106,7 @@
                 </a:spcAft>
                 <a:defRPr/>
               </a:pPr>
-              <a:t>27 January 2017</a:t>
+              <a:t>30 January 2017</a:t>
             </a:fld>
             <a:endParaRPr lang="en-US" sz="1800">
               <a:solidFill>
@@ -5321,7 +5321,7 @@
                 </a:solidFill>
               </a:rPr>
               <a:pPr/>
-              <a:t>1/27/2017</a:t>
+              <a:t>1/30/2017</a:t>
             </a:fld>
             <a:endParaRPr lang="en-US">
               <a:solidFill>
@@ -5641,7 +5641,7 @@
                 </a:solidFill>
               </a:rPr>
               <a:pPr/>
-              <a:t>1/27/2017</a:t>
+              <a:t>1/30/2017</a:t>
             </a:fld>
             <a:endParaRPr lang="en-US">
               <a:solidFill>
@@ -6095,7 +6095,7 @@
                 </a:solidFill>
               </a:rPr>
               <a:pPr/>
-              <a:t>1/27/2017</a:t>
+              <a:t>1/30/2017</a:t>
             </a:fld>
             <a:endParaRPr lang="en-US">
               <a:solidFill>
@@ -6245,7 +6245,7 @@
                 </a:solidFill>
               </a:rPr>
               <a:pPr/>
-              <a:t>1/27/2017</a:t>
+              <a:t>1/30/2017</a:t>
             </a:fld>
             <a:endParaRPr lang="en-US">
               <a:solidFill>
@@ -6379,7 +6379,7 @@
                 </a:solidFill>
               </a:rPr>
               <a:pPr/>
-              <a:t>1/27/2017</a:t>
+              <a:t>1/30/2017</a:t>
             </a:fld>
             <a:endParaRPr lang="en-US">
               <a:solidFill>
@@ -6688,7 +6688,7 @@
                 </a:solidFill>
               </a:rPr>
               <a:pPr/>
-              <a:t>1/27/2017</a:t>
+              <a:t>1/30/2017</a:t>
             </a:fld>
             <a:endParaRPr lang="en-US">
               <a:solidFill>
@@ -6980,7 +6980,7 @@
                 </a:solidFill>
               </a:rPr>
               <a:pPr/>
-              <a:t>1/27/2017</a:t>
+              <a:t>1/30/2017</a:t>
             </a:fld>
             <a:endParaRPr lang="en-US">
               <a:solidFill>
@@ -7248,7 +7248,7 @@
                   <a:spcPts val="0"/>
                 </a:spcAft>
               </a:pPr>
-              <a:t>1/27/2017</a:t>
+              <a:t>1/30/2017</a:t>
             </a:fld>
             <a:endParaRPr lang="en-US">
               <a:solidFill>
@@ -29803,7 +29803,6 @@
               <a:rPr lang="en-US" dirty="0" smtClean="0"/>
               <a:t>c' </a:t>
             </a:r>
-            <a:endParaRPr lang="en-US" dirty="0" smtClean="0"/>
           </a:p>
           <a:p>
             <a:r>
@@ -31751,7 +31750,7 @@
           <p:nvPr>
             <p:extLst>
               <p:ext uri="{D42A27DB-BD31-4B8C-83A1-F6EECF244321}">
-                <p14:modId xmlns:p14="http://schemas.microsoft.com/office/powerpoint/2010/main" val="233256993"/>
+                <p14:modId xmlns:p14="http://schemas.microsoft.com/office/powerpoint/2010/main" val="2468956998"/>
               </p:ext>
             </p:extLst>
           </p:nvPr>
@@ -31779,7 +31778,7 @@
                     <a:p>
                       <a:pPr algn="l" fontAlgn="t"/>
                       <a:r>
-                        <a:rPr lang="en-US" sz="1600">
+                        <a:rPr lang="en-US" sz="1600" dirty="0">
                           <a:effectLst/>
                         </a:rPr>
                         <a:t>State</a:t>
@@ -34173,11 +34172,14 @@
                     <a:p>
                       <a:pPr algn="l" fontAlgn="t"/>
                       <a:r>
-                        <a:rPr lang="en-US" sz="1600">
+                        <a:rPr lang="en-US" sz="1600" dirty="0" smtClean="0">
                           <a:effectLst/>
                         </a:rPr>
-                        <a:t>00</a:t>
+                        <a:t>11</a:t>
                       </a:r>
+                      <a:endParaRPr lang="en-US" sz="1600" dirty="0">
+                        <a:effectLst/>
+                      </a:endParaRPr>
                     </a:p>
                   </a:txBody>
                   <a:tcPr marL="34782" marR="34782" marT="27825" marB="27825">
@@ -34966,7 +34968,23 @@
           <a:p>
             <a:r>
               <a:rPr lang="en-US" dirty="0"/>
-              <a:t>Z_Timer_1 &lt;= Q_Set3 + </a:t>
+              <a:t>Z_Timer_1 &lt;= </a:t>
+            </a:r>
+            <a:r>
+              <a:rPr lang="en-US" dirty="0"/>
+              <a:t>Q_Set3 + </a:t>
+            </a:r>
+            <a:r>
+              <a:rPr lang="en-US" dirty="0" err="1"/>
+              <a:t>Q_WaitLeave</a:t>
+            </a:r>
+            <a:r>
+              <a:rPr lang="en-US" dirty="0"/>
+              <a:t> </a:t>
+            </a:r>
+            <a:r>
+              <a:rPr lang="en-US" dirty="0"/>
+              <a:t>+ </a:t>
             </a:r>
             <a:r>
               <a:rPr lang="en-US" dirty="0" err="1"/>
@@ -34977,7 +34995,23 @@
           <a:p>
             <a:r>
               <a:rPr lang="en-US" dirty="0"/>
-              <a:t>Z_Timer_0 &lt;= Q_Set30 + </a:t>
+              <a:t>Z_Timer_0 &lt;= </a:t>
+            </a:r>
+            <a:r>
+              <a:rPr lang="en-US" dirty="0"/>
+              <a:t>Q_Set30 + </a:t>
+            </a:r>
+            <a:r>
+              <a:rPr lang="en-US" dirty="0" err="1"/>
+              <a:t>Q_WaitLeave</a:t>
+            </a:r>
+            <a:r>
+              <a:rPr lang="en-US" dirty="0"/>
+              <a:t> </a:t>
+            </a:r>
+            <a:r>
+              <a:rPr lang="en-US" dirty="0"/>
+              <a:t>+ </a:t>
             </a:r>
             <a:r>
               <a:rPr lang="en-US" dirty="0" err="1"/>
@@ -35972,7 +36006,7 @@
       </p:sp>
       <p:pic>
         <p:nvPicPr>
-          <p:cNvPr id="4098" name="Picture 2" descr="http://ece.ninja/383/lecture/img/lecture09-8.gif"/>
+          <p:cNvPr id="1028" name="Picture 4"/>
           <p:cNvPicPr>
             <a:picLocks noChangeAspect="1" noChangeArrowheads="1"/>
           </p:cNvPicPr>
@@ -35986,27 +36020,39 @@
               </a:ext>
             </a:extLst>
           </a:blip>
-          <a:srcRect/>
           <a:stretch>
             <a:fillRect/>
           </a:stretch>
         </p:blipFill>
         <p:spPr bwMode="auto">
           <a:xfrm>
-            <a:off x="0" y="1564329"/>
-            <a:ext cx="9183305" cy="2393521"/>
+            <a:off x="0" y="1603687"/>
+            <a:ext cx="9163944" cy="2250451"/>
           </a:xfrm>
           <a:prstGeom prst="rect">
             <a:avLst/>
           </a:prstGeom>
           <a:noFill/>
+          <a:ln>
+            <a:noFill/>
+          </a:ln>
           <a:extLst>
             <a:ext uri="{909E8E84-426E-40DD-AFC4-6F175D3DCCD1}">
               <a14:hiddenFill xmlns:a14="http://schemas.microsoft.com/office/drawing/2010/main">
                 <a:solidFill>
-                  <a:srgbClr val="FFFFFF"/>
+                  <a:schemeClr val="accent1"/>
                 </a:solidFill>
               </a14:hiddenFill>
+            </a:ext>
+            <a:ext uri="{91240B29-F687-4F45-9708-019B960494DF}">
+              <a14:hiddenLine xmlns:a14="http://schemas.microsoft.com/office/drawing/2010/main" w="9525">
+                <a:solidFill>
+                  <a:schemeClr val="tx1"/>
+                </a:solidFill>
+                <a:miter lim="800000"/>
+                <a:headEnd/>
+                <a:tailEnd/>
+              </a14:hiddenLine>
             </a:ext>
           </a:extLst>
         </p:spPr>
@@ -38171,7 +38217,7 @@
                 </a:spcAft>
                 <a:defRPr/>
               </a:pPr>
-              <a:t>27 January 2017</a:t>
+              <a:t>30 January 2017</a:t>
             </a:fld>
             <a:endParaRPr lang="en-US" sz="1800">
               <a:solidFill>
@@ -38351,7 +38397,7 @@
                 </a:spcAft>
                 <a:defRPr/>
               </a:pPr>
-              <a:t>27 January 2017</a:t>
+              <a:t>30 January 2017</a:t>
             </a:fld>
             <a:endParaRPr lang="en-US" sz="1800">
               <a:solidFill>

</xml_diff>